<commit_message>
Updates Week 1 - Generation 2 [2017]
</commit_message>
<xml_diff>
--- a/Semana1/3. Programming Logic/Newbies - Clase 4_ Diagramas de flujo y pseudocodigo.pptx
+++ b/Semana1/3. Programming Logic/Newbies - Clase 4_ Diagramas de flujo y pseudocodigo.pptx
@@ -1,6 +1,6 @@
 
 <file path=ppt/presentation.xml><?xml version="1.0" encoding="utf-8"?>
-<p:presentation xmlns:a="http://schemas.openxmlformats.org/drawingml/2006/main" xmlns:r="http://schemas.openxmlformats.org/officeDocument/2006/relationships" xmlns:mc="http://schemas.openxmlformats.org/markup-compatibility/2006" xmlns:mv="urn:schemas-microsoft-com:mac:vml" xmlns:p="http://schemas.openxmlformats.org/presentationml/2006/main" xmlns:c="http://schemas.openxmlformats.org/drawingml/2006/chart" xmlns:dgm="http://schemas.openxmlformats.org/drawingml/2006/diagram" xmlns:o="urn:schemas-microsoft-com:office:office" xmlns:v="urn:schemas-microsoft-com:vml" xmlns:pvml="urn:schemas-microsoft-com:office:powerpoint" xmlns:com="http://schemas.openxmlformats.org/drawingml/2006/compatibility" xmlns:p14="http://schemas.microsoft.com/office/powerpoint/2010/main" autoCompressPictures="0" strictFirstAndLastChars="0" saveSubsetFonts="1">
+<p:presentation xmlns:a="http://schemas.openxmlformats.org/drawingml/2006/main" xmlns:r="http://schemas.openxmlformats.org/officeDocument/2006/relationships" xmlns:mc="http://schemas.openxmlformats.org/markup-compatibility/2006" xmlns:mv="urn:schemas-microsoft-com:mac:vml" xmlns:p="http://schemas.openxmlformats.org/presentationml/2006/main" xmlns:c="http://schemas.openxmlformats.org/drawingml/2006/chart" xmlns:dgm="http://schemas.openxmlformats.org/drawingml/2006/diagram" xmlns:o="urn:schemas-microsoft-com:office:office" xmlns:v="urn:schemas-microsoft-com:vml" xmlns:pvml="urn:schemas-microsoft-com:office:powerpoint" xmlns:com="http://schemas.openxmlformats.org/drawingml/2006/compatibility" xmlns:p14="http://schemas.microsoft.com/office/powerpoint/2010/main" xmlns:p15="http://schemas.microsoft.com/office/powerpoint/2012/main" autoCompressPictures="0" strictFirstAndLastChars="0" saveSubsetFonts="1">
   <p:sldMasterIdLst>
     <p:sldMasterId id="2147483654" r:id="rId3"/>
   </p:sldMasterIdLst>
@@ -24,6 +24,8 @@
     <p:sldId id="269" r:id="rId18"/>
     <p:sldId id="270" r:id="rId19"/>
     <p:sldId id="271" r:id="rId20"/>
+    <p:sldId id="272" r:id="rId21"/>
+    <p:sldId id="273" r:id="rId22"/>
   </p:sldIdLst>
   <p:sldSz cy="6858000" cx="9144000"/>
   <p:notesSz cx="6858000" cy="9144000"/>
@@ -233,7 +235,7 @@
 </file>
 
 <file path=ppt/notesMasters/notesMaster1.xml><?xml version="1.0" encoding="utf-8"?>
-<p:notesMaster xmlns:a="http://schemas.openxmlformats.org/drawingml/2006/main" xmlns:r="http://schemas.openxmlformats.org/officeDocument/2006/relationships" xmlns:mc="http://schemas.openxmlformats.org/markup-compatibility/2006" xmlns:mv="urn:schemas-microsoft-com:mac:vml" xmlns:p="http://schemas.openxmlformats.org/presentationml/2006/main" xmlns:c="http://schemas.openxmlformats.org/drawingml/2006/chart" xmlns:dgm="http://schemas.openxmlformats.org/drawingml/2006/diagram" xmlns:o="urn:schemas-microsoft-com:office:office" xmlns:v="urn:schemas-microsoft-com:vml" xmlns:pvml="urn:schemas-microsoft-com:office:powerpoint" xmlns:com="http://schemas.openxmlformats.org/drawingml/2006/compatibility" xmlns:p14="http://schemas.microsoft.com/office/powerpoint/2010/main">
+<p:notesMaster xmlns:a="http://schemas.openxmlformats.org/drawingml/2006/main" xmlns:r="http://schemas.openxmlformats.org/officeDocument/2006/relationships" xmlns:mc="http://schemas.openxmlformats.org/markup-compatibility/2006" xmlns:mv="urn:schemas-microsoft-com:mac:vml" xmlns:p="http://schemas.openxmlformats.org/presentationml/2006/main" xmlns:c="http://schemas.openxmlformats.org/drawingml/2006/chart" xmlns:dgm="http://schemas.openxmlformats.org/drawingml/2006/diagram" xmlns:o="urn:schemas-microsoft-com:office:office" xmlns:v="urn:schemas-microsoft-com:vml" xmlns:pvml="urn:schemas-microsoft-com:office:powerpoint" xmlns:com="http://schemas.openxmlformats.org/drawingml/2006/compatibility" xmlns:p14="http://schemas.microsoft.com/office/powerpoint/2010/main" xmlns:p15="http://schemas.microsoft.com/office/powerpoint/2012/main">
   <p:cSld>
     <p:spTree>
       <p:nvGrpSpPr>
@@ -304,7 +306,7 @@
         <p:spPr>
           <a:xfrm>
             <a:off x="685800" y="4343400"/>
-            <a:ext cx="5486399" cy="4114800"/>
+            <a:ext cx="5486400" cy="4114800"/>
           </a:xfrm>
           <a:prstGeom prst="rect">
             <a:avLst/>
@@ -315,60 +317,69 @@
           </a:ln>
         </p:spPr>
         <p:txBody>
-          <a:bodyPr anchorCtr="0" anchor="t" bIns="91425" lIns="91425" rIns="91425" tIns="91425"/>
+          <a:bodyPr anchorCtr="0" anchor="t" bIns="91425" lIns="91425" rIns="91425" wrap="square" tIns="91425"/>
           <a:lstStyle>
             <a:lvl1pPr lvl="0">
               <a:spcBef>
                 <a:spcPts val="0"/>
               </a:spcBef>
+              <a:buChar char="●"/>
               <a:defRPr sz="1100"/>
             </a:lvl1pPr>
             <a:lvl2pPr lvl="1">
               <a:spcBef>
                 <a:spcPts val="0"/>
               </a:spcBef>
+              <a:buChar char="○"/>
               <a:defRPr sz="1100"/>
             </a:lvl2pPr>
             <a:lvl3pPr lvl="2">
               <a:spcBef>
                 <a:spcPts val="0"/>
               </a:spcBef>
+              <a:buChar char="■"/>
               <a:defRPr sz="1100"/>
             </a:lvl3pPr>
             <a:lvl4pPr lvl="3">
               <a:spcBef>
                 <a:spcPts val="0"/>
               </a:spcBef>
+              <a:buChar char="●"/>
               <a:defRPr sz="1100"/>
             </a:lvl4pPr>
             <a:lvl5pPr lvl="4">
               <a:spcBef>
                 <a:spcPts val="0"/>
               </a:spcBef>
+              <a:buChar char="○"/>
               <a:defRPr sz="1100"/>
             </a:lvl5pPr>
             <a:lvl6pPr lvl="5">
               <a:spcBef>
                 <a:spcPts val="0"/>
               </a:spcBef>
+              <a:buChar char="■"/>
               <a:defRPr sz="1100"/>
             </a:lvl6pPr>
             <a:lvl7pPr lvl="6">
               <a:spcBef>
                 <a:spcPts val="0"/>
               </a:spcBef>
+              <a:buChar char="●"/>
               <a:defRPr sz="1100"/>
             </a:lvl7pPr>
             <a:lvl8pPr lvl="7">
               <a:spcBef>
                 <a:spcPts val="0"/>
               </a:spcBef>
+              <a:buChar char="○"/>
               <a:defRPr sz="1100"/>
             </a:lvl8pPr>
             <a:lvl9pPr lvl="8">
               <a:spcBef>
                 <a:spcPts val="0"/>
               </a:spcBef>
+              <a:buChar char="■"/>
               <a:defRPr sz="1100"/>
             </a:lvl9pPr>
           </a:lstStyle>
@@ -382,7 +393,7 @@
 </file>
 
 <file path=ppt/notesSlides/notesSlide1.xml><?xml version="1.0" encoding="utf-8"?>
-<p:notes xmlns:a="http://schemas.openxmlformats.org/drawingml/2006/main" xmlns:r="http://schemas.openxmlformats.org/officeDocument/2006/relationships" xmlns:mc="http://schemas.openxmlformats.org/markup-compatibility/2006" xmlns:mv="urn:schemas-microsoft-com:mac:vml" xmlns:p="http://schemas.openxmlformats.org/presentationml/2006/main" xmlns:c="http://schemas.openxmlformats.org/drawingml/2006/chart" xmlns:dgm="http://schemas.openxmlformats.org/drawingml/2006/diagram" xmlns:o="urn:schemas-microsoft-com:office:office" xmlns:v="urn:schemas-microsoft-com:vml" xmlns:pvml="urn:schemas-microsoft-com:office:powerpoint" xmlns:com="http://schemas.openxmlformats.org/drawingml/2006/compatibility" xmlns:p14="http://schemas.microsoft.com/office/powerpoint/2010/main" showMasterPhAnim="0" showMasterSp="0">
+<p:notes xmlns:a="http://schemas.openxmlformats.org/drawingml/2006/main" xmlns:r="http://schemas.openxmlformats.org/officeDocument/2006/relationships" xmlns:mc="http://schemas.openxmlformats.org/markup-compatibility/2006" xmlns:mv="urn:schemas-microsoft-com:mac:vml" xmlns:p="http://schemas.openxmlformats.org/presentationml/2006/main" xmlns:c="http://schemas.openxmlformats.org/drawingml/2006/chart" xmlns:dgm="http://schemas.openxmlformats.org/drawingml/2006/diagram" xmlns:o="urn:schemas-microsoft-com:office:office" xmlns:v="urn:schemas-microsoft-com:vml" xmlns:pvml="urn:schemas-microsoft-com:office:powerpoint" xmlns:com="http://schemas.openxmlformats.org/drawingml/2006/compatibility" xmlns:p14="http://schemas.microsoft.com/office/powerpoint/2010/main" xmlns:p15="http://schemas.microsoft.com/office/powerpoint/2012/main" showMasterPhAnim="0" showMasterSp="0">
   <p:cSld>
     <p:spTree>
       <p:nvGrpSpPr>
@@ -443,14 +454,14 @@
         <p:spPr>
           <a:xfrm>
             <a:off x="685800" y="4343400"/>
-            <a:ext cx="5486399" cy="4114800"/>
+            <a:ext cx="5486400" cy="4114800"/>
           </a:xfrm>
           <a:prstGeom prst="rect">
             <a:avLst/>
           </a:prstGeom>
         </p:spPr>
         <p:txBody>
-          <a:bodyPr anchorCtr="0" anchor="t" bIns="91425" lIns="91425" rIns="91425" tIns="91425">
+          <a:bodyPr anchorCtr="0" anchor="t" bIns="91425" lIns="91425" rIns="91425" wrap="square" tIns="91425">
             <a:noAutofit/>
           </a:bodyPr>
           <a:lstStyle/>
@@ -477,11 +488,11 @@
 </file>
 
 <file path=ppt/notesSlides/notesSlide10.xml><?xml version="1.0" encoding="utf-8"?>
-<p:notes xmlns:a="http://schemas.openxmlformats.org/drawingml/2006/main" xmlns:r="http://schemas.openxmlformats.org/officeDocument/2006/relationships" xmlns:mc="http://schemas.openxmlformats.org/markup-compatibility/2006" xmlns:mv="urn:schemas-microsoft-com:mac:vml" xmlns:p="http://schemas.openxmlformats.org/presentationml/2006/main" xmlns:c="http://schemas.openxmlformats.org/drawingml/2006/chart" xmlns:dgm="http://schemas.openxmlformats.org/drawingml/2006/diagram" xmlns:o="urn:schemas-microsoft-com:office:office" xmlns:v="urn:schemas-microsoft-com:vml" xmlns:pvml="urn:schemas-microsoft-com:office:powerpoint" xmlns:com="http://schemas.openxmlformats.org/drawingml/2006/compatibility" xmlns:p14="http://schemas.microsoft.com/office/powerpoint/2010/main" showMasterPhAnim="0" showMasterSp="0">
+<p:notes xmlns:a="http://schemas.openxmlformats.org/drawingml/2006/main" xmlns:r="http://schemas.openxmlformats.org/officeDocument/2006/relationships" xmlns:mc="http://schemas.openxmlformats.org/markup-compatibility/2006" xmlns:mv="urn:schemas-microsoft-com:mac:vml" xmlns:p="http://schemas.openxmlformats.org/presentationml/2006/main" xmlns:c="http://schemas.openxmlformats.org/drawingml/2006/chart" xmlns:dgm="http://schemas.openxmlformats.org/drawingml/2006/diagram" xmlns:o="urn:schemas-microsoft-com:office:office" xmlns:v="urn:schemas-microsoft-com:vml" xmlns:pvml="urn:schemas-microsoft-com:office:powerpoint" xmlns:com="http://schemas.openxmlformats.org/drawingml/2006/compatibility" xmlns:p14="http://schemas.microsoft.com/office/powerpoint/2010/main" xmlns:p15="http://schemas.microsoft.com/office/powerpoint/2012/main" showMasterPhAnim="0" showMasterSp="0">
   <p:cSld>
     <p:spTree>
       <p:nvGrpSpPr>
-        <p:cNvPr id="76" name="Shape 76"/>
+        <p:cNvPr id="79" name="Shape 79"/>
         <p:cNvGrpSpPr/>
         <p:nvPr/>
       </p:nvGrpSpPr>
@@ -495,7 +506,7 @@
       </p:grpSpPr>
       <p:sp>
         <p:nvSpPr>
-          <p:cNvPr id="77" name="Shape 77"/>
+          <p:cNvPr id="80" name="Shape 80"/>
           <p:cNvSpPr/>
           <p:nvPr>
             <p:ph idx="2" type="sldImg"/>
@@ -529,7 +540,7 @@
       </p:sp>
       <p:sp>
         <p:nvSpPr>
-          <p:cNvPr id="78" name="Shape 78"/>
+          <p:cNvPr id="81" name="Shape 81"/>
           <p:cNvSpPr txBox="1"/>
           <p:nvPr>
             <p:ph idx="1" type="body"/>
@@ -545,7 +556,7 @@
           </a:prstGeom>
         </p:spPr>
         <p:txBody>
-          <a:bodyPr anchorCtr="0" anchor="t" bIns="91425" lIns="91425" rIns="91425" tIns="91425">
+          <a:bodyPr anchorCtr="0" anchor="t" bIns="91425" lIns="91425" rIns="91425" wrap="square" tIns="91425">
             <a:noAutofit/>
           </a:bodyPr>
           <a:lstStyle/>
@@ -572,11 +583,11 @@
 </file>
 
 <file path=ppt/notesSlides/notesSlide11.xml><?xml version="1.0" encoding="utf-8"?>
-<p:notes xmlns:a="http://schemas.openxmlformats.org/drawingml/2006/main" xmlns:r="http://schemas.openxmlformats.org/officeDocument/2006/relationships" xmlns:mc="http://schemas.openxmlformats.org/markup-compatibility/2006" xmlns:mv="urn:schemas-microsoft-com:mac:vml" xmlns:p="http://schemas.openxmlformats.org/presentationml/2006/main" xmlns:c="http://schemas.openxmlformats.org/drawingml/2006/chart" xmlns:dgm="http://schemas.openxmlformats.org/drawingml/2006/diagram" xmlns:o="urn:schemas-microsoft-com:office:office" xmlns:v="urn:schemas-microsoft-com:vml" xmlns:pvml="urn:schemas-microsoft-com:office:powerpoint" xmlns:com="http://schemas.openxmlformats.org/drawingml/2006/compatibility" xmlns:p14="http://schemas.microsoft.com/office/powerpoint/2010/main" showMasterPhAnim="0" showMasterSp="0">
+<p:notes xmlns:a="http://schemas.openxmlformats.org/drawingml/2006/main" xmlns:r="http://schemas.openxmlformats.org/officeDocument/2006/relationships" xmlns:mc="http://schemas.openxmlformats.org/markup-compatibility/2006" xmlns:mv="urn:schemas-microsoft-com:mac:vml" xmlns:p="http://schemas.openxmlformats.org/presentationml/2006/main" xmlns:c="http://schemas.openxmlformats.org/drawingml/2006/chart" xmlns:dgm="http://schemas.openxmlformats.org/drawingml/2006/diagram" xmlns:o="urn:schemas-microsoft-com:office:office" xmlns:v="urn:schemas-microsoft-com:vml" xmlns:pvml="urn:schemas-microsoft-com:office:powerpoint" xmlns:com="http://schemas.openxmlformats.org/drawingml/2006/compatibility" xmlns:p14="http://schemas.microsoft.com/office/powerpoint/2010/main" xmlns:p15="http://schemas.microsoft.com/office/powerpoint/2012/main" showMasterPhAnim="0" showMasterSp="0">
   <p:cSld>
     <p:spTree>
       <p:nvGrpSpPr>
-        <p:cNvPr id="81" name="Shape 81"/>
+        <p:cNvPr id="85" name="Shape 85"/>
         <p:cNvGrpSpPr/>
         <p:nvPr/>
       </p:nvGrpSpPr>
@@ -590,7 +601,7 @@
       </p:grpSpPr>
       <p:sp>
         <p:nvSpPr>
-          <p:cNvPr id="82" name="Shape 82"/>
+          <p:cNvPr id="86" name="Shape 86"/>
           <p:cNvSpPr/>
           <p:nvPr>
             <p:ph idx="2" type="sldImg"/>
@@ -624,7 +635,7 @@
       </p:sp>
       <p:sp>
         <p:nvSpPr>
-          <p:cNvPr id="83" name="Shape 83"/>
+          <p:cNvPr id="87" name="Shape 87"/>
           <p:cNvSpPr txBox="1"/>
           <p:nvPr>
             <p:ph idx="1" type="body"/>
@@ -640,7 +651,7 @@
           </a:prstGeom>
         </p:spPr>
         <p:txBody>
-          <a:bodyPr anchorCtr="0" anchor="t" bIns="91425" lIns="91425" rIns="91425" tIns="91425">
+          <a:bodyPr anchorCtr="0" anchor="t" bIns="91425" lIns="91425" rIns="91425" wrap="square" tIns="91425">
             <a:noAutofit/>
           </a:bodyPr>
           <a:lstStyle/>
@@ -667,11 +678,11 @@
 </file>
 
 <file path=ppt/notesSlides/notesSlide12.xml><?xml version="1.0" encoding="utf-8"?>
-<p:notes xmlns:a="http://schemas.openxmlformats.org/drawingml/2006/main" xmlns:r="http://schemas.openxmlformats.org/officeDocument/2006/relationships" xmlns:mc="http://schemas.openxmlformats.org/markup-compatibility/2006" xmlns:mv="urn:schemas-microsoft-com:mac:vml" xmlns:p="http://schemas.openxmlformats.org/presentationml/2006/main" xmlns:c="http://schemas.openxmlformats.org/drawingml/2006/chart" xmlns:dgm="http://schemas.openxmlformats.org/drawingml/2006/diagram" xmlns:o="urn:schemas-microsoft-com:office:office" xmlns:v="urn:schemas-microsoft-com:vml" xmlns:pvml="urn:schemas-microsoft-com:office:powerpoint" xmlns:com="http://schemas.openxmlformats.org/drawingml/2006/compatibility" xmlns:p14="http://schemas.microsoft.com/office/powerpoint/2010/main" showMasterPhAnim="0" showMasterSp="0">
+<p:notes xmlns:a="http://schemas.openxmlformats.org/drawingml/2006/main" xmlns:r="http://schemas.openxmlformats.org/officeDocument/2006/relationships" xmlns:mc="http://schemas.openxmlformats.org/markup-compatibility/2006" xmlns:mv="urn:schemas-microsoft-com:mac:vml" xmlns:p="http://schemas.openxmlformats.org/presentationml/2006/main" xmlns:c="http://schemas.openxmlformats.org/drawingml/2006/chart" xmlns:dgm="http://schemas.openxmlformats.org/drawingml/2006/diagram" xmlns:o="urn:schemas-microsoft-com:office:office" xmlns:v="urn:schemas-microsoft-com:vml" xmlns:pvml="urn:schemas-microsoft-com:office:powerpoint" xmlns:com="http://schemas.openxmlformats.org/drawingml/2006/compatibility" xmlns:p14="http://schemas.microsoft.com/office/powerpoint/2010/main" xmlns:p15="http://schemas.microsoft.com/office/powerpoint/2012/main" showMasterPhAnim="0" showMasterSp="0">
   <p:cSld>
     <p:spTree>
       <p:nvGrpSpPr>
-        <p:cNvPr id="87" name="Shape 87"/>
+        <p:cNvPr id="90" name="Shape 90"/>
         <p:cNvGrpSpPr/>
         <p:nvPr/>
       </p:nvGrpSpPr>
@@ -685,7 +696,7 @@
       </p:grpSpPr>
       <p:sp>
         <p:nvSpPr>
-          <p:cNvPr id="88" name="Shape 88"/>
+          <p:cNvPr id="91" name="Shape 91"/>
           <p:cNvSpPr/>
           <p:nvPr>
             <p:ph idx="2" type="sldImg"/>
@@ -719,7 +730,7 @@
       </p:sp>
       <p:sp>
         <p:nvSpPr>
-          <p:cNvPr id="89" name="Shape 89"/>
+          <p:cNvPr id="92" name="Shape 92"/>
           <p:cNvSpPr txBox="1"/>
           <p:nvPr>
             <p:ph idx="1" type="body"/>
@@ -735,7 +746,7 @@
           </a:prstGeom>
         </p:spPr>
         <p:txBody>
-          <a:bodyPr anchorCtr="0" anchor="t" bIns="91425" lIns="91425" rIns="91425" tIns="91425">
+          <a:bodyPr anchorCtr="0" anchor="t" bIns="91425" lIns="91425" rIns="91425" wrap="square" tIns="91425">
             <a:noAutofit/>
           </a:bodyPr>
           <a:lstStyle/>
@@ -762,11 +773,11 @@
 </file>
 
 <file path=ppt/notesSlides/notesSlide13.xml><?xml version="1.0" encoding="utf-8"?>
-<p:notes xmlns:a="http://schemas.openxmlformats.org/drawingml/2006/main" xmlns:r="http://schemas.openxmlformats.org/officeDocument/2006/relationships" xmlns:mc="http://schemas.openxmlformats.org/markup-compatibility/2006" xmlns:mv="urn:schemas-microsoft-com:mac:vml" xmlns:p="http://schemas.openxmlformats.org/presentationml/2006/main" xmlns:c="http://schemas.openxmlformats.org/drawingml/2006/chart" xmlns:dgm="http://schemas.openxmlformats.org/drawingml/2006/diagram" xmlns:o="urn:schemas-microsoft-com:office:office" xmlns:v="urn:schemas-microsoft-com:vml" xmlns:pvml="urn:schemas-microsoft-com:office:powerpoint" xmlns:com="http://schemas.openxmlformats.org/drawingml/2006/compatibility" xmlns:p14="http://schemas.microsoft.com/office/powerpoint/2010/main" showMasterPhAnim="0" showMasterSp="0">
+<p:notes xmlns:a="http://schemas.openxmlformats.org/drawingml/2006/main" xmlns:r="http://schemas.openxmlformats.org/officeDocument/2006/relationships" xmlns:mc="http://schemas.openxmlformats.org/markup-compatibility/2006" xmlns:mv="urn:schemas-microsoft-com:mac:vml" xmlns:p="http://schemas.openxmlformats.org/presentationml/2006/main" xmlns:c="http://schemas.openxmlformats.org/drawingml/2006/chart" xmlns:dgm="http://schemas.openxmlformats.org/drawingml/2006/diagram" xmlns:o="urn:schemas-microsoft-com:office:office" xmlns:v="urn:schemas-microsoft-com:vml" xmlns:pvml="urn:schemas-microsoft-com:office:powerpoint" xmlns:com="http://schemas.openxmlformats.org/drawingml/2006/compatibility" xmlns:p14="http://schemas.microsoft.com/office/powerpoint/2010/main" xmlns:p15="http://schemas.microsoft.com/office/powerpoint/2012/main" showMasterPhAnim="0" showMasterSp="0">
   <p:cSld>
     <p:spTree>
       <p:nvGrpSpPr>
-        <p:cNvPr id="93" name="Shape 93"/>
+        <p:cNvPr id="95" name="Shape 95"/>
         <p:cNvGrpSpPr/>
         <p:nvPr/>
       </p:nvGrpSpPr>
@@ -780,7 +791,7 @@
       </p:grpSpPr>
       <p:sp>
         <p:nvSpPr>
-          <p:cNvPr id="94" name="Shape 94"/>
+          <p:cNvPr id="96" name="Shape 96"/>
           <p:cNvSpPr/>
           <p:nvPr>
             <p:ph idx="2" type="sldImg"/>
@@ -814,7 +825,7 @@
       </p:sp>
       <p:sp>
         <p:nvSpPr>
-          <p:cNvPr id="95" name="Shape 95"/>
+          <p:cNvPr id="97" name="Shape 97"/>
           <p:cNvSpPr txBox="1"/>
           <p:nvPr>
             <p:ph idx="1" type="body"/>
@@ -830,7 +841,7 @@
           </a:prstGeom>
         </p:spPr>
         <p:txBody>
-          <a:bodyPr anchorCtr="0" anchor="t" bIns="91425" lIns="91425" rIns="91425" tIns="91425">
+          <a:bodyPr anchorCtr="0" anchor="t" bIns="91425" lIns="91425" rIns="91425" wrap="square" tIns="91425">
             <a:noAutofit/>
           </a:bodyPr>
           <a:lstStyle/>
@@ -857,11 +868,11 @@
 </file>
 
 <file path=ppt/notesSlides/notesSlide14.xml><?xml version="1.0" encoding="utf-8"?>
-<p:notes xmlns:a="http://schemas.openxmlformats.org/drawingml/2006/main" xmlns:r="http://schemas.openxmlformats.org/officeDocument/2006/relationships" xmlns:mc="http://schemas.openxmlformats.org/markup-compatibility/2006" xmlns:mv="urn:schemas-microsoft-com:mac:vml" xmlns:p="http://schemas.openxmlformats.org/presentationml/2006/main" xmlns:c="http://schemas.openxmlformats.org/drawingml/2006/chart" xmlns:dgm="http://schemas.openxmlformats.org/drawingml/2006/diagram" xmlns:o="urn:schemas-microsoft-com:office:office" xmlns:v="urn:schemas-microsoft-com:vml" xmlns:pvml="urn:schemas-microsoft-com:office:powerpoint" xmlns:com="http://schemas.openxmlformats.org/drawingml/2006/compatibility" xmlns:p14="http://schemas.microsoft.com/office/powerpoint/2010/main" showMasterPhAnim="0" showMasterSp="0">
+<p:notes xmlns:a="http://schemas.openxmlformats.org/drawingml/2006/main" xmlns:r="http://schemas.openxmlformats.org/officeDocument/2006/relationships" xmlns:mc="http://schemas.openxmlformats.org/markup-compatibility/2006" xmlns:mv="urn:schemas-microsoft-com:mac:vml" xmlns:p="http://schemas.openxmlformats.org/presentationml/2006/main" xmlns:c="http://schemas.openxmlformats.org/drawingml/2006/chart" xmlns:dgm="http://schemas.openxmlformats.org/drawingml/2006/diagram" xmlns:o="urn:schemas-microsoft-com:office:office" xmlns:v="urn:schemas-microsoft-com:vml" xmlns:pvml="urn:schemas-microsoft-com:office:powerpoint" xmlns:com="http://schemas.openxmlformats.org/drawingml/2006/compatibility" xmlns:p14="http://schemas.microsoft.com/office/powerpoint/2010/main" xmlns:p15="http://schemas.microsoft.com/office/powerpoint/2012/main" showMasterPhAnim="0" showMasterSp="0">
   <p:cSld>
     <p:spTree>
       <p:nvGrpSpPr>
-        <p:cNvPr id="99" name="Shape 99"/>
+        <p:cNvPr id="101" name="Shape 101"/>
         <p:cNvGrpSpPr/>
         <p:nvPr/>
       </p:nvGrpSpPr>
@@ -875,7 +886,7 @@
       </p:grpSpPr>
       <p:sp>
         <p:nvSpPr>
-          <p:cNvPr id="100" name="Shape 100"/>
+          <p:cNvPr id="102" name="Shape 102"/>
           <p:cNvSpPr/>
           <p:nvPr>
             <p:ph idx="2" type="sldImg"/>
@@ -909,7 +920,7 @@
       </p:sp>
       <p:sp>
         <p:nvSpPr>
-          <p:cNvPr id="101" name="Shape 101"/>
+          <p:cNvPr id="103" name="Shape 103"/>
           <p:cNvSpPr txBox="1"/>
           <p:nvPr>
             <p:ph idx="1" type="body"/>
@@ -925,7 +936,7 @@
           </a:prstGeom>
         </p:spPr>
         <p:txBody>
-          <a:bodyPr anchorCtr="0" anchor="t" bIns="91425" lIns="91425" rIns="91425" tIns="91425">
+          <a:bodyPr anchorCtr="0" anchor="t" bIns="91425" lIns="91425" rIns="91425" wrap="square" tIns="91425">
             <a:noAutofit/>
           </a:bodyPr>
           <a:lstStyle/>
@@ -952,11 +963,11 @@
 </file>
 
 <file path=ppt/notesSlides/notesSlide15.xml><?xml version="1.0" encoding="utf-8"?>
-<p:notes xmlns:a="http://schemas.openxmlformats.org/drawingml/2006/main" xmlns:r="http://schemas.openxmlformats.org/officeDocument/2006/relationships" xmlns:mc="http://schemas.openxmlformats.org/markup-compatibility/2006" xmlns:mv="urn:schemas-microsoft-com:mac:vml" xmlns:p="http://schemas.openxmlformats.org/presentationml/2006/main" xmlns:c="http://schemas.openxmlformats.org/drawingml/2006/chart" xmlns:dgm="http://schemas.openxmlformats.org/drawingml/2006/diagram" xmlns:o="urn:schemas-microsoft-com:office:office" xmlns:v="urn:schemas-microsoft-com:vml" xmlns:pvml="urn:schemas-microsoft-com:office:powerpoint" xmlns:com="http://schemas.openxmlformats.org/drawingml/2006/compatibility" xmlns:p14="http://schemas.microsoft.com/office/powerpoint/2010/main" showMasterPhAnim="0" showMasterSp="0">
+<p:notes xmlns:a="http://schemas.openxmlformats.org/drawingml/2006/main" xmlns:r="http://schemas.openxmlformats.org/officeDocument/2006/relationships" xmlns:mc="http://schemas.openxmlformats.org/markup-compatibility/2006" xmlns:mv="urn:schemas-microsoft-com:mac:vml" xmlns:p="http://schemas.openxmlformats.org/presentationml/2006/main" xmlns:c="http://schemas.openxmlformats.org/drawingml/2006/chart" xmlns:dgm="http://schemas.openxmlformats.org/drawingml/2006/diagram" xmlns:o="urn:schemas-microsoft-com:office:office" xmlns:v="urn:schemas-microsoft-com:vml" xmlns:pvml="urn:schemas-microsoft-com:office:powerpoint" xmlns:com="http://schemas.openxmlformats.org/drawingml/2006/compatibility" xmlns:p14="http://schemas.microsoft.com/office/powerpoint/2010/main" xmlns:p15="http://schemas.microsoft.com/office/powerpoint/2012/main" showMasterPhAnim="0" showMasterSp="0">
   <p:cSld>
     <p:spTree>
       <p:nvGrpSpPr>
-        <p:cNvPr id="105" name="Shape 105"/>
+        <p:cNvPr id="107" name="Shape 107"/>
         <p:cNvGrpSpPr/>
         <p:nvPr/>
       </p:nvGrpSpPr>
@@ -970,7 +981,7 @@
       </p:grpSpPr>
       <p:sp>
         <p:nvSpPr>
-          <p:cNvPr id="106" name="Shape 106"/>
+          <p:cNvPr id="108" name="Shape 108"/>
           <p:cNvSpPr/>
           <p:nvPr>
             <p:ph idx="2" type="sldImg"/>
@@ -1004,7 +1015,7 @@
       </p:sp>
       <p:sp>
         <p:nvSpPr>
-          <p:cNvPr id="107" name="Shape 107"/>
+          <p:cNvPr id="109" name="Shape 109"/>
           <p:cNvSpPr txBox="1"/>
           <p:nvPr>
             <p:ph idx="1" type="body"/>
@@ -1020,7 +1031,7 @@
           </a:prstGeom>
         </p:spPr>
         <p:txBody>
-          <a:bodyPr anchorCtr="0" anchor="t" bIns="91425" lIns="91425" rIns="91425" tIns="91425">
+          <a:bodyPr anchorCtr="0" anchor="t" bIns="91425" lIns="91425" rIns="91425" wrap="square" tIns="91425">
             <a:noAutofit/>
           </a:bodyPr>
           <a:lstStyle/>
@@ -1047,11 +1058,11 @@
 </file>
 
 <file path=ppt/notesSlides/notesSlide16.xml><?xml version="1.0" encoding="utf-8"?>
-<p:notes xmlns:a="http://schemas.openxmlformats.org/drawingml/2006/main" xmlns:r="http://schemas.openxmlformats.org/officeDocument/2006/relationships" xmlns:mc="http://schemas.openxmlformats.org/markup-compatibility/2006" xmlns:mv="urn:schemas-microsoft-com:mac:vml" xmlns:p="http://schemas.openxmlformats.org/presentationml/2006/main" xmlns:c="http://schemas.openxmlformats.org/drawingml/2006/chart" xmlns:dgm="http://schemas.openxmlformats.org/drawingml/2006/diagram" xmlns:o="urn:schemas-microsoft-com:office:office" xmlns:v="urn:schemas-microsoft-com:vml" xmlns:pvml="urn:schemas-microsoft-com:office:powerpoint" xmlns:com="http://schemas.openxmlformats.org/drawingml/2006/compatibility" xmlns:p14="http://schemas.microsoft.com/office/powerpoint/2010/main" showMasterPhAnim="0" showMasterSp="0">
+<p:notes xmlns:a="http://schemas.openxmlformats.org/drawingml/2006/main" xmlns:r="http://schemas.openxmlformats.org/officeDocument/2006/relationships" xmlns:mc="http://schemas.openxmlformats.org/markup-compatibility/2006" xmlns:mv="urn:schemas-microsoft-com:mac:vml" xmlns:p="http://schemas.openxmlformats.org/presentationml/2006/main" xmlns:c="http://schemas.openxmlformats.org/drawingml/2006/chart" xmlns:dgm="http://schemas.openxmlformats.org/drawingml/2006/diagram" xmlns:o="urn:schemas-microsoft-com:office:office" xmlns:v="urn:schemas-microsoft-com:vml" xmlns:pvml="urn:schemas-microsoft-com:office:powerpoint" xmlns:com="http://schemas.openxmlformats.org/drawingml/2006/compatibility" xmlns:p14="http://schemas.microsoft.com/office/powerpoint/2010/main" xmlns:p15="http://schemas.microsoft.com/office/powerpoint/2012/main" showMasterPhAnim="0" showMasterSp="0">
   <p:cSld>
     <p:spTree>
       <p:nvGrpSpPr>
-        <p:cNvPr id="111" name="Shape 111"/>
+        <p:cNvPr id="113" name="Shape 113"/>
         <p:cNvGrpSpPr/>
         <p:nvPr/>
       </p:nvGrpSpPr>
@@ -1065,7 +1076,7 @@
       </p:grpSpPr>
       <p:sp>
         <p:nvSpPr>
-          <p:cNvPr id="112" name="Shape 112"/>
+          <p:cNvPr id="114" name="Shape 114"/>
           <p:cNvSpPr/>
           <p:nvPr>
             <p:ph idx="2" type="sldImg"/>
@@ -1074,7 +1085,7 @@
         <p:spPr>
           <a:xfrm>
             <a:off x="1143225" y="685800"/>
-            <a:ext cx="4572299" cy="3429000"/>
+            <a:ext cx="4572300" cy="3429000"/>
           </a:xfrm>
           <a:custGeom>
             <a:pathLst>
@@ -1099,7 +1110,7 @@
       </p:sp>
       <p:sp>
         <p:nvSpPr>
-          <p:cNvPr id="113" name="Shape 113"/>
+          <p:cNvPr id="115" name="Shape 115"/>
           <p:cNvSpPr txBox="1"/>
           <p:nvPr>
             <p:ph idx="1" type="body"/>
@@ -1108,14 +1119,14 @@
         <p:spPr>
           <a:xfrm>
             <a:off x="685800" y="4343400"/>
-            <a:ext cx="5486399" cy="4114800"/>
+            <a:ext cx="5486400" cy="4114800"/>
           </a:xfrm>
           <a:prstGeom prst="rect">
             <a:avLst/>
           </a:prstGeom>
         </p:spPr>
         <p:txBody>
-          <a:bodyPr anchorCtr="0" anchor="t" bIns="91425" lIns="91425" rIns="91425" tIns="91425">
+          <a:bodyPr anchorCtr="0" anchor="t" bIns="91425" lIns="91425" rIns="91425" wrap="square" tIns="91425">
             <a:noAutofit/>
           </a:bodyPr>
           <a:lstStyle/>
@@ -1141,12 +1152,12 @@
 </p:notes>
 </file>
 
-<file path=ppt/notesSlides/notesSlide2.xml><?xml version="1.0" encoding="utf-8"?>
-<p:notes xmlns:a="http://schemas.openxmlformats.org/drawingml/2006/main" xmlns:r="http://schemas.openxmlformats.org/officeDocument/2006/relationships" xmlns:mc="http://schemas.openxmlformats.org/markup-compatibility/2006" xmlns:mv="urn:schemas-microsoft-com:mac:vml" xmlns:p="http://schemas.openxmlformats.org/presentationml/2006/main" xmlns:c="http://schemas.openxmlformats.org/drawingml/2006/chart" xmlns:dgm="http://schemas.openxmlformats.org/drawingml/2006/diagram" xmlns:o="urn:schemas-microsoft-com:office:office" xmlns:v="urn:schemas-microsoft-com:vml" xmlns:pvml="urn:schemas-microsoft-com:office:powerpoint" xmlns:com="http://schemas.openxmlformats.org/drawingml/2006/compatibility" xmlns:p14="http://schemas.microsoft.com/office/powerpoint/2010/main" showMasterPhAnim="0" showMasterSp="0">
+<file path=ppt/notesSlides/notesSlide17.xml><?xml version="1.0" encoding="utf-8"?>
+<p:notes xmlns:a="http://schemas.openxmlformats.org/drawingml/2006/main" xmlns:r="http://schemas.openxmlformats.org/officeDocument/2006/relationships" xmlns:mc="http://schemas.openxmlformats.org/markup-compatibility/2006" xmlns:mv="urn:schemas-microsoft-com:mac:vml" xmlns:p="http://schemas.openxmlformats.org/presentationml/2006/main" xmlns:c="http://schemas.openxmlformats.org/drawingml/2006/chart" xmlns:dgm="http://schemas.openxmlformats.org/drawingml/2006/diagram" xmlns:o="urn:schemas-microsoft-com:office:office" xmlns:v="urn:schemas-microsoft-com:vml" xmlns:pvml="urn:schemas-microsoft-com:office:powerpoint" xmlns:com="http://schemas.openxmlformats.org/drawingml/2006/compatibility" xmlns:p14="http://schemas.microsoft.com/office/powerpoint/2010/main" xmlns:p15="http://schemas.microsoft.com/office/powerpoint/2012/main" showMasterPhAnim="0" showMasterSp="0">
   <p:cSld>
     <p:spTree>
       <p:nvGrpSpPr>
-        <p:cNvPr id="35" name="Shape 35"/>
+        <p:cNvPr id="119" name="Shape 119"/>
         <p:cNvGrpSpPr/>
         <p:nvPr/>
       </p:nvGrpSpPr>
@@ -1160,7 +1171,7 @@
       </p:grpSpPr>
       <p:sp>
         <p:nvSpPr>
-          <p:cNvPr id="36" name="Shape 36"/>
+          <p:cNvPr id="120" name="Shape 120"/>
           <p:cNvSpPr/>
           <p:nvPr>
             <p:ph idx="2" type="sldImg"/>
@@ -1194,7 +1205,7 @@
       </p:sp>
       <p:sp>
         <p:nvSpPr>
-          <p:cNvPr id="37" name="Shape 37"/>
+          <p:cNvPr id="121" name="Shape 121"/>
           <p:cNvSpPr txBox="1"/>
           <p:nvPr>
             <p:ph idx="1" type="body"/>
@@ -1210,7 +1221,7 @@
           </a:prstGeom>
         </p:spPr>
         <p:txBody>
-          <a:bodyPr anchorCtr="0" anchor="t" bIns="91425" lIns="91425" rIns="91425" tIns="91425">
+          <a:bodyPr anchorCtr="0" anchor="t" bIns="91425" lIns="91425" rIns="91425" wrap="square" tIns="91425">
             <a:noAutofit/>
           </a:bodyPr>
           <a:lstStyle/>
@@ -1236,12 +1247,12 @@
 </p:notes>
 </file>
 
-<file path=ppt/notesSlides/notesSlide3.xml><?xml version="1.0" encoding="utf-8"?>
-<p:notes xmlns:a="http://schemas.openxmlformats.org/drawingml/2006/main" xmlns:r="http://schemas.openxmlformats.org/officeDocument/2006/relationships" xmlns:mc="http://schemas.openxmlformats.org/markup-compatibility/2006" xmlns:mv="urn:schemas-microsoft-com:mac:vml" xmlns:p="http://schemas.openxmlformats.org/presentationml/2006/main" xmlns:c="http://schemas.openxmlformats.org/drawingml/2006/chart" xmlns:dgm="http://schemas.openxmlformats.org/drawingml/2006/diagram" xmlns:o="urn:schemas-microsoft-com:office:office" xmlns:v="urn:schemas-microsoft-com:vml" xmlns:pvml="urn:schemas-microsoft-com:office:powerpoint" xmlns:com="http://schemas.openxmlformats.org/drawingml/2006/compatibility" xmlns:p14="http://schemas.microsoft.com/office/powerpoint/2010/main" showMasterPhAnim="0" showMasterSp="0">
+<file path=ppt/notesSlides/notesSlide18.xml><?xml version="1.0" encoding="utf-8"?>
+<p:notes xmlns:a="http://schemas.openxmlformats.org/drawingml/2006/main" xmlns:r="http://schemas.openxmlformats.org/officeDocument/2006/relationships" xmlns:mc="http://schemas.openxmlformats.org/markup-compatibility/2006" xmlns:mv="urn:schemas-microsoft-com:mac:vml" xmlns:p="http://schemas.openxmlformats.org/presentationml/2006/main" xmlns:c="http://schemas.openxmlformats.org/drawingml/2006/chart" xmlns:dgm="http://schemas.openxmlformats.org/drawingml/2006/diagram" xmlns:o="urn:schemas-microsoft-com:office:office" xmlns:v="urn:schemas-microsoft-com:vml" xmlns:pvml="urn:schemas-microsoft-com:office:powerpoint" xmlns:com="http://schemas.openxmlformats.org/drawingml/2006/compatibility" xmlns:p14="http://schemas.microsoft.com/office/powerpoint/2010/main" xmlns:p15="http://schemas.microsoft.com/office/powerpoint/2012/main" showMasterPhAnim="0" showMasterSp="0">
   <p:cSld>
     <p:spTree>
       <p:nvGrpSpPr>
-        <p:cNvPr id="41" name="Shape 41"/>
+        <p:cNvPr id="125" name="Shape 125"/>
         <p:cNvGrpSpPr/>
         <p:nvPr/>
       </p:nvGrpSpPr>
@@ -1255,7 +1266,7 @@
       </p:grpSpPr>
       <p:sp>
         <p:nvSpPr>
-          <p:cNvPr id="42" name="Shape 42"/>
+          <p:cNvPr id="126" name="Shape 126"/>
           <p:cNvSpPr/>
           <p:nvPr>
             <p:ph idx="2" type="sldImg"/>
@@ -1289,7 +1300,7 @@
       </p:sp>
       <p:sp>
         <p:nvSpPr>
-          <p:cNvPr id="43" name="Shape 43"/>
+          <p:cNvPr id="127" name="Shape 127"/>
           <p:cNvSpPr txBox="1"/>
           <p:nvPr>
             <p:ph idx="1" type="body"/>
@@ -1305,7 +1316,7 @@
           </a:prstGeom>
         </p:spPr>
         <p:txBody>
-          <a:bodyPr anchorCtr="0" anchor="t" bIns="91425" lIns="91425" rIns="91425" tIns="91425">
+          <a:bodyPr anchorCtr="0" anchor="t" bIns="91425" lIns="91425" rIns="91425" wrap="square" tIns="91425">
             <a:noAutofit/>
           </a:bodyPr>
           <a:lstStyle/>
@@ -1331,12 +1342,12 @@
 </p:notes>
 </file>
 
-<file path=ppt/notesSlides/notesSlide4.xml><?xml version="1.0" encoding="utf-8"?>
-<p:notes xmlns:a="http://schemas.openxmlformats.org/drawingml/2006/main" xmlns:r="http://schemas.openxmlformats.org/officeDocument/2006/relationships" xmlns:mc="http://schemas.openxmlformats.org/markup-compatibility/2006" xmlns:mv="urn:schemas-microsoft-com:mac:vml" xmlns:p="http://schemas.openxmlformats.org/presentationml/2006/main" xmlns:c="http://schemas.openxmlformats.org/drawingml/2006/chart" xmlns:dgm="http://schemas.openxmlformats.org/drawingml/2006/diagram" xmlns:o="urn:schemas-microsoft-com:office:office" xmlns:v="urn:schemas-microsoft-com:vml" xmlns:pvml="urn:schemas-microsoft-com:office:powerpoint" xmlns:com="http://schemas.openxmlformats.org/drawingml/2006/compatibility" xmlns:p14="http://schemas.microsoft.com/office/powerpoint/2010/main" showMasterPhAnim="0" showMasterSp="0">
+<file path=ppt/notesSlides/notesSlide2.xml><?xml version="1.0" encoding="utf-8"?>
+<p:notes xmlns:a="http://schemas.openxmlformats.org/drawingml/2006/main" xmlns:r="http://schemas.openxmlformats.org/officeDocument/2006/relationships" xmlns:mc="http://schemas.openxmlformats.org/markup-compatibility/2006" xmlns:mv="urn:schemas-microsoft-com:mac:vml" xmlns:p="http://schemas.openxmlformats.org/presentationml/2006/main" xmlns:c="http://schemas.openxmlformats.org/drawingml/2006/chart" xmlns:dgm="http://schemas.openxmlformats.org/drawingml/2006/diagram" xmlns:o="urn:schemas-microsoft-com:office:office" xmlns:v="urn:schemas-microsoft-com:vml" xmlns:pvml="urn:schemas-microsoft-com:office:powerpoint" xmlns:com="http://schemas.openxmlformats.org/drawingml/2006/compatibility" xmlns:p14="http://schemas.microsoft.com/office/powerpoint/2010/main" xmlns:p15="http://schemas.microsoft.com/office/powerpoint/2012/main" showMasterPhAnim="0" showMasterSp="0">
   <p:cSld>
     <p:spTree>
       <p:nvGrpSpPr>
-        <p:cNvPr id="46" name="Shape 46"/>
+        <p:cNvPr id="35" name="Shape 35"/>
         <p:cNvGrpSpPr/>
         <p:nvPr/>
       </p:nvGrpSpPr>
@@ -1350,7 +1361,7 @@
       </p:grpSpPr>
       <p:sp>
         <p:nvSpPr>
-          <p:cNvPr id="47" name="Shape 47"/>
+          <p:cNvPr id="36" name="Shape 36"/>
           <p:cNvSpPr/>
           <p:nvPr>
             <p:ph idx="2" type="sldImg"/>
@@ -1384,7 +1395,7 @@
       </p:sp>
       <p:sp>
         <p:nvSpPr>
-          <p:cNvPr id="48" name="Shape 48"/>
+          <p:cNvPr id="37" name="Shape 37"/>
           <p:cNvSpPr txBox="1"/>
           <p:nvPr>
             <p:ph idx="1" type="body"/>
@@ -1400,7 +1411,7 @@
           </a:prstGeom>
         </p:spPr>
         <p:txBody>
-          <a:bodyPr anchorCtr="0" anchor="t" bIns="91425" lIns="91425" rIns="91425" tIns="91425">
+          <a:bodyPr anchorCtr="0" anchor="t" bIns="91425" lIns="91425" rIns="91425" wrap="square" tIns="91425">
             <a:noAutofit/>
           </a:bodyPr>
           <a:lstStyle/>
@@ -1426,12 +1437,12 @@
 </p:notes>
 </file>
 
-<file path=ppt/notesSlides/notesSlide5.xml><?xml version="1.0" encoding="utf-8"?>
-<p:notes xmlns:a="http://schemas.openxmlformats.org/drawingml/2006/main" xmlns:r="http://schemas.openxmlformats.org/officeDocument/2006/relationships" xmlns:mc="http://schemas.openxmlformats.org/markup-compatibility/2006" xmlns:mv="urn:schemas-microsoft-com:mac:vml" xmlns:p="http://schemas.openxmlformats.org/presentationml/2006/main" xmlns:c="http://schemas.openxmlformats.org/drawingml/2006/chart" xmlns:dgm="http://schemas.openxmlformats.org/drawingml/2006/diagram" xmlns:o="urn:schemas-microsoft-com:office:office" xmlns:v="urn:schemas-microsoft-com:vml" xmlns:pvml="urn:schemas-microsoft-com:office:powerpoint" xmlns:com="http://schemas.openxmlformats.org/drawingml/2006/compatibility" xmlns:p14="http://schemas.microsoft.com/office/powerpoint/2010/main" showMasterPhAnim="0" showMasterSp="0">
+<file path=ppt/notesSlides/notesSlide3.xml><?xml version="1.0" encoding="utf-8"?>
+<p:notes xmlns:a="http://schemas.openxmlformats.org/drawingml/2006/main" xmlns:r="http://schemas.openxmlformats.org/officeDocument/2006/relationships" xmlns:mc="http://schemas.openxmlformats.org/markup-compatibility/2006" xmlns:mv="urn:schemas-microsoft-com:mac:vml" xmlns:p="http://schemas.openxmlformats.org/presentationml/2006/main" xmlns:c="http://schemas.openxmlformats.org/drawingml/2006/chart" xmlns:dgm="http://schemas.openxmlformats.org/drawingml/2006/diagram" xmlns:o="urn:schemas-microsoft-com:office:office" xmlns:v="urn:schemas-microsoft-com:vml" xmlns:pvml="urn:schemas-microsoft-com:office:powerpoint" xmlns:com="http://schemas.openxmlformats.org/drawingml/2006/compatibility" xmlns:p14="http://schemas.microsoft.com/office/powerpoint/2010/main" xmlns:p15="http://schemas.microsoft.com/office/powerpoint/2012/main" showMasterPhAnim="0" showMasterSp="0">
   <p:cSld>
     <p:spTree>
       <p:nvGrpSpPr>
-        <p:cNvPr id="51" name="Shape 51"/>
+        <p:cNvPr id="41" name="Shape 41"/>
         <p:cNvGrpSpPr/>
         <p:nvPr/>
       </p:nvGrpSpPr>
@@ -1445,7 +1456,7 @@
       </p:grpSpPr>
       <p:sp>
         <p:nvSpPr>
-          <p:cNvPr id="52" name="Shape 52"/>
+          <p:cNvPr id="42" name="Shape 42"/>
           <p:cNvSpPr/>
           <p:nvPr>
             <p:ph idx="2" type="sldImg"/>
@@ -1479,7 +1490,7 @@
       </p:sp>
       <p:sp>
         <p:nvSpPr>
-          <p:cNvPr id="53" name="Shape 53"/>
+          <p:cNvPr id="43" name="Shape 43"/>
           <p:cNvSpPr txBox="1"/>
           <p:nvPr>
             <p:ph idx="1" type="body"/>
@@ -1495,7 +1506,7 @@
           </a:prstGeom>
         </p:spPr>
         <p:txBody>
-          <a:bodyPr anchorCtr="0" anchor="t" bIns="91425" lIns="91425" rIns="91425" tIns="91425">
+          <a:bodyPr anchorCtr="0" anchor="t" bIns="91425" lIns="91425" rIns="91425" wrap="square" tIns="91425">
             <a:noAutofit/>
           </a:bodyPr>
           <a:lstStyle/>
@@ -1521,12 +1532,12 @@
 </p:notes>
 </file>
 
-<file path=ppt/notesSlides/notesSlide6.xml><?xml version="1.0" encoding="utf-8"?>
-<p:notes xmlns:a="http://schemas.openxmlformats.org/drawingml/2006/main" xmlns:r="http://schemas.openxmlformats.org/officeDocument/2006/relationships" xmlns:mc="http://schemas.openxmlformats.org/markup-compatibility/2006" xmlns:mv="urn:schemas-microsoft-com:mac:vml" xmlns:p="http://schemas.openxmlformats.org/presentationml/2006/main" xmlns:c="http://schemas.openxmlformats.org/drawingml/2006/chart" xmlns:dgm="http://schemas.openxmlformats.org/drawingml/2006/diagram" xmlns:o="urn:schemas-microsoft-com:office:office" xmlns:v="urn:schemas-microsoft-com:vml" xmlns:pvml="urn:schemas-microsoft-com:office:powerpoint" xmlns:com="http://schemas.openxmlformats.org/drawingml/2006/compatibility" xmlns:p14="http://schemas.microsoft.com/office/powerpoint/2010/main" showMasterPhAnim="0" showMasterSp="0">
+<file path=ppt/notesSlides/notesSlide4.xml><?xml version="1.0" encoding="utf-8"?>
+<p:notes xmlns:a="http://schemas.openxmlformats.org/drawingml/2006/main" xmlns:r="http://schemas.openxmlformats.org/officeDocument/2006/relationships" xmlns:mc="http://schemas.openxmlformats.org/markup-compatibility/2006" xmlns:mv="urn:schemas-microsoft-com:mac:vml" xmlns:p="http://schemas.openxmlformats.org/presentationml/2006/main" xmlns:c="http://schemas.openxmlformats.org/drawingml/2006/chart" xmlns:dgm="http://schemas.openxmlformats.org/drawingml/2006/diagram" xmlns:o="urn:schemas-microsoft-com:office:office" xmlns:v="urn:schemas-microsoft-com:vml" xmlns:pvml="urn:schemas-microsoft-com:office:powerpoint" xmlns:com="http://schemas.openxmlformats.org/drawingml/2006/compatibility" xmlns:p14="http://schemas.microsoft.com/office/powerpoint/2010/main" xmlns:p15="http://schemas.microsoft.com/office/powerpoint/2012/main" showMasterPhAnim="0" showMasterSp="0">
   <p:cSld>
     <p:spTree>
       <p:nvGrpSpPr>
-        <p:cNvPr id="56" name="Shape 56"/>
+        <p:cNvPr id="46" name="Shape 46"/>
         <p:cNvGrpSpPr/>
         <p:nvPr/>
       </p:nvGrpSpPr>
@@ -1540,7 +1551,7 @@
       </p:grpSpPr>
       <p:sp>
         <p:nvSpPr>
-          <p:cNvPr id="57" name="Shape 57"/>
+          <p:cNvPr id="47" name="Shape 47"/>
           <p:cNvSpPr/>
           <p:nvPr>
             <p:ph idx="2" type="sldImg"/>
@@ -1574,7 +1585,7 @@
       </p:sp>
       <p:sp>
         <p:nvSpPr>
-          <p:cNvPr id="58" name="Shape 58"/>
+          <p:cNvPr id="48" name="Shape 48"/>
           <p:cNvSpPr txBox="1"/>
           <p:nvPr>
             <p:ph idx="1" type="body"/>
@@ -1590,12 +1601,12 @@
           </a:prstGeom>
         </p:spPr>
         <p:txBody>
-          <a:bodyPr anchorCtr="0" anchor="t" bIns="91425" lIns="91425" rIns="91425" tIns="91425">
+          <a:bodyPr anchorCtr="0" anchor="t" bIns="91425" lIns="91425" rIns="91425" wrap="square" tIns="91425">
             <a:noAutofit/>
           </a:bodyPr>
           <a:lstStyle/>
           <a:p>
-            <a:pPr lvl="0">
+            <a:pPr lvl="0" rtl="0">
               <a:spcBef>
                 <a:spcPts val="0"/>
               </a:spcBef>
@@ -1616,12 +1627,12 @@
 </p:notes>
 </file>
 
-<file path=ppt/notesSlides/notesSlide7.xml><?xml version="1.0" encoding="utf-8"?>
-<p:notes xmlns:a="http://schemas.openxmlformats.org/drawingml/2006/main" xmlns:r="http://schemas.openxmlformats.org/officeDocument/2006/relationships" xmlns:mc="http://schemas.openxmlformats.org/markup-compatibility/2006" xmlns:mv="urn:schemas-microsoft-com:mac:vml" xmlns:p="http://schemas.openxmlformats.org/presentationml/2006/main" xmlns:c="http://schemas.openxmlformats.org/drawingml/2006/chart" xmlns:dgm="http://schemas.openxmlformats.org/drawingml/2006/diagram" xmlns:o="urn:schemas-microsoft-com:office:office" xmlns:v="urn:schemas-microsoft-com:vml" xmlns:pvml="urn:schemas-microsoft-com:office:powerpoint" xmlns:com="http://schemas.openxmlformats.org/drawingml/2006/compatibility" xmlns:p14="http://schemas.microsoft.com/office/powerpoint/2010/main" showMasterPhAnim="0" showMasterSp="0">
+<file path=ppt/notesSlides/notesSlide5.xml><?xml version="1.0" encoding="utf-8"?>
+<p:notes xmlns:a="http://schemas.openxmlformats.org/drawingml/2006/main" xmlns:r="http://schemas.openxmlformats.org/officeDocument/2006/relationships" xmlns:mc="http://schemas.openxmlformats.org/markup-compatibility/2006" xmlns:mv="urn:schemas-microsoft-com:mac:vml" xmlns:p="http://schemas.openxmlformats.org/presentationml/2006/main" xmlns:c="http://schemas.openxmlformats.org/drawingml/2006/chart" xmlns:dgm="http://schemas.openxmlformats.org/drawingml/2006/diagram" xmlns:o="urn:schemas-microsoft-com:office:office" xmlns:v="urn:schemas-microsoft-com:vml" xmlns:pvml="urn:schemas-microsoft-com:office:powerpoint" xmlns:com="http://schemas.openxmlformats.org/drawingml/2006/compatibility" xmlns:p14="http://schemas.microsoft.com/office/powerpoint/2010/main" xmlns:p15="http://schemas.microsoft.com/office/powerpoint/2012/main" showMasterPhAnim="0" showMasterSp="0">
   <p:cSld>
     <p:spTree>
       <p:nvGrpSpPr>
-        <p:cNvPr id="61" name="Shape 61"/>
+        <p:cNvPr id="51" name="Shape 51"/>
         <p:cNvGrpSpPr/>
         <p:nvPr/>
       </p:nvGrpSpPr>
@@ -1635,7 +1646,7 @@
       </p:grpSpPr>
       <p:sp>
         <p:nvSpPr>
-          <p:cNvPr id="62" name="Shape 62"/>
+          <p:cNvPr id="52" name="Shape 52"/>
           <p:cNvSpPr/>
           <p:nvPr>
             <p:ph idx="2" type="sldImg"/>
@@ -1669,7 +1680,7 @@
       </p:sp>
       <p:sp>
         <p:nvSpPr>
-          <p:cNvPr id="63" name="Shape 63"/>
+          <p:cNvPr id="53" name="Shape 53"/>
           <p:cNvSpPr txBox="1"/>
           <p:nvPr>
             <p:ph idx="1" type="body"/>
@@ -1685,7 +1696,7 @@
           </a:prstGeom>
         </p:spPr>
         <p:txBody>
-          <a:bodyPr anchorCtr="0" anchor="t" bIns="91425" lIns="91425" rIns="91425" tIns="91425">
+          <a:bodyPr anchorCtr="0" anchor="t" bIns="91425" lIns="91425" rIns="91425" wrap="square" tIns="91425">
             <a:noAutofit/>
           </a:bodyPr>
           <a:lstStyle/>
@@ -1711,12 +1722,12 @@
 </p:notes>
 </file>
 
-<file path=ppt/notesSlides/notesSlide8.xml><?xml version="1.0" encoding="utf-8"?>
-<p:notes xmlns:a="http://schemas.openxmlformats.org/drawingml/2006/main" xmlns:r="http://schemas.openxmlformats.org/officeDocument/2006/relationships" xmlns:mc="http://schemas.openxmlformats.org/markup-compatibility/2006" xmlns:mv="urn:schemas-microsoft-com:mac:vml" xmlns:p="http://schemas.openxmlformats.org/presentationml/2006/main" xmlns:c="http://schemas.openxmlformats.org/drawingml/2006/chart" xmlns:dgm="http://schemas.openxmlformats.org/drawingml/2006/diagram" xmlns:o="urn:schemas-microsoft-com:office:office" xmlns:v="urn:schemas-microsoft-com:vml" xmlns:pvml="urn:schemas-microsoft-com:office:powerpoint" xmlns:com="http://schemas.openxmlformats.org/drawingml/2006/compatibility" xmlns:p14="http://schemas.microsoft.com/office/powerpoint/2010/main" showMasterPhAnim="0" showMasterSp="0">
+<file path=ppt/notesSlides/notesSlide6.xml><?xml version="1.0" encoding="utf-8"?>
+<p:notes xmlns:a="http://schemas.openxmlformats.org/drawingml/2006/main" xmlns:r="http://schemas.openxmlformats.org/officeDocument/2006/relationships" xmlns:mc="http://schemas.openxmlformats.org/markup-compatibility/2006" xmlns:mv="urn:schemas-microsoft-com:mac:vml" xmlns:p="http://schemas.openxmlformats.org/presentationml/2006/main" xmlns:c="http://schemas.openxmlformats.org/drawingml/2006/chart" xmlns:dgm="http://schemas.openxmlformats.org/drawingml/2006/diagram" xmlns:o="urn:schemas-microsoft-com:office:office" xmlns:v="urn:schemas-microsoft-com:vml" xmlns:pvml="urn:schemas-microsoft-com:office:powerpoint" xmlns:com="http://schemas.openxmlformats.org/drawingml/2006/compatibility" xmlns:p14="http://schemas.microsoft.com/office/powerpoint/2010/main" xmlns:p15="http://schemas.microsoft.com/office/powerpoint/2012/main" showMasterPhAnim="0" showMasterSp="0">
   <p:cSld>
     <p:spTree>
       <p:nvGrpSpPr>
-        <p:cNvPr id="65" name="Shape 65"/>
+        <p:cNvPr id="56" name="Shape 56"/>
         <p:cNvGrpSpPr/>
         <p:nvPr/>
       </p:nvGrpSpPr>
@@ -1730,7 +1741,7 @@
       </p:grpSpPr>
       <p:sp>
         <p:nvSpPr>
-          <p:cNvPr id="66" name="Shape 66"/>
+          <p:cNvPr id="57" name="Shape 57"/>
           <p:cNvSpPr/>
           <p:nvPr>
             <p:ph idx="2" type="sldImg"/>
@@ -1764,7 +1775,7 @@
       </p:sp>
       <p:sp>
         <p:nvSpPr>
-          <p:cNvPr id="67" name="Shape 67"/>
+          <p:cNvPr id="58" name="Shape 58"/>
           <p:cNvSpPr txBox="1"/>
           <p:nvPr>
             <p:ph idx="1" type="body"/>
@@ -1780,7 +1791,7 @@
           </a:prstGeom>
         </p:spPr>
         <p:txBody>
-          <a:bodyPr anchorCtr="0" anchor="t" bIns="91425" lIns="91425" rIns="91425" tIns="91425">
+          <a:bodyPr anchorCtr="0" anchor="t" bIns="91425" lIns="91425" rIns="91425" wrap="square" tIns="91425">
             <a:noAutofit/>
           </a:bodyPr>
           <a:lstStyle/>
@@ -1806,12 +1817,12 @@
 </p:notes>
 </file>
 
-<file path=ppt/notesSlides/notesSlide9.xml><?xml version="1.0" encoding="utf-8"?>
-<p:notes xmlns:a="http://schemas.openxmlformats.org/drawingml/2006/main" xmlns:r="http://schemas.openxmlformats.org/officeDocument/2006/relationships" xmlns:mc="http://schemas.openxmlformats.org/markup-compatibility/2006" xmlns:mv="urn:schemas-microsoft-com:mac:vml" xmlns:p="http://schemas.openxmlformats.org/presentationml/2006/main" xmlns:c="http://schemas.openxmlformats.org/drawingml/2006/chart" xmlns:dgm="http://schemas.openxmlformats.org/drawingml/2006/diagram" xmlns:o="urn:schemas-microsoft-com:office:office" xmlns:v="urn:schemas-microsoft-com:vml" xmlns:pvml="urn:schemas-microsoft-com:office:powerpoint" xmlns:com="http://schemas.openxmlformats.org/drawingml/2006/compatibility" xmlns:p14="http://schemas.microsoft.com/office/powerpoint/2010/main" showMasterPhAnim="0" showMasterSp="0">
+<file path=ppt/notesSlides/notesSlide7.xml><?xml version="1.0" encoding="utf-8"?>
+<p:notes xmlns:a="http://schemas.openxmlformats.org/drawingml/2006/main" xmlns:r="http://schemas.openxmlformats.org/officeDocument/2006/relationships" xmlns:mc="http://schemas.openxmlformats.org/markup-compatibility/2006" xmlns:mv="urn:schemas-microsoft-com:mac:vml" xmlns:p="http://schemas.openxmlformats.org/presentationml/2006/main" xmlns:c="http://schemas.openxmlformats.org/drawingml/2006/chart" xmlns:dgm="http://schemas.openxmlformats.org/drawingml/2006/diagram" xmlns:o="urn:schemas-microsoft-com:office:office" xmlns:v="urn:schemas-microsoft-com:vml" xmlns:pvml="urn:schemas-microsoft-com:office:powerpoint" xmlns:com="http://schemas.openxmlformats.org/drawingml/2006/compatibility" xmlns:p14="http://schemas.microsoft.com/office/powerpoint/2010/main" xmlns:p15="http://schemas.microsoft.com/office/powerpoint/2012/main" showMasterPhAnim="0" showMasterSp="0">
   <p:cSld>
     <p:spTree>
       <p:nvGrpSpPr>
-        <p:cNvPr id="71" name="Shape 71"/>
+        <p:cNvPr id="61" name="Shape 61"/>
         <p:cNvGrpSpPr/>
         <p:nvPr/>
       </p:nvGrpSpPr>
@@ -1825,7 +1836,7 @@
       </p:grpSpPr>
       <p:sp>
         <p:nvSpPr>
-          <p:cNvPr id="72" name="Shape 72"/>
+          <p:cNvPr id="62" name="Shape 62"/>
           <p:cNvSpPr/>
           <p:nvPr>
             <p:ph idx="2" type="sldImg"/>
@@ -1859,7 +1870,7 @@
       </p:sp>
       <p:sp>
         <p:nvSpPr>
-          <p:cNvPr id="73" name="Shape 73"/>
+          <p:cNvPr id="63" name="Shape 63"/>
           <p:cNvSpPr txBox="1"/>
           <p:nvPr>
             <p:ph idx="1" type="body"/>
@@ -1875,7 +1886,197 @@
           </a:prstGeom>
         </p:spPr>
         <p:txBody>
-          <a:bodyPr anchorCtr="0" anchor="t" bIns="91425" lIns="91425" rIns="91425" tIns="91425">
+          <a:bodyPr anchorCtr="0" anchor="t" bIns="91425" lIns="91425" rIns="91425" wrap="square" tIns="91425">
+            <a:noAutofit/>
+          </a:bodyPr>
+          <a:lstStyle/>
+          <a:p>
+            <a:pPr lvl="0">
+              <a:spcBef>
+                <a:spcPts val="0"/>
+              </a:spcBef>
+              <a:buNone/>
+            </a:pPr>
+            <a:r>
+              <a:t/>
+            </a:r>
+            <a:endParaRPr/>
+          </a:p>
+        </p:txBody>
+      </p:sp>
+    </p:spTree>
+  </p:cSld>
+  <p:clrMapOvr>
+    <a:masterClrMapping/>
+  </p:clrMapOvr>
+</p:notes>
+</file>
+
+<file path=ppt/notesSlides/notesSlide8.xml><?xml version="1.0" encoding="utf-8"?>
+<p:notes xmlns:a="http://schemas.openxmlformats.org/drawingml/2006/main" xmlns:r="http://schemas.openxmlformats.org/officeDocument/2006/relationships" xmlns:mc="http://schemas.openxmlformats.org/markup-compatibility/2006" xmlns:mv="urn:schemas-microsoft-com:mac:vml" xmlns:p="http://schemas.openxmlformats.org/presentationml/2006/main" xmlns:c="http://schemas.openxmlformats.org/drawingml/2006/chart" xmlns:dgm="http://schemas.openxmlformats.org/drawingml/2006/diagram" xmlns:o="urn:schemas-microsoft-com:office:office" xmlns:v="urn:schemas-microsoft-com:vml" xmlns:pvml="urn:schemas-microsoft-com:office:powerpoint" xmlns:com="http://schemas.openxmlformats.org/drawingml/2006/compatibility" xmlns:p14="http://schemas.microsoft.com/office/powerpoint/2010/main" xmlns:p15="http://schemas.microsoft.com/office/powerpoint/2012/main" showMasterPhAnim="0" showMasterSp="0">
+  <p:cSld>
+    <p:spTree>
+      <p:nvGrpSpPr>
+        <p:cNvPr id="67" name="Shape 67"/>
+        <p:cNvGrpSpPr/>
+        <p:nvPr/>
+      </p:nvGrpSpPr>
+      <p:grpSpPr>
+        <a:xfrm>
+          <a:off x="0" y="0"/>
+          <a:ext cx="0" cy="0"/>
+          <a:chOff x="0" y="0"/>
+          <a:chExt cx="0" cy="0"/>
+        </a:xfrm>
+      </p:grpSpPr>
+      <p:sp>
+        <p:nvSpPr>
+          <p:cNvPr id="68" name="Shape 68"/>
+          <p:cNvSpPr/>
+          <p:nvPr>
+            <p:ph idx="2" type="sldImg"/>
+          </p:nvPr>
+        </p:nvSpPr>
+        <p:spPr>
+          <a:xfrm>
+            <a:off x="1143225" y="685800"/>
+            <a:ext cx="4572300" cy="3429000"/>
+          </a:xfrm>
+          <a:custGeom>
+            <a:pathLst>
+              <a:path extrusionOk="0" h="120000" w="120000">
+                <a:moveTo>
+                  <a:pt x="0" y="0"/>
+                </a:moveTo>
+                <a:lnTo>
+                  <a:pt x="120000" y="0"/>
+                </a:lnTo>
+                <a:lnTo>
+                  <a:pt x="120000" y="120000"/>
+                </a:lnTo>
+                <a:lnTo>
+                  <a:pt x="0" y="120000"/>
+                </a:lnTo>
+                <a:close/>
+              </a:path>
+            </a:pathLst>
+          </a:custGeom>
+        </p:spPr>
+      </p:sp>
+      <p:sp>
+        <p:nvSpPr>
+          <p:cNvPr id="69" name="Shape 69"/>
+          <p:cNvSpPr txBox="1"/>
+          <p:nvPr>
+            <p:ph idx="1" type="body"/>
+          </p:nvPr>
+        </p:nvSpPr>
+        <p:spPr>
+          <a:xfrm>
+            <a:off x="685800" y="4343400"/>
+            <a:ext cx="5486400" cy="4114800"/>
+          </a:xfrm>
+          <a:prstGeom prst="rect">
+            <a:avLst/>
+          </a:prstGeom>
+        </p:spPr>
+        <p:txBody>
+          <a:bodyPr anchorCtr="0" anchor="t" bIns="91425" lIns="91425" rIns="91425" wrap="square" tIns="91425">
+            <a:noAutofit/>
+          </a:bodyPr>
+          <a:lstStyle/>
+          <a:p>
+            <a:pPr lvl="0">
+              <a:spcBef>
+                <a:spcPts val="0"/>
+              </a:spcBef>
+              <a:buNone/>
+            </a:pPr>
+            <a:r>
+              <a:t/>
+            </a:r>
+            <a:endParaRPr/>
+          </a:p>
+        </p:txBody>
+      </p:sp>
+    </p:spTree>
+  </p:cSld>
+  <p:clrMapOvr>
+    <a:masterClrMapping/>
+  </p:clrMapOvr>
+</p:notes>
+</file>
+
+<file path=ppt/notesSlides/notesSlide9.xml><?xml version="1.0" encoding="utf-8"?>
+<p:notes xmlns:a="http://schemas.openxmlformats.org/drawingml/2006/main" xmlns:r="http://schemas.openxmlformats.org/officeDocument/2006/relationships" xmlns:mc="http://schemas.openxmlformats.org/markup-compatibility/2006" xmlns:mv="urn:schemas-microsoft-com:mac:vml" xmlns:p="http://schemas.openxmlformats.org/presentationml/2006/main" xmlns:c="http://schemas.openxmlformats.org/drawingml/2006/chart" xmlns:dgm="http://schemas.openxmlformats.org/drawingml/2006/diagram" xmlns:o="urn:schemas-microsoft-com:office:office" xmlns:v="urn:schemas-microsoft-com:vml" xmlns:pvml="urn:schemas-microsoft-com:office:powerpoint" xmlns:com="http://schemas.openxmlformats.org/drawingml/2006/compatibility" xmlns:p14="http://schemas.microsoft.com/office/powerpoint/2010/main" xmlns:p15="http://schemas.microsoft.com/office/powerpoint/2012/main" showMasterPhAnim="0" showMasterSp="0">
+  <p:cSld>
+    <p:spTree>
+      <p:nvGrpSpPr>
+        <p:cNvPr id="74" name="Shape 74"/>
+        <p:cNvGrpSpPr/>
+        <p:nvPr/>
+      </p:nvGrpSpPr>
+      <p:grpSpPr>
+        <a:xfrm>
+          <a:off x="0" y="0"/>
+          <a:ext cx="0" cy="0"/>
+          <a:chOff x="0" y="0"/>
+          <a:chExt cx="0" cy="0"/>
+        </a:xfrm>
+      </p:grpSpPr>
+      <p:sp>
+        <p:nvSpPr>
+          <p:cNvPr id="75" name="Shape 75"/>
+          <p:cNvSpPr/>
+          <p:nvPr>
+            <p:ph idx="2" type="sldImg"/>
+          </p:nvPr>
+        </p:nvSpPr>
+        <p:spPr>
+          <a:xfrm>
+            <a:off x="1143225" y="685800"/>
+            <a:ext cx="4572300" cy="3429000"/>
+          </a:xfrm>
+          <a:custGeom>
+            <a:pathLst>
+              <a:path extrusionOk="0" h="120000" w="120000">
+                <a:moveTo>
+                  <a:pt x="0" y="0"/>
+                </a:moveTo>
+                <a:lnTo>
+                  <a:pt x="120000" y="0"/>
+                </a:lnTo>
+                <a:lnTo>
+                  <a:pt x="120000" y="120000"/>
+                </a:lnTo>
+                <a:lnTo>
+                  <a:pt x="0" y="120000"/>
+                </a:lnTo>
+                <a:close/>
+              </a:path>
+            </a:pathLst>
+          </a:custGeom>
+        </p:spPr>
+      </p:sp>
+      <p:sp>
+        <p:nvSpPr>
+          <p:cNvPr id="76" name="Shape 76"/>
+          <p:cNvSpPr txBox="1"/>
+          <p:nvPr>
+            <p:ph idx="1" type="body"/>
+          </p:nvPr>
+        </p:nvSpPr>
+        <p:spPr>
+          <a:xfrm>
+            <a:off x="685800" y="4343400"/>
+            <a:ext cx="5486400" cy="4114800"/>
+          </a:xfrm>
+          <a:prstGeom prst="rect">
+            <a:avLst/>
+          </a:prstGeom>
+        </p:spPr>
+        <p:txBody>
+          <a:bodyPr anchorCtr="0" anchor="t" bIns="91425" lIns="91425" rIns="91425" wrap="square" tIns="91425">
             <a:noAutofit/>
           </a:bodyPr>
           <a:lstStyle/>
@@ -1902,7 +2103,7 @@
 </file>
 
 <file path=ppt/slideLayouts/slideLayout1.xml><?xml version="1.0" encoding="utf-8"?>
-<p:sldLayout xmlns:a="http://schemas.openxmlformats.org/drawingml/2006/main" xmlns:r="http://schemas.openxmlformats.org/officeDocument/2006/relationships" xmlns:mc="http://schemas.openxmlformats.org/markup-compatibility/2006" xmlns:mv="urn:schemas-microsoft-com:mac:vml" xmlns:p="http://schemas.openxmlformats.org/presentationml/2006/main" xmlns:c="http://schemas.openxmlformats.org/drawingml/2006/chart" xmlns:dgm="http://schemas.openxmlformats.org/drawingml/2006/diagram" xmlns:o="urn:schemas-microsoft-com:office:office" xmlns:v="urn:schemas-microsoft-com:vml" xmlns:pvml="urn:schemas-microsoft-com:office:powerpoint" xmlns:com="http://schemas.openxmlformats.org/drawingml/2006/compatibility" xmlns:p14="http://schemas.microsoft.com/office/powerpoint/2010/main" type="title">
+<p:sldLayout xmlns:a="http://schemas.openxmlformats.org/drawingml/2006/main" xmlns:r="http://schemas.openxmlformats.org/officeDocument/2006/relationships" xmlns:mc="http://schemas.openxmlformats.org/markup-compatibility/2006" xmlns:mv="urn:schemas-microsoft-com:mac:vml" xmlns:p="http://schemas.openxmlformats.org/presentationml/2006/main" xmlns:c="http://schemas.openxmlformats.org/drawingml/2006/chart" xmlns:dgm="http://schemas.openxmlformats.org/drawingml/2006/diagram" xmlns:o="urn:schemas-microsoft-com:office:office" xmlns:v="urn:schemas-microsoft-com:vml" xmlns:pvml="urn:schemas-microsoft-com:office:powerpoint" xmlns:com="http://schemas.openxmlformats.org/drawingml/2006/compatibility" xmlns:p14="http://schemas.microsoft.com/office/powerpoint/2010/main" xmlns:p15="http://schemas.microsoft.com/office/powerpoint/2012/main" type="title">
   <p:cSld name="Title slide">
     <p:spTree>
       <p:nvGrpSpPr>
@@ -1926,8 +2127,8 @@
         </p:nvSpPr>
         <p:spPr>
           <a:xfrm flipH="1" rot="10800000">
-            <a:off x="0" y="4124512"/>
-            <a:ext cx="8458200" cy="949799"/>
+            <a:off x="0" y="4124513"/>
+            <a:ext cx="8458200" cy="949800"/>
           </a:xfrm>
           <a:prstGeom prst="rect">
             <a:avLst/>
@@ -1940,7 +2141,7 @@
           </a:ln>
         </p:spPr>
         <p:txBody>
-          <a:bodyPr anchorCtr="0" anchor="ctr" bIns="45700" lIns="91425" rIns="91425" tIns="45700">
+          <a:bodyPr anchorCtr="0" anchor="ctr" bIns="45700" lIns="91425" rIns="91425" wrap="square" tIns="45700">
             <a:noAutofit/>
           </a:bodyPr>
           <a:lstStyle/>
@@ -1968,8 +2169,8 @@
         </p:nvSpPr>
         <p:spPr>
           <a:xfrm>
-            <a:off x="685800" y="1734342"/>
-            <a:ext cx="7772400" cy="2245499"/>
+            <a:off x="685800" y="1734343"/>
+            <a:ext cx="7772400" cy="2245500"/>
           </a:xfrm>
           <a:prstGeom prst="rect">
             <a:avLst/>
@@ -1980,7 +2181,7 @@
           </a:ln>
         </p:spPr>
         <p:txBody>
-          <a:bodyPr anchorCtr="0" anchor="b" bIns="91425" lIns="91425" rIns="91425" tIns="91425"/>
+          <a:bodyPr anchorCtr="0" anchor="b" bIns="91425" lIns="91425" rIns="91425" wrap="square" tIns="91425"/>
           <a:lstStyle>
             <a:lvl1pPr lvl="0" rtl="0" algn="l">
               <a:spcBef>
@@ -2177,7 +2378,7 @@
         <p:spPr>
           <a:xfrm>
             <a:off x="685800" y="4124476"/>
-            <a:ext cx="7772400" cy="949799"/>
+            <a:ext cx="7772400" cy="949800"/>
           </a:xfrm>
           <a:prstGeom prst="rect">
             <a:avLst/>
@@ -2188,7 +2389,7 @@
           </a:ln>
         </p:spPr>
         <p:txBody>
-          <a:bodyPr anchorCtr="0" anchor="ctr" bIns="91425" lIns="91425" rIns="91425" tIns="91425"/>
+          <a:bodyPr anchorCtr="0" anchor="ctr" bIns="91425" lIns="91425" rIns="91425" wrap="square" tIns="91425"/>
           <a:lstStyle>
             <a:lvl1pPr lvl="0" rtl="0" algn="l">
               <a:spcBef>
@@ -2383,7 +2584,7 @@
 </file>
 
 <file path=ppt/slideLayouts/slideLayout2.xml><?xml version="1.0" encoding="utf-8"?>
-<p:sldLayout xmlns:a="http://schemas.openxmlformats.org/drawingml/2006/main" xmlns:r="http://schemas.openxmlformats.org/officeDocument/2006/relationships" xmlns:mc="http://schemas.openxmlformats.org/markup-compatibility/2006" xmlns:mv="urn:schemas-microsoft-com:mac:vml" xmlns:p="http://schemas.openxmlformats.org/presentationml/2006/main" xmlns:c="http://schemas.openxmlformats.org/drawingml/2006/chart" xmlns:dgm="http://schemas.openxmlformats.org/drawingml/2006/diagram" xmlns:o="urn:schemas-microsoft-com:office:office" xmlns:v="urn:schemas-microsoft-com:vml" xmlns:pvml="urn:schemas-microsoft-com:office:powerpoint" xmlns:com="http://schemas.openxmlformats.org/drawingml/2006/compatibility" xmlns:p14="http://schemas.microsoft.com/office/powerpoint/2010/main" type="tx">
+<p:sldLayout xmlns:a="http://schemas.openxmlformats.org/drawingml/2006/main" xmlns:r="http://schemas.openxmlformats.org/officeDocument/2006/relationships" xmlns:mc="http://schemas.openxmlformats.org/markup-compatibility/2006" xmlns:mv="urn:schemas-microsoft-com:mac:vml" xmlns:p="http://schemas.openxmlformats.org/presentationml/2006/main" xmlns:c="http://schemas.openxmlformats.org/drawingml/2006/chart" xmlns:dgm="http://schemas.openxmlformats.org/drawingml/2006/diagram" xmlns:o="urn:schemas-microsoft-com:office:office" xmlns:v="urn:schemas-microsoft-com:vml" xmlns:pvml="urn:schemas-microsoft-com:office:powerpoint" xmlns:com="http://schemas.openxmlformats.org/drawingml/2006/compatibility" xmlns:p14="http://schemas.microsoft.com/office/powerpoint/2010/main" xmlns:p15="http://schemas.microsoft.com/office/powerpoint/2012/main" type="tx">
   <p:cSld name="Title and body">
     <p:spTree>
       <p:nvGrpSpPr>
@@ -2421,7 +2622,7 @@
           </a:ln>
         </p:spPr>
         <p:txBody>
-          <a:bodyPr anchorCtr="0" anchor="ctr" bIns="45700" lIns="91425" rIns="91425" tIns="45700">
+          <a:bodyPr anchorCtr="0" anchor="ctr" bIns="45700" lIns="91425" rIns="91425" wrap="square" tIns="45700">
             <a:noAutofit/>
           </a:bodyPr>
           <a:lstStyle/>
@@ -2450,7 +2651,7 @@
         <p:spPr>
           <a:xfrm>
             <a:off x="457200" y="274637"/>
-            <a:ext cx="8229600" cy="1522199"/>
+            <a:ext cx="8229600" cy="1522200"/>
           </a:xfrm>
           <a:prstGeom prst="rect">
             <a:avLst/>
@@ -2461,7 +2662,7 @@
           </a:ln>
         </p:spPr>
         <p:txBody>
-          <a:bodyPr anchorCtr="0" anchor="b" bIns="91425" lIns="91425" rIns="91425" tIns="91425"/>
+          <a:bodyPr anchorCtr="0" anchor="b" bIns="91425" lIns="91425" rIns="91425" wrap="square" tIns="91425"/>
           <a:lstStyle>
             <a:lvl1pPr lvl="0" rtl="0">
               <a:spcBef>
@@ -2568,7 +2769,7 @@
         <p:spPr>
           <a:xfrm>
             <a:off x="457200" y="1947332"/>
-            <a:ext cx="8229600" cy="4620299"/>
+            <a:ext cx="8229600" cy="4620300"/>
           </a:xfrm>
           <a:prstGeom prst="rect">
             <a:avLst/>
@@ -2579,7 +2780,7 @@
           </a:ln>
         </p:spPr>
         <p:txBody>
-          <a:bodyPr anchorCtr="0" anchor="t" bIns="91425" lIns="91425" rIns="91425" tIns="91425"/>
+          <a:bodyPr anchorCtr="0" anchor="t" bIns="91425" lIns="91425" rIns="91425" wrap="square" tIns="91425"/>
           <a:lstStyle>
             <a:lvl1pPr lvl="0" rtl="0">
               <a:spcBef>
@@ -2648,7 +2849,7 @@
 </file>
 
 <file path=ppt/slideLayouts/slideLayout3.xml><?xml version="1.0" encoding="utf-8"?>
-<p:sldLayout xmlns:a="http://schemas.openxmlformats.org/drawingml/2006/main" xmlns:r="http://schemas.openxmlformats.org/officeDocument/2006/relationships" xmlns:mc="http://schemas.openxmlformats.org/markup-compatibility/2006" xmlns:mv="urn:schemas-microsoft-com:mac:vml" xmlns:p="http://schemas.openxmlformats.org/presentationml/2006/main" xmlns:c="http://schemas.openxmlformats.org/drawingml/2006/chart" xmlns:dgm="http://schemas.openxmlformats.org/drawingml/2006/diagram" xmlns:o="urn:schemas-microsoft-com:office:office" xmlns:v="urn:schemas-microsoft-com:vml" xmlns:pvml="urn:schemas-microsoft-com:office:powerpoint" xmlns:com="http://schemas.openxmlformats.org/drawingml/2006/compatibility" xmlns:p14="http://schemas.microsoft.com/office/powerpoint/2010/main" type="twoColTx">
+<p:sldLayout xmlns:a="http://schemas.openxmlformats.org/drawingml/2006/main" xmlns:r="http://schemas.openxmlformats.org/officeDocument/2006/relationships" xmlns:mc="http://schemas.openxmlformats.org/markup-compatibility/2006" xmlns:mv="urn:schemas-microsoft-com:mac:vml" xmlns:p="http://schemas.openxmlformats.org/presentationml/2006/main" xmlns:c="http://schemas.openxmlformats.org/drawingml/2006/chart" xmlns:dgm="http://schemas.openxmlformats.org/drawingml/2006/diagram" xmlns:o="urn:schemas-microsoft-com:office:office" xmlns:v="urn:schemas-microsoft-com:vml" xmlns:pvml="urn:schemas-microsoft-com:office:powerpoint" xmlns:com="http://schemas.openxmlformats.org/drawingml/2006/compatibility" xmlns:p14="http://schemas.microsoft.com/office/powerpoint/2010/main" xmlns:p15="http://schemas.microsoft.com/office/powerpoint/2012/main" type="twoColTx">
   <p:cSld name="Title and two columns">
     <p:spTree>
       <p:nvGrpSpPr>
@@ -2686,7 +2887,7 @@
           </a:ln>
         </p:spPr>
         <p:txBody>
-          <a:bodyPr anchorCtr="0" anchor="ctr" bIns="45700" lIns="91425" rIns="91425" tIns="45700">
+          <a:bodyPr anchorCtr="0" anchor="ctr" bIns="45700" lIns="91425" rIns="91425" wrap="square" tIns="45700">
             <a:noAutofit/>
           </a:bodyPr>
           <a:lstStyle/>
@@ -2715,7 +2916,7 @@
         <p:spPr>
           <a:xfrm>
             <a:off x="457200" y="274637"/>
-            <a:ext cx="8229600" cy="1522199"/>
+            <a:ext cx="8229600" cy="1522200"/>
           </a:xfrm>
           <a:prstGeom prst="rect">
             <a:avLst/>
@@ -2726,7 +2927,7 @@
           </a:ln>
         </p:spPr>
         <p:txBody>
-          <a:bodyPr anchorCtr="0" anchor="b" bIns="91425" lIns="91425" rIns="91425" tIns="91425"/>
+          <a:bodyPr anchorCtr="0" anchor="b" bIns="91425" lIns="91425" rIns="91425" wrap="square" tIns="91425"/>
           <a:lstStyle>
             <a:lvl1pPr lvl="0" rtl="0" algn="l">
               <a:spcBef>
@@ -2896,7 +3097,7 @@
         <p:spPr>
           <a:xfrm>
             <a:off x="457200" y="1947332"/>
-            <a:ext cx="4030200" cy="4620299"/>
+            <a:ext cx="4030200" cy="4620300"/>
           </a:xfrm>
           <a:prstGeom prst="rect">
             <a:avLst/>
@@ -2907,7 +3108,7 @@
           </a:ln>
         </p:spPr>
         <p:txBody>
-          <a:bodyPr anchorCtr="0" anchor="t" bIns="91425" lIns="91425" rIns="91425" tIns="91425"/>
+          <a:bodyPr anchorCtr="0" anchor="t" bIns="91425" lIns="91425" rIns="91425" wrap="square" tIns="91425"/>
           <a:lstStyle>
             <a:lvl1pPr lvl="0" rtl="0">
               <a:spcBef>
@@ -2977,8 +3178,8 @@
         </p:nvSpPr>
         <p:spPr>
           <a:xfrm>
-            <a:off x="4656667" y="1949211"/>
-            <a:ext cx="4030200" cy="4620299"/>
+            <a:off x="4656667" y="1949212"/>
+            <a:ext cx="4030200" cy="4620300"/>
           </a:xfrm>
           <a:prstGeom prst="rect">
             <a:avLst/>
@@ -2989,7 +3190,7 @@
           </a:ln>
         </p:spPr>
         <p:txBody>
-          <a:bodyPr anchorCtr="0" anchor="t" bIns="91425" lIns="91425" rIns="91425" tIns="91425"/>
+          <a:bodyPr anchorCtr="0" anchor="t" bIns="91425" lIns="91425" rIns="91425" wrap="square" tIns="91425"/>
           <a:lstStyle>
             <a:lvl1pPr lvl="0" rtl="0">
               <a:spcBef>
@@ -3058,7 +3259,7 @@
 </file>
 
 <file path=ppt/slideLayouts/slideLayout4.xml><?xml version="1.0" encoding="utf-8"?>
-<p:sldLayout xmlns:a="http://schemas.openxmlformats.org/drawingml/2006/main" xmlns:r="http://schemas.openxmlformats.org/officeDocument/2006/relationships" xmlns:mc="http://schemas.openxmlformats.org/markup-compatibility/2006" xmlns:mv="urn:schemas-microsoft-com:mac:vml" xmlns:p="http://schemas.openxmlformats.org/presentationml/2006/main" xmlns:c="http://schemas.openxmlformats.org/drawingml/2006/chart" xmlns:dgm="http://schemas.openxmlformats.org/drawingml/2006/diagram" xmlns:o="urn:schemas-microsoft-com:office:office" xmlns:v="urn:schemas-microsoft-com:vml" xmlns:pvml="urn:schemas-microsoft-com:office:powerpoint" xmlns:com="http://schemas.openxmlformats.org/drawingml/2006/compatibility" xmlns:p14="http://schemas.microsoft.com/office/powerpoint/2010/main" type="titleOnly">
+<p:sldLayout xmlns:a="http://schemas.openxmlformats.org/drawingml/2006/main" xmlns:r="http://schemas.openxmlformats.org/officeDocument/2006/relationships" xmlns:mc="http://schemas.openxmlformats.org/markup-compatibility/2006" xmlns:mv="urn:schemas-microsoft-com:mac:vml" xmlns:p="http://schemas.openxmlformats.org/presentationml/2006/main" xmlns:c="http://schemas.openxmlformats.org/drawingml/2006/chart" xmlns:dgm="http://schemas.openxmlformats.org/drawingml/2006/diagram" xmlns:o="urn:schemas-microsoft-com:office:office" xmlns:v="urn:schemas-microsoft-com:vml" xmlns:pvml="urn:schemas-microsoft-com:office:powerpoint" xmlns:com="http://schemas.openxmlformats.org/drawingml/2006/compatibility" xmlns:p14="http://schemas.microsoft.com/office/powerpoint/2010/main" xmlns:p15="http://schemas.microsoft.com/office/powerpoint/2012/main" type="titleOnly">
   <p:cSld name="Title only">
     <p:spTree>
       <p:nvGrpSpPr>
@@ -3096,7 +3297,7 @@
           </a:ln>
         </p:spPr>
         <p:txBody>
-          <a:bodyPr anchorCtr="0" anchor="ctr" bIns="45700" lIns="91425" rIns="91425" tIns="45700">
+          <a:bodyPr anchorCtr="0" anchor="ctr" bIns="45700" lIns="91425" rIns="91425" wrap="square" tIns="45700">
             <a:noAutofit/>
           </a:bodyPr>
           <a:lstStyle/>
@@ -3125,7 +3326,7 @@
         <p:spPr>
           <a:xfrm>
             <a:off x="457200" y="274637"/>
-            <a:ext cx="8229600" cy="1522199"/>
+            <a:ext cx="8229600" cy="1522200"/>
           </a:xfrm>
           <a:prstGeom prst="rect">
             <a:avLst/>
@@ -3136,7 +3337,7 @@
           </a:ln>
         </p:spPr>
         <p:txBody>
-          <a:bodyPr anchorCtr="0" anchor="b" bIns="91425" lIns="91425" rIns="91425" tIns="91425"/>
+          <a:bodyPr anchorCtr="0" anchor="b" bIns="91425" lIns="91425" rIns="91425" wrap="square" tIns="91425"/>
           <a:lstStyle>
             <a:lvl1pPr lvl="0" rtl="0" algn="l">
               <a:spcBef>
@@ -3304,7 +3505,7 @@
 </file>
 
 <file path=ppt/slideLayouts/slideLayout5.xml><?xml version="1.0" encoding="utf-8"?>
-<p:sldLayout xmlns:a="http://schemas.openxmlformats.org/drawingml/2006/main" xmlns:r="http://schemas.openxmlformats.org/officeDocument/2006/relationships" xmlns:mc="http://schemas.openxmlformats.org/markup-compatibility/2006" xmlns:mv="urn:schemas-microsoft-com:mac:vml" xmlns:p="http://schemas.openxmlformats.org/presentationml/2006/main" xmlns:c="http://schemas.openxmlformats.org/drawingml/2006/chart" xmlns:dgm="http://schemas.openxmlformats.org/drawingml/2006/diagram" xmlns:o="urn:schemas-microsoft-com:office:office" xmlns:v="urn:schemas-microsoft-com:vml" xmlns:pvml="urn:schemas-microsoft-com:office:powerpoint" xmlns:com="http://schemas.openxmlformats.org/drawingml/2006/compatibility" xmlns:p14="http://schemas.microsoft.com/office/powerpoint/2010/main">
+<p:sldLayout xmlns:a="http://schemas.openxmlformats.org/drawingml/2006/main" xmlns:r="http://schemas.openxmlformats.org/officeDocument/2006/relationships" xmlns:mc="http://schemas.openxmlformats.org/markup-compatibility/2006" xmlns:mv="urn:schemas-microsoft-com:mac:vml" xmlns:p="http://schemas.openxmlformats.org/presentationml/2006/main" xmlns:c="http://schemas.openxmlformats.org/drawingml/2006/chart" xmlns:dgm="http://schemas.openxmlformats.org/drawingml/2006/diagram" xmlns:o="urn:schemas-microsoft-com:office:office" xmlns:v="urn:schemas-microsoft-com:vml" xmlns:pvml="urn:schemas-microsoft-com:office:powerpoint" xmlns:com="http://schemas.openxmlformats.org/drawingml/2006/compatibility" xmlns:p14="http://schemas.microsoft.com/office/powerpoint/2010/main" xmlns:p15="http://schemas.microsoft.com/office/powerpoint/2012/main">
   <p:cSld name="Caption">
     <p:spTree>
       <p:nvGrpSpPr>
@@ -3328,7 +3529,7 @@
         </p:nvSpPr>
         <p:spPr>
           <a:xfrm>
-            <a:off x="0" y="5875078"/>
+            <a:off x="0" y="5875079"/>
             <a:ext cx="8686800" cy="692700"/>
           </a:xfrm>
           <a:prstGeom prst="rect">
@@ -3342,7 +3543,7 @@
           </a:ln>
         </p:spPr>
         <p:txBody>
-          <a:bodyPr anchorCtr="0" anchor="ctr" bIns="45700" lIns="91425" rIns="91425" tIns="45700">
+          <a:bodyPr anchorCtr="0" anchor="ctr" bIns="45700" lIns="91425" rIns="91425" wrap="square" tIns="45700">
             <a:noAutofit/>
           </a:bodyPr>
           <a:lstStyle/>
@@ -3370,7 +3571,7 @@
         </p:nvSpPr>
         <p:spPr>
           <a:xfrm>
-            <a:off x="457200" y="5875078"/>
+            <a:off x="457200" y="5875079"/>
             <a:ext cx="8229600" cy="692700"/>
           </a:xfrm>
           <a:prstGeom prst="rect">
@@ -3382,7 +3583,7 @@
           </a:ln>
         </p:spPr>
         <p:txBody>
-          <a:bodyPr anchorCtr="0" anchor="ctr" bIns="91425" lIns="91425" rIns="91425" tIns="91425"/>
+          <a:bodyPr anchorCtr="0" anchor="ctr" bIns="91425" lIns="91425" rIns="91425" wrap="square" tIns="91425"/>
           <a:lstStyle>
             <a:lvl1pPr lvl="0" rtl="0" algn="l">
               <a:lnSpc>
@@ -3595,7 +3796,7 @@
 </file>
 
 <file path=ppt/slideLayouts/slideLayout6.xml><?xml version="1.0" encoding="utf-8"?>
-<p:sldLayout xmlns:a="http://schemas.openxmlformats.org/drawingml/2006/main" xmlns:r="http://schemas.openxmlformats.org/officeDocument/2006/relationships" xmlns:mc="http://schemas.openxmlformats.org/markup-compatibility/2006" xmlns:mv="urn:schemas-microsoft-com:mac:vml" xmlns:p="http://schemas.openxmlformats.org/presentationml/2006/main" xmlns:c="http://schemas.openxmlformats.org/drawingml/2006/chart" xmlns:dgm="http://schemas.openxmlformats.org/drawingml/2006/diagram" xmlns:o="urn:schemas-microsoft-com:office:office" xmlns:v="urn:schemas-microsoft-com:vml" xmlns:pvml="urn:schemas-microsoft-com:office:powerpoint" xmlns:com="http://schemas.openxmlformats.org/drawingml/2006/compatibility" xmlns:p14="http://schemas.microsoft.com/office/powerpoint/2010/main" type="blank">
+<p:sldLayout xmlns:a="http://schemas.openxmlformats.org/drawingml/2006/main" xmlns:r="http://schemas.openxmlformats.org/officeDocument/2006/relationships" xmlns:mc="http://schemas.openxmlformats.org/markup-compatibility/2006" xmlns:mv="urn:schemas-microsoft-com:mac:vml" xmlns:p="http://schemas.openxmlformats.org/presentationml/2006/main" xmlns:c="http://schemas.openxmlformats.org/drawingml/2006/chart" xmlns:dgm="http://schemas.openxmlformats.org/drawingml/2006/diagram" xmlns:o="urn:schemas-microsoft-com:office:office" xmlns:v="urn:schemas-microsoft-com:vml" xmlns:pvml="urn:schemas-microsoft-com:office:powerpoint" xmlns:com="http://schemas.openxmlformats.org/drawingml/2006/compatibility" xmlns:p14="http://schemas.microsoft.com/office/powerpoint/2010/main" xmlns:p15="http://schemas.microsoft.com/office/powerpoint/2012/main" type="blank">
   <p:cSld name="Blank">
     <p:spTree>
       <p:nvGrpSpPr>
@@ -3620,7 +3821,7 @@
 </file>
 
 <file path=ppt/slideMasters/slideMaster1.xml><?xml version="1.0" encoding="utf-8"?>
-<p:sldMaster xmlns:a="http://schemas.openxmlformats.org/drawingml/2006/main" xmlns:r="http://schemas.openxmlformats.org/officeDocument/2006/relationships" xmlns:mc="http://schemas.openxmlformats.org/markup-compatibility/2006" xmlns:mv="urn:schemas-microsoft-com:mac:vml" xmlns:p="http://schemas.openxmlformats.org/presentationml/2006/main" xmlns:c="http://schemas.openxmlformats.org/drawingml/2006/chart" xmlns:dgm="http://schemas.openxmlformats.org/drawingml/2006/diagram" xmlns:o="urn:schemas-microsoft-com:office:office" xmlns:v="urn:schemas-microsoft-com:vml" xmlns:pvml="urn:schemas-microsoft-com:office:powerpoint" xmlns:com="http://schemas.openxmlformats.org/drawingml/2006/compatibility" xmlns:p14="http://schemas.microsoft.com/office/powerpoint/2010/main">
+<p:sldMaster xmlns:a="http://schemas.openxmlformats.org/drawingml/2006/main" xmlns:r="http://schemas.openxmlformats.org/officeDocument/2006/relationships" xmlns:mc="http://schemas.openxmlformats.org/markup-compatibility/2006" xmlns:mv="urn:schemas-microsoft-com:mac:vml" xmlns:p="http://schemas.openxmlformats.org/presentationml/2006/main" xmlns:c="http://schemas.openxmlformats.org/drawingml/2006/chart" xmlns:dgm="http://schemas.openxmlformats.org/drawingml/2006/diagram" xmlns:o="urn:schemas-microsoft-com:office:office" xmlns:v="urn:schemas-microsoft-com:vml" xmlns:pvml="urn:schemas-microsoft-com:office:powerpoint" xmlns:com="http://schemas.openxmlformats.org/drawingml/2006/compatibility" xmlns:p14="http://schemas.microsoft.com/office/powerpoint/2010/main" xmlns:p15="http://schemas.microsoft.com/office/powerpoint/2012/main">
   <p:cSld>
     <p:bg>
       <p:bgPr>
@@ -3654,7 +3855,7 @@
         <p:spPr>
           <a:xfrm>
             <a:off x="457200" y="274637"/>
-            <a:ext cx="8229600" cy="1522199"/>
+            <a:ext cx="8229600" cy="1522200"/>
           </a:xfrm>
           <a:prstGeom prst="rect">
             <a:avLst/>
@@ -3665,7 +3866,7 @@
           </a:ln>
         </p:spPr>
         <p:txBody>
-          <a:bodyPr anchorCtr="0" anchor="b" bIns="91425" lIns="91425" rIns="91425" tIns="91425"/>
+          <a:bodyPr anchorCtr="0" anchor="b" bIns="91425" lIns="91425" rIns="91425" wrap="square" tIns="91425"/>
           <a:lstStyle>
             <a:lvl1pPr lvl="0" rtl="0" algn="l">
               <a:spcBef>
@@ -3862,7 +4063,7 @@
         <p:spPr>
           <a:xfrm>
             <a:off x="457200" y="1947332"/>
-            <a:ext cx="8229600" cy="4620299"/>
+            <a:ext cx="8229600" cy="4620300"/>
           </a:xfrm>
           <a:prstGeom prst="rect">
             <a:avLst/>
@@ -3873,7 +4074,7 @@
           </a:ln>
         </p:spPr>
         <p:txBody>
-          <a:bodyPr anchorCtr="0" anchor="t" bIns="91425" lIns="91425" rIns="91425" tIns="91425"/>
+          <a:bodyPr anchorCtr="0" anchor="t" bIns="91425" lIns="91425" rIns="91425" wrap="square" tIns="91425"/>
           <a:lstStyle>
             <a:lvl1pPr lvl="0" rtl="0" algn="l">
               <a:spcBef>
@@ -4515,7 +4716,7 @@
 </file>
 
 <file path=ppt/slides/slide1.xml><?xml version="1.0" encoding="utf-8"?>
-<p:sld xmlns:a="http://schemas.openxmlformats.org/drawingml/2006/main" xmlns:r="http://schemas.openxmlformats.org/officeDocument/2006/relationships" xmlns:mc="http://schemas.openxmlformats.org/markup-compatibility/2006" xmlns:mv="urn:schemas-microsoft-com:mac:vml" xmlns:p="http://schemas.openxmlformats.org/presentationml/2006/main" xmlns:c="http://schemas.openxmlformats.org/drawingml/2006/chart" xmlns:dgm="http://schemas.openxmlformats.org/drawingml/2006/diagram" xmlns:o="urn:schemas-microsoft-com:office:office" xmlns:v="urn:schemas-microsoft-com:vml" xmlns:pvml="urn:schemas-microsoft-com:office:powerpoint" xmlns:com="http://schemas.openxmlformats.org/drawingml/2006/compatibility" xmlns:p14="http://schemas.microsoft.com/office/powerpoint/2010/main">
+<p:sld xmlns:a="http://schemas.openxmlformats.org/drawingml/2006/main" xmlns:r="http://schemas.openxmlformats.org/officeDocument/2006/relationships" xmlns:mc="http://schemas.openxmlformats.org/markup-compatibility/2006" xmlns:mv="urn:schemas-microsoft-com:mac:vml" xmlns:p="http://schemas.openxmlformats.org/presentationml/2006/main" xmlns:c="http://schemas.openxmlformats.org/drawingml/2006/chart" xmlns:dgm="http://schemas.openxmlformats.org/drawingml/2006/diagram" xmlns:o="urn:schemas-microsoft-com:office:office" xmlns:v="urn:schemas-microsoft-com:vml" xmlns:pvml="urn:schemas-microsoft-com:office:powerpoint" xmlns:com="http://schemas.openxmlformats.org/drawingml/2006/compatibility" xmlns:p14="http://schemas.microsoft.com/office/powerpoint/2010/main" xmlns:p15="http://schemas.microsoft.com/office/powerpoint/2012/main">
   <p:cSld>
     <p:spTree>
       <p:nvGrpSpPr>
@@ -4541,15 +4742,15 @@
         </p:nvSpPr>
         <p:spPr>
           <a:xfrm>
-            <a:off x="685800" y="1734342"/>
-            <a:ext cx="7772400" cy="2245499"/>
+            <a:off x="685800" y="1734343"/>
+            <a:ext cx="7772400" cy="2245500"/>
           </a:xfrm>
           <a:prstGeom prst="rect">
             <a:avLst/>
           </a:prstGeom>
         </p:spPr>
         <p:txBody>
-          <a:bodyPr anchorCtr="0" anchor="b" bIns="91425" lIns="91425" rIns="91425" tIns="91425">
+          <a:bodyPr anchorCtr="0" anchor="b" bIns="91425" lIns="91425" rIns="91425" wrap="square" tIns="91425">
             <a:noAutofit/>
           </a:bodyPr>
           <a:lstStyle/>
@@ -4562,7 +4763,7 @@
             </a:pPr>
             <a:r>
               <a:rPr lang="en" sz="6000"/>
-              <a:t>Flow charts AND pseudocode</a:t>
+              <a:t>Diagramas de flujo</a:t>
             </a:r>
           </a:p>
         </p:txBody>
@@ -4578,14 +4779,14 @@
         <p:spPr>
           <a:xfrm>
             <a:off x="685800" y="4124476"/>
-            <a:ext cx="7772400" cy="949799"/>
+            <a:ext cx="7772400" cy="949800"/>
           </a:xfrm>
           <a:prstGeom prst="rect">
             <a:avLst/>
           </a:prstGeom>
         </p:spPr>
         <p:txBody>
-          <a:bodyPr anchorCtr="0" anchor="ctr" bIns="91425" lIns="91425" rIns="91425" tIns="91425">
+          <a:bodyPr anchorCtr="0" anchor="ctr" bIns="91425" lIns="91425" rIns="91425" wrap="square" tIns="91425">
             <a:noAutofit/>
           </a:bodyPr>
           <a:lstStyle/>
@@ -4598,7 +4799,7 @@
             </a:pPr>
             <a:r>
               <a:rPr lang="en"/>
-              <a:t>2. Computational Thinking</a:t>
+              <a:t>3. Lógica Computacional</a:t>
             </a:r>
           </a:p>
         </p:txBody>
@@ -4619,7 +4820,7 @@
         </p:blipFill>
         <p:spPr>
           <a:xfrm>
-            <a:off x="7417074" y="6402549"/>
+            <a:off x="7417075" y="6402550"/>
             <a:ext cx="1726925" cy="455450"/>
           </a:xfrm>
           <a:prstGeom prst="rect">
@@ -4640,11 +4841,107 @@
 </file>
 
 <file path=ppt/slides/slide10.xml><?xml version="1.0" encoding="utf-8"?>
-<p:sld xmlns:a="http://schemas.openxmlformats.org/drawingml/2006/main" xmlns:r="http://schemas.openxmlformats.org/officeDocument/2006/relationships" xmlns:mc="http://schemas.openxmlformats.org/markup-compatibility/2006" xmlns:mv="urn:schemas-microsoft-com:mac:vml" xmlns:p="http://schemas.openxmlformats.org/presentationml/2006/main" xmlns:c="http://schemas.openxmlformats.org/drawingml/2006/chart" xmlns:dgm="http://schemas.openxmlformats.org/drawingml/2006/diagram" xmlns:o="urn:schemas-microsoft-com:office:office" xmlns:v="urn:schemas-microsoft-com:vml" xmlns:pvml="urn:schemas-microsoft-com:office:powerpoint" xmlns:com="http://schemas.openxmlformats.org/drawingml/2006/compatibility" xmlns:p14="http://schemas.microsoft.com/office/powerpoint/2010/main">
+<p:sld xmlns:a="http://schemas.openxmlformats.org/drawingml/2006/main" xmlns:r="http://schemas.openxmlformats.org/officeDocument/2006/relationships" xmlns:mc="http://schemas.openxmlformats.org/markup-compatibility/2006" xmlns:mv="urn:schemas-microsoft-com:mac:vml" xmlns:p="http://schemas.openxmlformats.org/presentationml/2006/main" xmlns:c="http://schemas.openxmlformats.org/drawingml/2006/chart" xmlns:dgm="http://schemas.openxmlformats.org/drawingml/2006/diagram" xmlns:o="urn:schemas-microsoft-com:office:office" xmlns:v="urn:schemas-microsoft-com:vml" xmlns:pvml="urn:schemas-microsoft-com:office:powerpoint" xmlns:com="http://schemas.openxmlformats.org/drawingml/2006/compatibility" xmlns:p14="http://schemas.microsoft.com/office/powerpoint/2010/main" xmlns:p15="http://schemas.microsoft.com/office/powerpoint/2012/main">
   <p:cSld>
     <p:spTree>
       <p:nvGrpSpPr>
-        <p:cNvPr id="79" name="Shape 79"/>
+        <p:cNvPr id="82" name="Shape 82"/>
+        <p:cNvGrpSpPr/>
+        <p:nvPr/>
+      </p:nvGrpSpPr>
+      <p:grpSpPr>
+        <a:xfrm>
+          <a:off x="0" y="0"/>
+          <a:ext cx="0" cy="0"/>
+          <a:chOff x="0" y="0"/>
+          <a:chExt cx="0" cy="0"/>
+        </a:xfrm>
+      </p:grpSpPr>
+      <p:sp>
+        <p:nvSpPr>
+          <p:cNvPr id="83" name="Shape 83"/>
+          <p:cNvSpPr txBox="1"/>
+          <p:nvPr>
+            <p:ph type="title"/>
+          </p:nvPr>
+        </p:nvSpPr>
+        <p:spPr>
+          <a:xfrm>
+            <a:off x="457200" y="274637"/>
+            <a:ext cx="8229600" cy="1522200"/>
+          </a:xfrm>
+          <a:prstGeom prst="rect">
+            <a:avLst/>
+          </a:prstGeom>
+        </p:spPr>
+        <p:txBody>
+          <a:bodyPr anchorCtr="0" anchor="b" bIns="91425" lIns="91425" rIns="91425" wrap="square" tIns="91425">
+            <a:noAutofit/>
+          </a:bodyPr>
+          <a:lstStyle/>
+          <a:p>
+            <a:pPr lvl="0">
+              <a:spcBef>
+                <a:spcPts val="0"/>
+              </a:spcBef>
+              <a:buNone/>
+            </a:pPr>
+            <a:r>
+              <a:rPr lang="en"/>
+              <a:t>RETO</a:t>
+            </a:r>
+          </a:p>
+        </p:txBody>
+      </p:sp>
+      <p:sp>
+        <p:nvSpPr>
+          <p:cNvPr id="84" name="Shape 84"/>
+          <p:cNvSpPr txBox="1"/>
+          <p:nvPr>
+            <p:ph idx="1" type="body"/>
+          </p:nvPr>
+        </p:nvSpPr>
+        <p:spPr>
+          <a:xfrm>
+            <a:off x="457200" y="1947332"/>
+            <a:ext cx="8229600" cy="4620300"/>
+          </a:xfrm>
+          <a:prstGeom prst="rect">
+            <a:avLst/>
+          </a:prstGeom>
+        </p:spPr>
+        <p:txBody>
+          <a:bodyPr anchorCtr="0" anchor="t" bIns="91425" lIns="91425" rIns="91425" wrap="square" tIns="91425">
+            <a:noAutofit/>
+          </a:bodyPr>
+          <a:lstStyle/>
+          <a:p>
+            <a:pPr indent="-228600" lvl="0" marL="457200">
+              <a:spcBef>
+                <a:spcPts val="0"/>
+              </a:spcBef>
+            </a:pPr>
+            <a:r>
+              <a:rPr lang="en"/>
+              <a:t>Despliega todos los números enteros de 50 a 0</a:t>
+            </a:r>
+          </a:p>
+        </p:txBody>
+      </p:sp>
+    </p:spTree>
+  </p:cSld>
+  <p:clrMapOvr>
+    <a:masterClrMapping/>
+  </p:clrMapOvr>
+</p:sld>
+</file>
+
+<file path=ppt/slides/slide11.xml><?xml version="1.0" encoding="utf-8"?>
+<p:sld xmlns:a="http://schemas.openxmlformats.org/drawingml/2006/main" xmlns:r="http://schemas.openxmlformats.org/officeDocument/2006/relationships" xmlns:mc="http://schemas.openxmlformats.org/markup-compatibility/2006" xmlns:mv="urn:schemas-microsoft-com:mac:vml" xmlns:p="http://schemas.openxmlformats.org/presentationml/2006/main" xmlns:c="http://schemas.openxmlformats.org/drawingml/2006/chart" xmlns:dgm="http://schemas.openxmlformats.org/drawingml/2006/diagram" xmlns:o="urn:schemas-microsoft-com:office:office" xmlns:v="urn:schemas-microsoft-com:vml" xmlns:pvml="urn:schemas-microsoft-com:office:powerpoint" xmlns:com="http://schemas.openxmlformats.org/drawingml/2006/compatibility" xmlns:p14="http://schemas.microsoft.com/office/powerpoint/2010/main" xmlns:p15="http://schemas.microsoft.com/office/powerpoint/2012/main">
+  <p:cSld>
+    <p:spTree>
+      <p:nvGrpSpPr>
+        <p:cNvPr id="88" name="Shape 88"/>
         <p:cNvGrpSpPr/>
         <p:nvPr/>
       </p:nvGrpSpPr>
@@ -4658,7 +4955,7 @@
       </p:grpSpPr>
       <p:pic>
         <p:nvPicPr>
-          <p:cNvPr id="80" name="Shape 80"/>
+          <p:cNvPr id="89" name="Shape 89"/>
           <p:cNvPicPr preferRelativeResize="0"/>
           <p:nvPr/>
         </p:nvPicPr>
@@ -4672,8 +4969,8 @@
         </p:blipFill>
         <p:spPr>
           <a:xfrm>
-            <a:off x="2200500" y="882425"/>
-            <a:ext cx="4743000" cy="5093150"/>
+            <a:off x="2331362" y="445863"/>
+            <a:ext cx="4481275" cy="5966275"/>
           </a:xfrm>
           <a:prstGeom prst="rect">
             <a:avLst/>
@@ -4692,12 +4989,12 @@
 </p:sld>
 </file>
 
-<file path=ppt/slides/slide11.xml><?xml version="1.0" encoding="utf-8"?>
-<p:sld xmlns:a="http://schemas.openxmlformats.org/drawingml/2006/main" xmlns:r="http://schemas.openxmlformats.org/officeDocument/2006/relationships" xmlns:mc="http://schemas.openxmlformats.org/markup-compatibility/2006" xmlns:mv="urn:schemas-microsoft-com:mac:vml" xmlns:p="http://schemas.openxmlformats.org/presentationml/2006/main" xmlns:c="http://schemas.openxmlformats.org/drawingml/2006/chart" xmlns:dgm="http://schemas.openxmlformats.org/drawingml/2006/diagram" xmlns:o="urn:schemas-microsoft-com:office:office" xmlns:v="urn:schemas-microsoft-com:vml" xmlns:pvml="urn:schemas-microsoft-com:office:powerpoint" xmlns:com="http://schemas.openxmlformats.org/drawingml/2006/compatibility" xmlns:p14="http://schemas.microsoft.com/office/powerpoint/2010/main">
+<file path=ppt/slides/slide12.xml><?xml version="1.0" encoding="utf-8"?>
+<p:sld xmlns:a="http://schemas.openxmlformats.org/drawingml/2006/main" xmlns:r="http://schemas.openxmlformats.org/officeDocument/2006/relationships" xmlns:mc="http://schemas.openxmlformats.org/markup-compatibility/2006" xmlns:mv="urn:schemas-microsoft-com:mac:vml" xmlns:p="http://schemas.openxmlformats.org/presentationml/2006/main" xmlns:c="http://schemas.openxmlformats.org/drawingml/2006/chart" xmlns:dgm="http://schemas.openxmlformats.org/drawingml/2006/diagram" xmlns:o="urn:schemas-microsoft-com:office:office" xmlns:v="urn:schemas-microsoft-com:vml" xmlns:pvml="urn:schemas-microsoft-com:office:powerpoint" xmlns:com="http://schemas.openxmlformats.org/drawingml/2006/compatibility" xmlns:p14="http://schemas.microsoft.com/office/powerpoint/2010/main" xmlns:p15="http://schemas.microsoft.com/office/powerpoint/2012/main">
   <p:cSld>
     <p:spTree>
       <p:nvGrpSpPr>
-        <p:cNvPr id="84" name="Shape 84"/>
+        <p:cNvPr id="93" name="Shape 93"/>
         <p:cNvGrpSpPr/>
         <p:nvPr/>
       </p:nvGrpSpPr>
@@ -4709,78 +5006,34 @@
           <a:chExt cx="0" cy="0"/>
         </a:xfrm>
       </p:grpSpPr>
-      <p:sp>
-        <p:nvSpPr>
-          <p:cNvPr id="85" name="Shape 85"/>
-          <p:cNvSpPr txBox="1"/>
-          <p:nvPr>
-            <p:ph type="ctrTitle"/>
-          </p:nvPr>
-        </p:nvSpPr>
-        <p:spPr>
-          <a:xfrm>
-            <a:off x="685800" y="1734342"/>
-            <a:ext cx="7772400" cy="2245500"/>
+      <p:pic>
+        <p:nvPicPr>
+          <p:cNvPr id="94" name="Shape 94"/>
+          <p:cNvPicPr preferRelativeResize="0"/>
+          <p:nvPr/>
+        </p:nvPicPr>
+        <p:blipFill>
+          <a:blip r:embed="rId3">
+            <a:alphaModFix/>
+          </a:blip>
+          <a:stretch>
+            <a:fillRect/>
+          </a:stretch>
+        </p:blipFill>
+        <p:spPr>
+          <a:xfrm>
+            <a:off x="2200500" y="882425"/>
+            <a:ext cx="4743000" cy="5093150"/>
           </a:xfrm>
           <a:prstGeom prst="rect">
             <a:avLst/>
           </a:prstGeom>
-        </p:spPr>
-        <p:txBody>
-          <a:bodyPr anchorCtr="0" anchor="b" bIns="91425" lIns="91425" rIns="91425" tIns="91425">
-            <a:noAutofit/>
-          </a:bodyPr>
-          <a:lstStyle/>
-          <a:p>
-            <a:pPr lvl="0">
-              <a:spcBef>
-                <a:spcPts val="0"/>
-              </a:spcBef>
-              <a:buNone/>
-            </a:pPr>
-            <a:r>
-              <a:rPr lang="en"/>
-              <a:t>Activity</a:t>
-            </a:r>
-          </a:p>
-        </p:txBody>
-      </p:sp>
-      <p:sp>
-        <p:nvSpPr>
-          <p:cNvPr id="86" name="Shape 86"/>
-          <p:cNvSpPr txBox="1"/>
-          <p:nvPr>
-            <p:ph idx="1" type="subTitle"/>
-          </p:nvPr>
-        </p:nvSpPr>
-        <p:spPr>
-          <a:xfrm>
-            <a:off x="685800" y="4124476"/>
-            <a:ext cx="7772400" cy="949800"/>
-          </a:xfrm>
-          <a:prstGeom prst="rect">
-            <a:avLst/>
-          </a:prstGeom>
-        </p:spPr>
-        <p:txBody>
-          <a:bodyPr anchorCtr="0" anchor="ctr" bIns="91425" lIns="91425" rIns="91425" tIns="91425">
-            <a:noAutofit/>
-          </a:bodyPr>
-          <a:lstStyle/>
-          <a:p>
-            <a:pPr lvl="0">
-              <a:spcBef>
-                <a:spcPts val="0"/>
-              </a:spcBef>
-              <a:buNone/>
-            </a:pPr>
-            <a:r>
-              <a:rPr lang="en"/>
-              <a:t>More flow charts!</a:t>
-            </a:r>
-          </a:p>
-        </p:txBody>
-      </p:sp>
+          <a:noFill/>
+          <a:ln>
+            <a:noFill/>
+          </a:ln>
+        </p:spPr>
+      </p:pic>
     </p:spTree>
   </p:cSld>
   <p:clrMapOvr>
@@ -4789,12 +5042,12 @@
 </p:sld>
 </file>
 
-<file path=ppt/slides/slide12.xml><?xml version="1.0" encoding="utf-8"?>
-<p:sld xmlns:a="http://schemas.openxmlformats.org/drawingml/2006/main" xmlns:r="http://schemas.openxmlformats.org/officeDocument/2006/relationships" xmlns:mc="http://schemas.openxmlformats.org/markup-compatibility/2006" xmlns:mv="urn:schemas-microsoft-com:mac:vml" xmlns:p="http://schemas.openxmlformats.org/presentationml/2006/main" xmlns:c="http://schemas.openxmlformats.org/drawingml/2006/chart" xmlns:dgm="http://schemas.openxmlformats.org/drawingml/2006/diagram" xmlns:o="urn:schemas-microsoft-com:office:office" xmlns:v="urn:schemas-microsoft-com:vml" xmlns:pvml="urn:schemas-microsoft-com:office:powerpoint" xmlns:com="http://schemas.openxmlformats.org/drawingml/2006/compatibility" xmlns:p14="http://schemas.microsoft.com/office/powerpoint/2010/main">
+<file path=ppt/slides/slide13.xml><?xml version="1.0" encoding="utf-8"?>
+<p:sld xmlns:a="http://schemas.openxmlformats.org/drawingml/2006/main" xmlns:r="http://schemas.openxmlformats.org/officeDocument/2006/relationships" xmlns:mc="http://schemas.openxmlformats.org/markup-compatibility/2006" xmlns:mv="urn:schemas-microsoft-com:mac:vml" xmlns:p="http://schemas.openxmlformats.org/presentationml/2006/main" xmlns:c="http://schemas.openxmlformats.org/drawingml/2006/chart" xmlns:dgm="http://schemas.openxmlformats.org/drawingml/2006/diagram" xmlns:o="urn:schemas-microsoft-com:office:office" xmlns:v="urn:schemas-microsoft-com:vml" xmlns:pvml="urn:schemas-microsoft-com:office:powerpoint" xmlns:com="http://schemas.openxmlformats.org/drawingml/2006/compatibility" xmlns:p14="http://schemas.microsoft.com/office/powerpoint/2010/main" xmlns:p15="http://schemas.microsoft.com/office/powerpoint/2012/main">
   <p:cSld>
     <p:spTree>
       <p:nvGrpSpPr>
-        <p:cNvPr id="90" name="Shape 90"/>
+        <p:cNvPr id="98" name="Shape 98"/>
         <p:cNvGrpSpPr/>
         <p:nvPr/>
       </p:nvGrpSpPr>
@@ -4808,7 +5061,7 @@
       </p:grpSpPr>
       <p:sp>
         <p:nvSpPr>
-          <p:cNvPr id="91" name="Shape 91"/>
+          <p:cNvPr id="99" name="Shape 99"/>
           <p:cNvSpPr txBox="1"/>
           <p:nvPr>
             <p:ph type="ctrTitle"/>
@@ -4816,7 +5069,7 @@
         </p:nvSpPr>
         <p:spPr>
           <a:xfrm>
-            <a:off x="685800" y="1734342"/>
+            <a:off x="685800" y="1734343"/>
             <a:ext cx="7772400" cy="2245500"/>
           </a:xfrm>
           <a:prstGeom prst="rect">
@@ -4824,7 +5077,7 @@
           </a:prstGeom>
         </p:spPr>
         <p:txBody>
-          <a:bodyPr anchorCtr="0" anchor="b" bIns="91425" lIns="91425" rIns="91425" tIns="91425">
+          <a:bodyPr anchorCtr="0" anchor="b" bIns="91425" lIns="91425" rIns="91425" wrap="square" tIns="91425">
             <a:noAutofit/>
           </a:bodyPr>
           <a:lstStyle/>
@@ -4837,14 +5090,14 @@
             </a:pPr>
             <a:r>
               <a:rPr lang="en"/>
-              <a:t>Data types</a:t>
+              <a:t>Actividad</a:t>
             </a:r>
           </a:p>
         </p:txBody>
       </p:sp>
       <p:sp>
         <p:nvSpPr>
-          <p:cNvPr id="92" name="Shape 92"/>
+          <p:cNvPr id="100" name="Shape 100"/>
           <p:cNvSpPr txBox="1"/>
           <p:nvPr>
             <p:ph idx="1" type="subTitle"/>
@@ -4860,7 +5113,7 @@
           </a:prstGeom>
         </p:spPr>
         <p:txBody>
-          <a:bodyPr anchorCtr="0" anchor="ctr" bIns="91425" lIns="91425" rIns="91425" tIns="91425">
+          <a:bodyPr anchorCtr="0" anchor="ctr" bIns="91425" lIns="91425" rIns="91425" wrap="square" tIns="91425">
             <a:noAutofit/>
           </a:bodyPr>
           <a:lstStyle/>
@@ -4873,7 +5126,7 @@
             </a:pPr>
             <a:r>
               <a:rPr lang="en"/>
-              <a:t>What and how can be used</a:t>
+              <a:t>Más diagramas de flujo!</a:t>
             </a:r>
           </a:p>
         </p:txBody>
@@ -4886,12 +5139,12 @@
 </p:sld>
 </file>
 
-<file path=ppt/slides/slide13.xml><?xml version="1.0" encoding="utf-8"?>
-<p:sld xmlns:a="http://schemas.openxmlformats.org/drawingml/2006/main" xmlns:r="http://schemas.openxmlformats.org/officeDocument/2006/relationships" xmlns:mc="http://schemas.openxmlformats.org/markup-compatibility/2006" xmlns:mv="urn:schemas-microsoft-com:mac:vml" xmlns:p="http://schemas.openxmlformats.org/presentationml/2006/main" xmlns:c="http://schemas.openxmlformats.org/drawingml/2006/chart" xmlns:dgm="http://schemas.openxmlformats.org/drawingml/2006/diagram" xmlns:o="urn:schemas-microsoft-com:office:office" xmlns:v="urn:schemas-microsoft-com:vml" xmlns:pvml="urn:schemas-microsoft-com:office:powerpoint" xmlns:com="http://schemas.openxmlformats.org/drawingml/2006/compatibility" xmlns:p14="http://schemas.microsoft.com/office/powerpoint/2010/main">
+<file path=ppt/slides/slide14.xml><?xml version="1.0" encoding="utf-8"?>
+<p:sld xmlns:a="http://schemas.openxmlformats.org/drawingml/2006/main" xmlns:r="http://schemas.openxmlformats.org/officeDocument/2006/relationships" xmlns:mc="http://schemas.openxmlformats.org/markup-compatibility/2006" xmlns:mv="urn:schemas-microsoft-com:mac:vml" xmlns:p="http://schemas.openxmlformats.org/presentationml/2006/main" xmlns:c="http://schemas.openxmlformats.org/drawingml/2006/chart" xmlns:dgm="http://schemas.openxmlformats.org/drawingml/2006/diagram" xmlns:o="urn:schemas-microsoft-com:office:office" xmlns:v="urn:schemas-microsoft-com:vml" xmlns:pvml="urn:schemas-microsoft-com:office:powerpoint" xmlns:com="http://schemas.openxmlformats.org/drawingml/2006/compatibility" xmlns:p14="http://schemas.microsoft.com/office/powerpoint/2010/main" xmlns:p15="http://schemas.microsoft.com/office/powerpoint/2012/main">
   <p:cSld>
     <p:spTree>
       <p:nvGrpSpPr>
-        <p:cNvPr id="96" name="Shape 96"/>
+        <p:cNvPr id="104" name="Shape 104"/>
         <p:cNvGrpSpPr/>
         <p:nvPr/>
       </p:nvGrpSpPr>
@@ -4905,23 +5158,23 @@
       </p:grpSpPr>
       <p:sp>
         <p:nvSpPr>
-          <p:cNvPr id="97" name="Shape 97"/>
+          <p:cNvPr id="105" name="Shape 105"/>
           <p:cNvSpPr txBox="1"/>
           <p:nvPr>
-            <p:ph idx="1" type="body"/>
+            <p:ph type="ctrTitle"/>
           </p:nvPr>
         </p:nvSpPr>
         <p:spPr>
           <a:xfrm>
-            <a:off x="457200" y="5875078"/>
-            <a:ext cx="8229600" cy="692700"/>
+            <a:off x="685800" y="1734343"/>
+            <a:ext cx="7772400" cy="2245500"/>
           </a:xfrm>
           <a:prstGeom prst="rect">
             <a:avLst/>
           </a:prstGeom>
         </p:spPr>
         <p:txBody>
-          <a:bodyPr anchorCtr="0" anchor="ctr" bIns="91425" lIns="91425" rIns="91425" tIns="91425">
+          <a:bodyPr anchorCtr="0" anchor="b" bIns="91425" lIns="91425" rIns="91425" wrap="square" tIns="91425">
             <a:noAutofit/>
           </a:bodyPr>
           <a:lstStyle/>
@@ -4934,14 +5187,111 @@
             </a:pPr>
             <a:r>
               <a:rPr lang="en"/>
-              <a:t>Primitives in C</a:t>
+              <a:t>Tipos de Datos</a:t>
             </a:r>
           </a:p>
         </p:txBody>
       </p:sp>
+      <p:sp>
+        <p:nvSpPr>
+          <p:cNvPr id="106" name="Shape 106"/>
+          <p:cNvSpPr txBox="1"/>
+          <p:nvPr>
+            <p:ph idx="1" type="subTitle"/>
+          </p:nvPr>
+        </p:nvSpPr>
+        <p:spPr>
+          <a:xfrm>
+            <a:off x="685800" y="4124476"/>
+            <a:ext cx="7772400" cy="949800"/>
+          </a:xfrm>
+          <a:prstGeom prst="rect">
+            <a:avLst/>
+          </a:prstGeom>
+        </p:spPr>
+        <p:txBody>
+          <a:bodyPr anchorCtr="0" anchor="ctr" bIns="91425" lIns="91425" rIns="91425" wrap="square" tIns="91425">
+            <a:noAutofit/>
+          </a:bodyPr>
+          <a:lstStyle/>
+          <a:p>
+            <a:pPr lvl="0">
+              <a:spcBef>
+                <a:spcPts val="0"/>
+              </a:spcBef>
+              <a:buNone/>
+            </a:pPr>
+            <a:r>
+              <a:rPr lang="en"/>
+              <a:t>Qué y cómo pueden ser usados</a:t>
+            </a:r>
+          </a:p>
+        </p:txBody>
+      </p:sp>
+    </p:spTree>
+  </p:cSld>
+  <p:clrMapOvr>
+    <a:masterClrMapping/>
+  </p:clrMapOvr>
+</p:sld>
+</file>
+
+<file path=ppt/slides/slide15.xml><?xml version="1.0" encoding="utf-8"?>
+<p:sld xmlns:a="http://schemas.openxmlformats.org/drawingml/2006/main" xmlns:r="http://schemas.openxmlformats.org/officeDocument/2006/relationships" xmlns:mc="http://schemas.openxmlformats.org/markup-compatibility/2006" xmlns:mv="urn:schemas-microsoft-com:mac:vml" xmlns:p="http://schemas.openxmlformats.org/presentationml/2006/main" xmlns:c="http://schemas.openxmlformats.org/drawingml/2006/chart" xmlns:dgm="http://schemas.openxmlformats.org/drawingml/2006/diagram" xmlns:o="urn:schemas-microsoft-com:office:office" xmlns:v="urn:schemas-microsoft-com:vml" xmlns:pvml="urn:schemas-microsoft-com:office:powerpoint" xmlns:com="http://schemas.openxmlformats.org/drawingml/2006/compatibility" xmlns:p14="http://schemas.microsoft.com/office/powerpoint/2010/main" xmlns:p15="http://schemas.microsoft.com/office/powerpoint/2012/main">
+  <p:cSld>
+    <p:spTree>
+      <p:nvGrpSpPr>
+        <p:cNvPr id="110" name="Shape 110"/>
+        <p:cNvGrpSpPr/>
+        <p:nvPr/>
+      </p:nvGrpSpPr>
+      <p:grpSpPr>
+        <a:xfrm>
+          <a:off x="0" y="0"/>
+          <a:ext cx="0" cy="0"/>
+          <a:chOff x="0" y="0"/>
+          <a:chExt cx="0" cy="0"/>
+        </a:xfrm>
+      </p:grpSpPr>
+      <p:sp>
+        <p:nvSpPr>
+          <p:cNvPr id="111" name="Shape 111"/>
+          <p:cNvSpPr txBox="1"/>
+          <p:nvPr>
+            <p:ph idx="1" type="body"/>
+          </p:nvPr>
+        </p:nvSpPr>
+        <p:spPr>
+          <a:xfrm>
+            <a:off x="457200" y="5875079"/>
+            <a:ext cx="8229600" cy="692700"/>
+          </a:xfrm>
+          <a:prstGeom prst="rect">
+            <a:avLst/>
+          </a:prstGeom>
+        </p:spPr>
+        <p:txBody>
+          <a:bodyPr anchorCtr="0" anchor="ctr" bIns="91425" lIns="91425" rIns="91425" wrap="square" tIns="91425">
+            <a:noAutofit/>
+          </a:bodyPr>
+          <a:lstStyle/>
+          <a:p>
+            <a:pPr lvl="0">
+              <a:spcBef>
+                <a:spcPts val="0"/>
+              </a:spcBef>
+              <a:buNone/>
+            </a:pPr>
+            <a:r>
+              <a:rPr lang="en"/>
+              <a:t>Datos primitivos en C</a:t>
+            </a:r>
+          </a:p>
+        </p:txBody>
+      </p:sp>
       <p:pic>
         <p:nvPicPr>
-          <p:cNvPr id="98" name="Shape 98"/>
+          <p:cNvPr id="112" name="Shape 112"/>
           <p:cNvPicPr preferRelativeResize="0"/>
           <p:nvPr/>
         </p:nvPicPr>
@@ -4955,8 +5305,8 @@
         </p:blipFill>
         <p:spPr>
           <a:xfrm>
-            <a:off x="1194945" y="566463"/>
-            <a:ext cx="6754099" cy="4901674"/>
+            <a:off x="1194946" y="566464"/>
+            <a:ext cx="6754099" cy="4901675"/>
           </a:xfrm>
           <a:prstGeom prst="rect">
             <a:avLst/>
@@ -4975,12 +5325,12 @@
 </p:sld>
 </file>
 
-<file path=ppt/slides/slide14.xml><?xml version="1.0" encoding="utf-8"?>
-<p:sld xmlns:a="http://schemas.openxmlformats.org/drawingml/2006/main" xmlns:r="http://schemas.openxmlformats.org/officeDocument/2006/relationships" xmlns:mc="http://schemas.openxmlformats.org/markup-compatibility/2006" xmlns:mv="urn:schemas-microsoft-com:mac:vml" xmlns:p="http://schemas.openxmlformats.org/presentationml/2006/main" xmlns:c="http://schemas.openxmlformats.org/drawingml/2006/chart" xmlns:dgm="http://schemas.openxmlformats.org/drawingml/2006/diagram" xmlns:o="urn:schemas-microsoft-com:office:office" xmlns:v="urn:schemas-microsoft-com:vml" xmlns:pvml="urn:schemas-microsoft-com:office:powerpoint" xmlns:com="http://schemas.openxmlformats.org/drawingml/2006/compatibility" xmlns:p14="http://schemas.microsoft.com/office/powerpoint/2010/main">
+<file path=ppt/slides/slide16.xml><?xml version="1.0" encoding="utf-8"?>
+<p:sld xmlns:a="http://schemas.openxmlformats.org/drawingml/2006/main" xmlns:r="http://schemas.openxmlformats.org/officeDocument/2006/relationships" xmlns:mc="http://schemas.openxmlformats.org/markup-compatibility/2006" xmlns:mv="urn:schemas-microsoft-com:mac:vml" xmlns:p="http://schemas.openxmlformats.org/presentationml/2006/main" xmlns:c="http://schemas.openxmlformats.org/drawingml/2006/chart" xmlns:dgm="http://schemas.openxmlformats.org/drawingml/2006/diagram" xmlns:o="urn:schemas-microsoft-com:office:office" xmlns:v="urn:schemas-microsoft-com:vml" xmlns:pvml="urn:schemas-microsoft-com:office:powerpoint" xmlns:com="http://schemas.openxmlformats.org/drawingml/2006/compatibility" xmlns:p14="http://schemas.microsoft.com/office/powerpoint/2010/main" xmlns:p15="http://schemas.microsoft.com/office/powerpoint/2012/main">
   <p:cSld>
     <p:spTree>
       <p:nvGrpSpPr>
-        <p:cNvPr id="102" name="Shape 102"/>
+        <p:cNvPr id="116" name="Shape 116"/>
         <p:cNvGrpSpPr/>
         <p:nvPr/>
       </p:nvGrpSpPr>
@@ -4994,7 +5344,7 @@
       </p:grpSpPr>
       <p:sp>
         <p:nvSpPr>
-          <p:cNvPr id="103" name="Shape 103"/>
+          <p:cNvPr id="117" name="Shape 117"/>
           <p:cNvSpPr txBox="1"/>
           <p:nvPr>
             <p:ph idx="1" type="body"/>
@@ -5002,7 +5352,7 @@
         </p:nvSpPr>
         <p:spPr>
           <a:xfrm>
-            <a:off x="457200" y="5875078"/>
+            <a:off x="457200" y="5875079"/>
             <a:ext cx="8229600" cy="692700"/>
           </a:xfrm>
           <a:prstGeom prst="rect">
@@ -5010,7 +5360,7 @@
           </a:prstGeom>
         </p:spPr>
         <p:txBody>
-          <a:bodyPr anchorCtr="0" anchor="ctr" bIns="91425" lIns="91425" rIns="91425" tIns="91425">
+          <a:bodyPr anchorCtr="0" anchor="ctr" bIns="91425" lIns="91425" rIns="91425" wrap="square" tIns="91425">
             <a:noAutofit/>
           </a:bodyPr>
           <a:lstStyle/>
@@ -5023,14 +5373,14 @@
             </a:pPr>
             <a:r>
               <a:rPr lang="en"/>
-              <a:t>Primitives in Java</a:t>
+              <a:t>Datos primitivos en Java</a:t>
             </a:r>
           </a:p>
         </p:txBody>
       </p:sp>
       <p:pic>
         <p:nvPicPr>
-          <p:cNvPr id="104" name="Shape 104"/>
+          <p:cNvPr id="118" name="Shape 118"/>
           <p:cNvPicPr preferRelativeResize="0"/>
           <p:nvPr/>
         </p:nvPicPr>
@@ -5044,8 +5394,8 @@
         </p:blipFill>
         <p:spPr>
           <a:xfrm>
-            <a:off x="177750" y="1747499"/>
-            <a:ext cx="8788500" cy="3362999"/>
+            <a:off x="177750" y="1747500"/>
+            <a:ext cx="8788501" cy="3363000"/>
           </a:xfrm>
           <a:prstGeom prst="rect">
             <a:avLst/>
@@ -5064,12 +5414,12 @@
 </p:sld>
 </file>
 
-<file path=ppt/slides/slide15.xml><?xml version="1.0" encoding="utf-8"?>
-<p:sld xmlns:a="http://schemas.openxmlformats.org/drawingml/2006/main" xmlns:r="http://schemas.openxmlformats.org/officeDocument/2006/relationships" xmlns:mc="http://schemas.openxmlformats.org/markup-compatibility/2006" xmlns:mv="urn:schemas-microsoft-com:mac:vml" xmlns:p="http://schemas.openxmlformats.org/presentationml/2006/main" xmlns:c="http://schemas.openxmlformats.org/drawingml/2006/chart" xmlns:dgm="http://schemas.openxmlformats.org/drawingml/2006/diagram" xmlns:o="urn:schemas-microsoft-com:office:office" xmlns:v="urn:schemas-microsoft-com:vml" xmlns:pvml="urn:schemas-microsoft-com:office:powerpoint" xmlns:com="http://schemas.openxmlformats.org/drawingml/2006/compatibility" xmlns:p14="http://schemas.microsoft.com/office/powerpoint/2010/main">
+<file path=ppt/slides/slide17.xml><?xml version="1.0" encoding="utf-8"?>
+<p:sld xmlns:a="http://schemas.openxmlformats.org/drawingml/2006/main" xmlns:r="http://schemas.openxmlformats.org/officeDocument/2006/relationships" xmlns:mc="http://schemas.openxmlformats.org/markup-compatibility/2006" xmlns:mv="urn:schemas-microsoft-com:mac:vml" xmlns:p="http://schemas.openxmlformats.org/presentationml/2006/main" xmlns:c="http://schemas.openxmlformats.org/drawingml/2006/chart" xmlns:dgm="http://schemas.openxmlformats.org/drawingml/2006/diagram" xmlns:o="urn:schemas-microsoft-com:office:office" xmlns:v="urn:schemas-microsoft-com:vml" xmlns:pvml="urn:schemas-microsoft-com:office:powerpoint" xmlns:com="http://schemas.openxmlformats.org/drawingml/2006/compatibility" xmlns:p14="http://schemas.microsoft.com/office/powerpoint/2010/main" xmlns:p15="http://schemas.microsoft.com/office/powerpoint/2012/main">
   <p:cSld>
     <p:spTree>
       <p:nvGrpSpPr>
-        <p:cNvPr id="108" name="Shape 108"/>
+        <p:cNvPr id="122" name="Shape 122"/>
         <p:cNvGrpSpPr/>
         <p:nvPr/>
       </p:nvGrpSpPr>
@@ -5083,7 +5433,7 @@
       </p:grpSpPr>
       <p:sp>
         <p:nvSpPr>
-          <p:cNvPr id="109" name="Shape 109"/>
+          <p:cNvPr id="123" name="Shape 123"/>
           <p:cNvSpPr txBox="1"/>
           <p:nvPr>
             <p:ph type="title"/>
@@ -5092,14 +5442,14 @@
         <p:spPr>
           <a:xfrm>
             <a:off x="457200" y="274637"/>
-            <a:ext cx="8229600" cy="1522199"/>
+            <a:ext cx="8229600" cy="1522200"/>
           </a:xfrm>
           <a:prstGeom prst="rect">
             <a:avLst/>
           </a:prstGeom>
         </p:spPr>
         <p:txBody>
-          <a:bodyPr anchorCtr="0" anchor="b" bIns="91425" lIns="91425" rIns="91425" tIns="91425">
+          <a:bodyPr anchorCtr="0" anchor="b" bIns="91425" lIns="91425" rIns="91425" wrap="square" tIns="91425">
             <a:noAutofit/>
           </a:bodyPr>
           <a:lstStyle/>
@@ -5119,7 +5469,7 @@
       </p:sp>
       <p:sp>
         <p:nvSpPr>
-          <p:cNvPr id="110" name="Shape 110"/>
+          <p:cNvPr id="124" name="Shape 124"/>
           <p:cNvSpPr txBox="1"/>
           <p:nvPr>
             <p:ph idx="1" type="body"/>
@@ -5135,7 +5485,7 @@
           </a:prstGeom>
         </p:spPr>
         <p:txBody>
-          <a:bodyPr anchorCtr="0" anchor="t" bIns="91425" lIns="91425" rIns="91425" tIns="91425">
+          <a:bodyPr anchorCtr="0" anchor="t" bIns="91425" lIns="91425" rIns="91425" wrap="square" tIns="91425">
             <a:noAutofit/>
           </a:bodyPr>
           <a:lstStyle/>
@@ -5260,12 +5610,12 @@
 </p:sld>
 </file>
 
-<file path=ppt/slides/slide16.xml><?xml version="1.0" encoding="utf-8"?>
-<p:sld xmlns:a="http://schemas.openxmlformats.org/drawingml/2006/main" xmlns:r="http://schemas.openxmlformats.org/officeDocument/2006/relationships" xmlns:mc="http://schemas.openxmlformats.org/markup-compatibility/2006" xmlns:mv="urn:schemas-microsoft-com:mac:vml" xmlns:p="http://schemas.openxmlformats.org/presentationml/2006/main" xmlns:c="http://schemas.openxmlformats.org/drawingml/2006/chart" xmlns:dgm="http://schemas.openxmlformats.org/drawingml/2006/diagram" xmlns:o="urn:schemas-microsoft-com:office:office" xmlns:v="urn:schemas-microsoft-com:vml" xmlns:pvml="urn:schemas-microsoft-com:office:powerpoint" xmlns:com="http://schemas.openxmlformats.org/drawingml/2006/compatibility" xmlns:p14="http://schemas.microsoft.com/office/powerpoint/2010/main">
+<file path=ppt/slides/slide18.xml><?xml version="1.0" encoding="utf-8"?>
+<p:sld xmlns:a="http://schemas.openxmlformats.org/drawingml/2006/main" xmlns:r="http://schemas.openxmlformats.org/officeDocument/2006/relationships" xmlns:mc="http://schemas.openxmlformats.org/markup-compatibility/2006" xmlns:mv="urn:schemas-microsoft-com:mac:vml" xmlns:p="http://schemas.openxmlformats.org/presentationml/2006/main" xmlns:c="http://schemas.openxmlformats.org/drawingml/2006/chart" xmlns:dgm="http://schemas.openxmlformats.org/drawingml/2006/diagram" xmlns:o="urn:schemas-microsoft-com:office:office" xmlns:v="urn:schemas-microsoft-com:vml" xmlns:pvml="urn:schemas-microsoft-com:office:powerpoint" xmlns:com="http://schemas.openxmlformats.org/drawingml/2006/compatibility" xmlns:p14="http://schemas.microsoft.com/office/powerpoint/2010/main" xmlns:p15="http://schemas.microsoft.com/office/powerpoint/2012/main">
   <p:cSld>
     <p:spTree>
       <p:nvGrpSpPr>
-        <p:cNvPr id="114" name="Shape 114"/>
+        <p:cNvPr id="128" name="Shape 128"/>
         <p:cNvGrpSpPr/>
         <p:nvPr/>
       </p:nvGrpSpPr>
@@ -5279,7 +5629,7 @@
       </p:grpSpPr>
       <p:sp>
         <p:nvSpPr>
-          <p:cNvPr id="115" name="Shape 115"/>
+          <p:cNvPr id="129" name="Shape 129"/>
           <p:cNvSpPr txBox="1"/>
           <p:nvPr>
             <p:ph type="ctrTitle"/>
@@ -5287,15 +5637,15 @@
         </p:nvSpPr>
         <p:spPr>
           <a:xfrm>
-            <a:off x="685800" y="1734342"/>
-            <a:ext cx="7772400" cy="2245499"/>
+            <a:off x="685800" y="1734343"/>
+            <a:ext cx="7772400" cy="2245500"/>
           </a:xfrm>
           <a:prstGeom prst="rect">
             <a:avLst/>
           </a:prstGeom>
         </p:spPr>
         <p:txBody>
-          <a:bodyPr anchorCtr="0" anchor="b" bIns="91425" lIns="91425" rIns="91425" tIns="91425">
+          <a:bodyPr anchorCtr="0" anchor="b" bIns="91425" lIns="91425" rIns="91425" wrap="square" tIns="91425">
             <a:noAutofit/>
           </a:bodyPr>
           <a:lstStyle/>
@@ -5315,7 +5665,7 @@
       </p:sp>
       <p:sp>
         <p:nvSpPr>
-          <p:cNvPr id="116" name="Shape 116"/>
+          <p:cNvPr id="130" name="Shape 130"/>
           <p:cNvSpPr txBox="1"/>
           <p:nvPr>
             <p:ph idx="1" type="subTitle"/>
@@ -5324,14 +5674,14 @@
         <p:spPr>
           <a:xfrm>
             <a:off x="685800" y="4124476"/>
-            <a:ext cx="7772400" cy="949799"/>
+            <a:ext cx="7772400" cy="949800"/>
           </a:xfrm>
           <a:prstGeom prst="rect">
             <a:avLst/>
           </a:prstGeom>
         </p:spPr>
         <p:txBody>
-          <a:bodyPr anchorCtr="0" anchor="ctr" bIns="91425" lIns="91425" rIns="91425" tIns="91425">
+          <a:bodyPr anchorCtr="0" anchor="ctr" bIns="91425" lIns="91425" rIns="91425" wrap="square" tIns="91425">
             <a:noAutofit/>
           </a:bodyPr>
           <a:lstStyle/>
@@ -5351,7 +5701,7 @@
       </p:sp>
       <p:pic>
         <p:nvPicPr>
-          <p:cNvPr id="117" name="Shape 117"/>
+          <p:cNvPr id="131" name="Shape 131"/>
           <p:cNvPicPr preferRelativeResize="0"/>
           <p:nvPr/>
         </p:nvPicPr>
@@ -5365,7 +5715,7 @@
         </p:blipFill>
         <p:spPr>
           <a:xfrm>
-            <a:off x="7417074" y="6402549"/>
+            <a:off x="7417075" y="6402550"/>
             <a:ext cx="1726925" cy="455450"/>
           </a:xfrm>
           <a:prstGeom prst="rect">
@@ -5386,7 +5736,7 @@
 </file>
 
 <file path=ppt/slides/slide2.xml><?xml version="1.0" encoding="utf-8"?>
-<p:sld xmlns:a="http://schemas.openxmlformats.org/drawingml/2006/main" xmlns:r="http://schemas.openxmlformats.org/officeDocument/2006/relationships" xmlns:mc="http://schemas.openxmlformats.org/markup-compatibility/2006" xmlns:mv="urn:schemas-microsoft-com:mac:vml" xmlns:p="http://schemas.openxmlformats.org/presentationml/2006/main" xmlns:c="http://schemas.openxmlformats.org/drawingml/2006/chart" xmlns:dgm="http://schemas.openxmlformats.org/drawingml/2006/diagram" xmlns:o="urn:schemas-microsoft-com:office:office" xmlns:v="urn:schemas-microsoft-com:vml" xmlns:pvml="urn:schemas-microsoft-com:office:powerpoint" xmlns:com="http://schemas.openxmlformats.org/drawingml/2006/compatibility" xmlns:p14="http://schemas.microsoft.com/office/powerpoint/2010/main">
+<p:sld xmlns:a="http://schemas.openxmlformats.org/drawingml/2006/main" xmlns:r="http://schemas.openxmlformats.org/officeDocument/2006/relationships" xmlns:mc="http://schemas.openxmlformats.org/markup-compatibility/2006" xmlns:mv="urn:schemas-microsoft-com:mac:vml" xmlns:p="http://schemas.openxmlformats.org/presentationml/2006/main" xmlns:c="http://schemas.openxmlformats.org/drawingml/2006/chart" xmlns:dgm="http://schemas.openxmlformats.org/drawingml/2006/diagram" xmlns:o="urn:schemas-microsoft-com:office:office" xmlns:v="urn:schemas-microsoft-com:vml" xmlns:pvml="urn:schemas-microsoft-com:office:powerpoint" xmlns:com="http://schemas.openxmlformats.org/drawingml/2006/compatibility" xmlns:p14="http://schemas.microsoft.com/office/powerpoint/2010/main" xmlns:p15="http://schemas.microsoft.com/office/powerpoint/2012/main">
   <p:cSld>
     <p:spTree>
       <p:nvGrpSpPr>
@@ -5413,14 +5763,14 @@
         <p:spPr>
           <a:xfrm>
             <a:off x="457200" y="274637"/>
-            <a:ext cx="8229600" cy="1522199"/>
+            <a:ext cx="8229600" cy="1522200"/>
           </a:xfrm>
           <a:prstGeom prst="rect">
             <a:avLst/>
           </a:prstGeom>
         </p:spPr>
         <p:txBody>
-          <a:bodyPr anchorCtr="0" anchor="b" bIns="91425" lIns="91425" rIns="91425" tIns="91425">
+          <a:bodyPr anchorCtr="0" anchor="b" bIns="91425" lIns="91425" rIns="91425" wrap="square" tIns="91425">
             <a:noAutofit/>
           </a:bodyPr>
           <a:lstStyle/>
@@ -5433,7 +5783,7 @@
             </a:pPr>
             <a:r>
               <a:rPr lang="en"/>
-              <a:t>Flow chart</a:t>
+              <a:t>Diagrama de flujo</a:t>
             </a:r>
           </a:p>
         </p:txBody>
@@ -5456,7 +5806,7 @@
           </a:prstGeom>
         </p:spPr>
         <p:txBody>
-          <a:bodyPr anchorCtr="0" anchor="t" bIns="91425" lIns="91425" rIns="91425" tIns="91425">
+          <a:bodyPr anchorCtr="0" anchor="t" bIns="91425" lIns="91425" rIns="91425" wrap="square" tIns="91425">
             <a:noAutofit/>
           </a:bodyPr>
           <a:lstStyle/>
@@ -5469,7 +5819,7 @@
             </a:pPr>
             <a:r>
               <a:rPr lang="en"/>
-              <a:t>A graphical representation of an algorithm</a:t>
+              <a:t>La representación gráfica de un algoritmo</a:t>
             </a:r>
           </a:p>
         </p:txBody>
@@ -5483,7 +5833,7 @@
 </file>
 
 <file path=ppt/slides/slide3.xml><?xml version="1.0" encoding="utf-8"?>
-<p:sld xmlns:a="http://schemas.openxmlformats.org/drawingml/2006/main" xmlns:r="http://schemas.openxmlformats.org/officeDocument/2006/relationships" xmlns:mc="http://schemas.openxmlformats.org/markup-compatibility/2006" xmlns:mv="urn:schemas-microsoft-com:mac:vml" xmlns:p="http://schemas.openxmlformats.org/presentationml/2006/main" xmlns:c="http://schemas.openxmlformats.org/drawingml/2006/chart" xmlns:dgm="http://schemas.openxmlformats.org/drawingml/2006/diagram" xmlns:o="urn:schemas-microsoft-com:office:office" xmlns:v="urn:schemas-microsoft-com:vml" xmlns:pvml="urn:schemas-microsoft-com:office:powerpoint" xmlns:com="http://schemas.openxmlformats.org/drawingml/2006/compatibility" xmlns:p14="http://schemas.microsoft.com/office/powerpoint/2010/main">
+<p:sld xmlns:a="http://schemas.openxmlformats.org/drawingml/2006/main" xmlns:r="http://schemas.openxmlformats.org/officeDocument/2006/relationships" xmlns:mc="http://schemas.openxmlformats.org/markup-compatibility/2006" xmlns:mv="urn:schemas-microsoft-com:mac:vml" xmlns:p="http://schemas.openxmlformats.org/presentationml/2006/main" xmlns:c="http://schemas.openxmlformats.org/drawingml/2006/chart" xmlns:dgm="http://schemas.openxmlformats.org/drawingml/2006/diagram" xmlns:o="urn:schemas-microsoft-com:office:office" xmlns:v="urn:schemas-microsoft-com:vml" xmlns:pvml="urn:schemas-microsoft-com:office:powerpoint" xmlns:com="http://schemas.openxmlformats.org/drawingml/2006/compatibility" xmlns:p14="http://schemas.microsoft.com/office/powerpoint/2010/main" xmlns:p15="http://schemas.microsoft.com/office/powerpoint/2012/main">
   <p:cSld>
     <p:spTree>
       <p:nvGrpSpPr>
@@ -5516,7 +5866,7 @@
         <p:spPr>
           <a:xfrm>
             <a:off x="0" y="874600"/>
-            <a:ext cx="9143999" cy="5108788"/>
+            <a:ext cx="9143999" cy="5108789"/>
           </a:xfrm>
           <a:prstGeom prst="rect">
             <a:avLst/>
@@ -5536,7 +5886,7 @@
 </file>
 
 <file path=ppt/slides/slide4.xml><?xml version="1.0" encoding="utf-8"?>
-<p:sld xmlns:a="http://schemas.openxmlformats.org/drawingml/2006/main" xmlns:r="http://schemas.openxmlformats.org/officeDocument/2006/relationships" xmlns:mc="http://schemas.openxmlformats.org/markup-compatibility/2006" xmlns:mv="urn:schemas-microsoft-com:mac:vml" xmlns:p="http://schemas.openxmlformats.org/presentationml/2006/main" xmlns:c="http://schemas.openxmlformats.org/drawingml/2006/chart" xmlns:dgm="http://schemas.openxmlformats.org/drawingml/2006/diagram" xmlns:o="urn:schemas-microsoft-com:office:office" xmlns:v="urn:schemas-microsoft-com:vml" xmlns:pvml="urn:schemas-microsoft-com:office:powerpoint" xmlns:com="http://schemas.openxmlformats.org/drawingml/2006/compatibility" xmlns:p14="http://schemas.microsoft.com/office/powerpoint/2010/main">
+<p:sld xmlns:a="http://schemas.openxmlformats.org/drawingml/2006/main" xmlns:r="http://schemas.openxmlformats.org/officeDocument/2006/relationships" xmlns:mc="http://schemas.openxmlformats.org/markup-compatibility/2006" xmlns:mv="urn:schemas-microsoft-com:mac:vml" xmlns:p="http://schemas.openxmlformats.org/presentationml/2006/main" xmlns:c="http://schemas.openxmlformats.org/drawingml/2006/chart" xmlns:dgm="http://schemas.openxmlformats.org/drawingml/2006/diagram" xmlns:o="urn:schemas-microsoft-com:office:office" xmlns:v="urn:schemas-microsoft-com:vml" xmlns:pvml="urn:schemas-microsoft-com:office:powerpoint" xmlns:com="http://schemas.openxmlformats.org/drawingml/2006/compatibility" xmlns:p14="http://schemas.microsoft.com/office/powerpoint/2010/main" xmlns:p15="http://schemas.microsoft.com/office/powerpoint/2012/main">
   <p:cSld>
     <p:spTree>
       <p:nvGrpSpPr>
@@ -5558,18 +5908,17 @@
           <p:cNvPicPr preferRelativeResize="0"/>
           <p:nvPr/>
         </p:nvPicPr>
-        <p:blipFill>
+        <p:blipFill rotWithShape="1">
           <a:blip r:embed="rId3">
             <a:alphaModFix/>
           </a:blip>
-          <a:stretch>
-            <a:fillRect/>
-          </a:stretch>
+          <a:srcRect b="32102" l="0" r="0" t="0"/>
+          <a:stretch/>
         </p:blipFill>
         <p:spPr>
           <a:xfrm>
-            <a:off x="1973512" y="664199"/>
-            <a:ext cx="5196975" cy="5529600"/>
+            <a:off x="0" y="1694600"/>
+            <a:ext cx="9143999" cy="3468800"/>
           </a:xfrm>
           <a:prstGeom prst="rect">
             <a:avLst/>
@@ -5589,7 +5938,7 @@
 </file>
 
 <file path=ppt/slides/slide5.xml><?xml version="1.0" encoding="utf-8"?>
-<p:sld xmlns:a="http://schemas.openxmlformats.org/drawingml/2006/main" xmlns:r="http://schemas.openxmlformats.org/officeDocument/2006/relationships" xmlns:mc="http://schemas.openxmlformats.org/markup-compatibility/2006" xmlns:mv="urn:schemas-microsoft-com:mac:vml" xmlns:p="http://schemas.openxmlformats.org/presentationml/2006/main" xmlns:c="http://schemas.openxmlformats.org/drawingml/2006/chart" xmlns:dgm="http://schemas.openxmlformats.org/drawingml/2006/diagram" xmlns:o="urn:schemas-microsoft-com:office:office" xmlns:v="urn:schemas-microsoft-com:vml" xmlns:pvml="urn:schemas-microsoft-com:office:powerpoint" xmlns:com="http://schemas.openxmlformats.org/drawingml/2006/compatibility" xmlns:p14="http://schemas.microsoft.com/office/powerpoint/2010/main">
+<p:sld xmlns:a="http://schemas.openxmlformats.org/drawingml/2006/main" xmlns:r="http://schemas.openxmlformats.org/officeDocument/2006/relationships" xmlns:mc="http://schemas.openxmlformats.org/markup-compatibility/2006" xmlns:mv="urn:schemas-microsoft-com:mac:vml" xmlns:p="http://schemas.openxmlformats.org/presentationml/2006/main" xmlns:c="http://schemas.openxmlformats.org/drawingml/2006/chart" xmlns:dgm="http://schemas.openxmlformats.org/drawingml/2006/diagram" xmlns:o="urn:schemas-microsoft-com:office:office" xmlns:v="urn:schemas-microsoft-com:vml" xmlns:pvml="urn:schemas-microsoft-com:office:powerpoint" xmlns:com="http://schemas.openxmlformats.org/drawingml/2006/compatibility" xmlns:p14="http://schemas.microsoft.com/office/powerpoint/2010/main" xmlns:p15="http://schemas.microsoft.com/office/powerpoint/2012/main">
   <p:cSld>
     <p:spTree>
       <p:nvGrpSpPr>
@@ -5621,8 +5970,8 @@
         </p:blipFill>
         <p:spPr>
           <a:xfrm>
-            <a:off x="1777500" y="1063825"/>
-            <a:ext cx="7234649" cy="4730349"/>
+            <a:off x="1973513" y="664200"/>
+            <a:ext cx="5196975" cy="5529600"/>
           </a:xfrm>
           <a:prstGeom prst="rect">
             <a:avLst/>
@@ -5642,7 +5991,7 @@
 </file>
 
 <file path=ppt/slides/slide6.xml><?xml version="1.0" encoding="utf-8"?>
-<p:sld xmlns:a="http://schemas.openxmlformats.org/drawingml/2006/main" xmlns:r="http://schemas.openxmlformats.org/officeDocument/2006/relationships" xmlns:mc="http://schemas.openxmlformats.org/markup-compatibility/2006" xmlns:mv="urn:schemas-microsoft-com:mac:vml" xmlns:p="http://schemas.openxmlformats.org/presentationml/2006/main" xmlns:c="http://schemas.openxmlformats.org/drawingml/2006/chart" xmlns:dgm="http://schemas.openxmlformats.org/drawingml/2006/diagram" xmlns:o="urn:schemas-microsoft-com:office:office" xmlns:v="urn:schemas-microsoft-com:vml" xmlns:pvml="urn:schemas-microsoft-com:office:powerpoint" xmlns:com="http://schemas.openxmlformats.org/drawingml/2006/compatibility" xmlns:p14="http://schemas.microsoft.com/office/powerpoint/2010/main">
+<p:sld xmlns:a="http://schemas.openxmlformats.org/drawingml/2006/main" xmlns:r="http://schemas.openxmlformats.org/officeDocument/2006/relationships" xmlns:mc="http://schemas.openxmlformats.org/markup-compatibility/2006" xmlns:mv="urn:schemas-microsoft-com:mac:vml" xmlns:p="http://schemas.openxmlformats.org/presentationml/2006/main" xmlns:c="http://schemas.openxmlformats.org/drawingml/2006/chart" xmlns:dgm="http://schemas.openxmlformats.org/drawingml/2006/diagram" xmlns:o="urn:schemas-microsoft-com:office:office" xmlns:v="urn:schemas-microsoft-com:vml" xmlns:pvml="urn:schemas-microsoft-com:office:powerpoint" xmlns:com="http://schemas.openxmlformats.org/drawingml/2006/compatibility" xmlns:p14="http://schemas.microsoft.com/office/powerpoint/2010/main" xmlns:p15="http://schemas.microsoft.com/office/powerpoint/2012/main">
   <p:cSld>
     <p:spTree>
       <p:nvGrpSpPr>
@@ -5674,8 +6023,8 @@
         </p:blipFill>
         <p:spPr>
           <a:xfrm>
-            <a:off x="605925" y="1417387"/>
-            <a:ext cx="7932149" cy="4023225"/>
+            <a:off x="1777500" y="1063825"/>
+            <a:ext cx="7234650" cy="4730350"/>
           </a:xfrm>
           <a:prstGeom prst="rect">
             <a:avLst/>
@@ -5695,7 +6044,7 @@
 </file>
 
 <file path=ppt/slides/slide7.xml><?xml version="1.0" encoding="utf-8"?>
-<p:sld xmlns:a="http://schemas.openxmlformats.org/drawingml/2006/main" xmlns:r="http://schemas.openxmlformats.org/officeDocument/2006/relationships" xmlns:mc="http://schemas.openxmlformats.org/markup-compatibility/2006" xmlns:mv="urn:schemas-microsoft-com:mac:vml" xmlns:p="http://schemas.openxmlformats.org/presentationml/2006/main" xmlns:c="http://schemas.openxmlformats.org/drawingml/2006/chart" xmlns:dgm="http://schemas.openxmlformats.org/drawingml/2006/diagram" xmlns:o="urn:schemas-microsoft-com:office:office" xmlns:v="urn:schemas-microsoft-com:vml" xmlns:pvml="urn:schemas-microsoft-com:office:powerpoint" xmlns:com="http://schemas.openxmlformats.org/drawingml/2006/compatibility" xmlns:p14="http://schemas.microsoft.com/office/powerpoint/2010/main">
+<p:sld xmlns:a="http://schemas.openxmlformats.org/drawingml/2006/main" xmlns:r="http://schemas.openxmlformats.org/officeDocument/2006/relationships" xmlns:mc="http://schemas.openxmlformats.org/markup-compatibility/2006" xmlns:mv="urn:schemas-microsoft-com:mac:vml" xmlns:p="http://schemas.openxmlformats.org/presentationml/2006/main" xmlns:c="http://schemas.openxmlformats.org/drawingml/2006/chart" xmlns:dgm="http://schemas.openxmlformats.org/drawingml/2006/diagram" xmlns:o="urn:schemas-microsoft-com:office:office" xmlns:v="urn:schemas-microsoft-com:vml" xmlns:pvml="urn:schemas-microsoft-com:office:powerpoint" xmlns:com="http://schemas.openxmlformats.org/drawingml/2006/compatibility" xmlns:p14="http://schemas.microsoft.com/office/powerpoint/2010/main" xmlns:p15="http://schemas.microsoft.com/office/powerpoint/2012/main">
   <p:cSld>
     <p:spTree>
       <p:nvGrpSpPr>
@@ -5711,6 +6060,72 @@
           <a:chExt cx="0" cy="0"/>
         </a:xfrm>
       </p:grpSpPr>
+      <p:pic>
+        <p:nvPicPr>
+          <p:cNvPr id="65" name="Shape 65"/>
+          <p:cNvPicPr preferRelativeResize="0"/>
+          <p:nvPr/>
+        </p:nvPicPr>
+        <p:blipFill>
+          <a:blip r:embed="rId3">
+            <a:alphaModFix/>
+          </a:blip>
+          <a:stretch>
+            <a:fillRect/>
+          </a:stretch>
+        </p:blipFill>
+        <p:spPr>
+          <a:xfrm>
+            <a:off x="1954325" y="2012575"/>
+            <a:ext cx="5628175" cy="2832850"/>
+          </a:xfrm>
+          <a:prstGeom prst="rect">
+            <a:avLst/>
+          </a:prstGeom>
+          <a:noFill/>
+          <a:ln>
+            <a:noFill/>
+          </a:ln>
+        </p:spPr>
+      </p:pic>
+      <p:sp>
+        <p:nvSpPr>
+          <p:cNvPr id="66" name="Shape 66"/>
+          <p:cNvSpPr txBox="1"/>
+          <p:nvPr/>
+        </p:nvSpPr>
+        <p:spPr>
+          <a:xfrm>
+            <a:off x="5594000" y="914425"/>
+            <a:ext cx="1909500" cy="591600"/>
+          </a:xfrm>
+          <a:prstGeom prst="rect">
+            <a:avLst/>
+          </a:prstGeom>
+          <a:noFill/>
+          <a:ln>
+            <a:noFill/>
+          </a:ln>
+        </p:spPr>
+        <p:txBody>
+          <a:bodyPr anchorCtr="0" anchor="t" bIns="91425" lIns="91425" rIns="91425" wrap="square" tIns="91425">
+            <a:noAutofit/>
+          </a:bodyPr>
+          <a:lstStyle/>
+          <a:p>
+            <a:pPr lvl="0">
+              <a:spcBef>
+                <a:spcPts val="0"/>
+              </a:spcBef>
+              <a:buNone/>
+            </a:pPr>
+            <a:r>
+              <a:rPr b="1" lang="en" sz="2200"/>
+              <a:t>Condicional</a:t>
+            </a:r>
+          </a:p>
+        </p:txBody>
+      </p:sp>
     </p:spTree>
   </p:cSld>
   <p:clrMapOvr>
@@ -5720,107 +6135,11 @@
 </file>
 
 <file path=ppt/slides/slide8.xml><?xml version="1.0" encoding="utf-8"?>
-<p:sld xmlns:a="http://schemas.openxmlformats.org/drawingml/2006/main" xmlns:r="http://schemas.openxmlformats.org/officeDocument/2006/relationships" xmlns:mc="http://schemas.openxmlformats.org/markup-compatibility/2006" xmlns:mv="urn:schemas-microsoft-com:mac:vml" xmlns:p="http://schemas.openxmlformats.org/presentationml/2006/main" xmlns:c="http://schemas.openxmlformats.org/drawingml/2006/chart" xmlns:dgm="http://schemas.openxmlformats.org/drawingml/2006/diagram" xmlns:o="urn:schemas-microsoft-com:office:office" xmlns:v="urn:schemas-microsoft-com:vml" xmlns:pvml="urn:schemas-microsoft-com:office:powerpoint" xmlns:com="http://schemas.openxmlformats.org/drawingml/2006/compatibility" xmlns:p14="http://schemas.microsoft.com/office/powerpoint/2010/main">
+<p:sld xmlns:a="http://schemas.openxmlformats.org/drawingml/2006/main" xmlns:r="http://schemas.openxmlformats.org/officeDocument/2006/relationships" xmlns:mc="http://schemas.openxmlformats.org/markup-compatibility/2006" xmlns:mv="urn:schemas-microsoft-com:mac:vml" xmlns:p="http://schemas.openxmlformats.org/presentationml/2006/main" xmlns:c="http://schemas.openxmlformats.org/drawingml/2006/chart" xmlns:dgm="http://schemas.openxmlformats.org/drawingml/2006/diagram" xmlns:o="urn:schemas-microsoft-com:office:office" xmlns:v="urn:schemas-microsoft-com:vml" xmlns:pvml="urn:schemas-microsoft-com:office:powerpoint" xmlns:com="http://schemas.openxmlformats.org/drawingml/2006/compatibility" xmlns:p14="http://schemas.microsoft.com/office/powerpoint/2010/main" xmlns:p15="http://schemas.microsoft.com/office/powerpoint/2012/main">
   <p:cSld>
     <p:spTree>
       <p:nvGrpSpPr>
-        <p:cNvPr id="68" name="Shape 68"/>
-        <p:cNvGrpSpPr/>
-        <p:nvPr/>
-      </p:nvGrpSpPr>
-      <p:grpSpPr>
-        <a:xfrm>
-          <a:off x="0" y="0"/>
-          <a:ext cx="0" cy="0"/>
-          <a:chOff x="0" y="0"/>
-          <a:chExt cx="0" cy="0"/>
-        </a:xfrm>
-      </p:grpSpPr>
-      <p:sp>
-        <p:nvSpPr>
-          <p:cNvPr id="69" name="Shape 69"/>
-          <p:cNvSpPr txBox="1"/>
-          <p:nvPr>
-            <p:ph type="title"/>
-          </p:nvPr>
-        </p:nvSpPr>
-        <p:spPr>
-          <a:xfrm>
-            <a:off x="457200" y="274637"/>
-            <a:ext cx="8229600" cy="1522199"/>
-          </a:xfrm>
-          <a:prstGeom prst="rect">
-            <a:avLst/>
-          </a:prstGeom>
-        </p:spPr>
-        <p:txBody>
-          <a:bodyPr anchorCtr="0" anchor="b" bIns="91425" lIns="91425" rIns="91425" tIns="91425">
-            <a:noAutofit/>
-          </a:bodyPr>
-          <a:lstStyle/>
-          <a:p>
-            <a:pPr lvl="0">
-              <a:spcBef>
-                <a:spcPts val="0"/>
-              </a:spcBef>
-              <a:buNone/>
-            </a:pPr>
-            <a:r>
-              <a:rPr lang="en"/>
-              <a:t>CHALLENGE</a:t>
-            </a:r>
-          </a:p>
-        </p:txBody>
-      </p:sp>
-      <p:sp>
-        <p:nvSpPr>
-          <p:cNvPr id="70" name="Shape 70"/>
-          <p:cNvSpPr txBox="1"/>
-          <p:nvPr>
-            <p:ph idx="1" type="body"/>
-          </p:nvPr>
-        </p:nvSpPr>
-        <p:spPr>
-          <a:xfrm>
-            <a:off x="457200" y="1947332"/>
-            <a:ext cx="8229600" cy="4620300"/>
-          </a:xfrm>
-          <a:prstGeom prst="rect">
-            <a:avLst/>
-          </a:prstGeom>
-        </p:spPr>
-        <p:txBody>
-          <a:bodyPr anchorCtr="0" anchor="t" bIns="91425" lIns="91425" rIns="91425" tIns="91425">
-            <a:noAutofit/>
-          </a:bodyPr>
-          <a:lstStyle/>
-          <a:p>
-            <a:pPr indent="-228600" lvl="0" marL="457200">
-              <a:spcBef>
-                <a:spcPts val="0"/>
-              </a:spcBef>
-            </a:pPr>
-            <a:r>
-              <a:rPr lang="en"/>
-              <a:t>Display all numbers from 50 to 0 on decreasing order. </a:t>
-            </a:r>
-          </a:p>
-        </p:txBody>
-      </p:sp>
-    </p:spTree>
-  </p:cSld>
-  <p:clrMapOvr>
-    <a:masterClrMapping/>
-  </p:clrMapOvr>
-</p:sld>
-</file>
-
-<file path=ppt/slides/slide9.xml><?xml version="1.0" encoding="utf-8"?>
-<p:sld xmlns:a="http://schemas.openxmlformats.org/drawingml/2006/main" xmlns:r="http://schemas.openxmlformats.org/officeDocument/2006/relationships" xmlns:mc="http://schemas.openxmlformats.org/markup-compatibility/2006" xmlns:mv="urn:schemas-microsoft-com:mac:vml" xmlns:p="http://schemas.openxmlformats.org/presentationml/2006/main" xmlns:c="http://schemas.openxmlformats.org/drawingml/2006/chart" xmlns:dgm="http://schemas.openxmlformats.org/drawingml/2006/diagram" xmlns:o="urn:schemas-microsoft-com:office:office" xmlns:v="urn:schemas-microsoft-com:vml" xmlns:pvml="urn:schemas-microsoft-com:office:powerpoint" xmlns:com="http://schemas.openxmlformats.org/drawingml/2006/compatibility" xmlns:p14="http://schemas.microsoft.com/office/powerpoint/2010/main">
-  <p:cSld>
-    <p:spTree>
-      <p:nvGrpSpPr>
-        <p:cNvPr id="74" name="Shape 74"/>
+        <p:cNvPr id="70" name="Shape 70"/>
         <p:cNvGrpSpPr/>
         <p:nvPr/>
       </p:nvGrpSpPr>
@@ -5834,7 +6153,132 @@
       </p:grpSpPr>
       <p:pic>
         <p:nvPicPr>
-          <p:cNvPr id="75" name="Shape 75"/>
+          <p:cNvPr id="71" name="Shape 71"/>
+          <p:cNvPicPr preferRelativeResize="0"/>
+          <p:nvPr/>
+        </p:nvPicPr>
+        <p:blipFill rotWithShape="1">
+          <a:blip r:embed="rId3">
+            <a:alphaModFix/>
+          </a:blip>
+          <a:srcRect b="47854" l="0" r="0" t="0"/>
+          <a:stretch/>
+        </p:blipFill>
+        <p:spPr>
+          <a:xfrm>
+            <a:off x="666838" y="1244378"/>
+            <a:ext cx="7810325" cy="3838625"/>
+          </a:xfrm>
+          <a:prstGeom prst="rect">
+            <a:avLst/>
+          </a:prstGeom>
+          <a:noFill/>
+          <a:ln>
+            <a:noFill/>
+          </a:ln>
+        </p:spPr>
+      </p:pic>
+      <p:pic>
+        <p:nvPicPr>
+          <p:cNvPr id="72" name="Shape 72"/>
+          <p:cNvPicPr preferRelativeResize="0"/>
+          <p:nvPr/>
+        </p:nvPicPr>
+        <p:blipFill rotWithShape="1">
+          <a:blip r:embed="rId4">
+            <a:alphaModFix/>
+          </a:blip>
+          <a:srcRect b="82080" l="36697" r="34196" t="0"/>
+          <a:stretch/>
+        </p:blipFill>
+        <p:spPr>
+          <a:xfrm>
+            <a:off x="4235825" y="87275"/>
+            <a:ext cx="1304350" cy="1069150"/>
+          </a:xfrm>
+          <a:prstGeom prst="rect">
+            <a:avLst/>
+          </a:prstGeom>
+          <a:noFill/>
+          <a:ln>
+            <a:noFill/>
+          </a:ln>
+        </p:spPr>
+      </p:pic>
+      <p:sp>
+        <p:nvSpPr>
+          <p:cNvPr id="73" name="Shape 73"/>
+          <p:cNvSpPr txBox="1"/>
+          <p:nvPr/>
+        </p:nvSpPr>
+        <p:spPr>
+          <a:xfrm>
+            <a:off x="3724900" y="1244375"/>
+            <a:ext cx="2326200" cy="417000"/>
+          </a:xfrm>
+          <a:prstGeom prst="rect">
+            <a:avLst/>
+          </a:prstGeom>
+          <a:solidFill>
+            <a:srgbClr val="FFFFFF"/>
+          </a:solidFill>
+          <a:ln cap="flat" cmpd="sng" w="9525">
+            <a:solidFill>
+              <a:srgbClr val="000000"/>
+            </a:solidFill>
+            <a:prstDash val="solid"/>
+            <a:round/>
+            <a:headEnd len="med" w="med" type="none"/>
+            <a:tailEnd len="med" w="med" type="none"/>
+          </a:ln>
+        </p:spPr>
+        <p:txBody>
+          <a:bodyPr anchorCtr="0" anchor="t" bIns="91425" lIns="91425" rIns="91425" wrap="square" tIns="91425">
+            <a:noAutofit/>
+          </a:bodyPr>
+          <a:lstStyle/>
+          <a:p>
+            <a:pPr lvl="0" algn="ctr">
+              <a:spcBef>
+                <a:spcPts val="0"/>
+              </a:spcBef>
+              <a:buNone/>
+            </a:pPr>
+            <a:r>
+              <a:rPr b="1" lang="en"/>
+              <a:t>Input =&gt; x</a:t>
+            </a:r>
+          </a:p>
+        </p:txBody>
+      </p:sp>
+    </p:spTree>
+  </p:cSld>
+  <p:clrMapOvr>
+    <a:masterClrMapping/>
+  </p:clrMapOvr>
+</p:sld>
+</file>
+
+<file path=ppt/slides/slide9.xml><?xml version="1.0" encoding="utf-8"?>
+<p:sld xmlns:a="http://schemas.openxmlformats.org/drawingml/2006/main" xmlns:r="http://schemas.openxmlformats.org/officeDocument/2006/relationships" xmlns:mc="http://schemas.openxmlformats.org/markup-compatibility/2006" xmlns:mv="urn:schemas-microsoft-com:mac:vml" xmlns:p="http://schemas.openxmlformats.org/presentationml/2006/main" xmlns:c="http://schemas.openxmlformats.org/drawingml/2006/chart" xmlns:dgm="http://schemas.openxmlformats.org/drawingml/2006/diagram" xmlns:o="urn:schemas-microsoft-com:office:office" xmlns:v="urn:schemas-microsoft-com:vml" xmlns:pvml="urn:schemas-microsoft-com:office:powerpoint" xmlns:com="http://schemas.openxmlformats.org/drawingml/2006/compatibility" xmlns:p14="http://schemas.microsoft.com/office/powerpoint/2010/main" xmlns:p15="http://schemas.microsoft.com/office/powerpoint/2012/main">
+  <p:cSld>
+    <p:spTree>
+      <p:nvGrpSpPr>
+        <p:cNvPr id="77" name="Shape 77"/>
+        <p:cNvGrpSpPr/>
+        <p:nvPr/>
+      </p:nvGrpSpPr>
+      <p:grpSpPr>
+        <a:xfrm>
+          <a:off x="0" y="0"/>
+          <a:ext cx="0" cy="0"/>
+          <a:chOff x="0" y="0"/>
+          <a:chExt cx="0" cy="0"/>
+        </a:xfrm>
+      </p:grpSpPr>
+      <p:pic>
+        <p:nvPicPr>
+          <p:cNvPr id="78" name="Shape 78"/>
           <p:cNvPicPr preferRelativeResize="0"/>
           <p:nvPr/>
         </p:nvPicPr>
@@ -5848,8 +6292,8 @@
         </p:blipFill>
         <p:spPr>
           <a:xfrm>
-            <a:off x="2331362" y="445862"/>
-            <a:ext cx="4481275" cy="5966275"/>
+            <a:off x="605925" y="1417387"/>
+            <a:ext cx="7932149" cy="4023225"/>
           </a:xfrm>
           <a:prstGeom prst="rect">
             <a:avLst/>
@@ -5869,6 +6313,285 @@
 </file>
 
 <file path=ppt/theme/theme1.xml><?xml version="1.0" encoding="utf-8"?>
+<a:theme xmlns:a="http://schemas.openxmlformats.org/drawingml/2006/main" xmlns:r="http://schemas.openxmlformats.org/officeDocument/2006/relationships" name="Modern">
+  <a:themeElements>
+    <a:clrScheme name="Custom 348">
+      <a:dk1>
+        <a:srgbClr val="000000"/>
+      </a:dk1>
+      <a:lt1>
+        <a:srgbClr val="FFFFFF"/>
+      </a:lt1>
+      <a:dk2>
+        <a:srgbClr val="191919"/>
+      </a:dk2>
+      <a:lt2>
+        <a:srgbClr val="CCCCCC"/>
+      </a:lt2>
+      <a:accent1>
+        <a:srgbClr val="7E5554"/>
+      </a:accent1>
+      <a:accent2>
+        <a:srgbClr val="910A10"/>
+      </a:accent2>
+      <a:accent3>
+        <a:srgbClr val="84294D"/>
+      </a:accent3>
+      <a:accent4>
+        <a:srgbClr val="DA823B"/>
+      </a:accent4>
+      <a:accent5>
+        <a:srgbClr val="625D3C"/>
+      </a:accent5>
+      <a:accent6>
+        <a:srgbClr val="00384A"/>
+      </a:accent6>
+      <a:hlink>
+        <a:srgbClr val="227A78"/>
+      </a:hlink>
+      <a:folHlink>
+        <a:srgbClr val="394749"/>
+      </a:folHlink>
+    </a:clrScheme>
+    <a:fontScheme name="Office">
+      <a:majorFont>
+        <a:latin typeface="Arial"/>
+        <a:ea typeface=""/>
+        <a:cs typeface=""/>
+        <a:font script="Jpan" typeface="ＭＳ Ｐゴシック"/>
+        <a:font script="Hang" typeface="맑은 고딕"/>
+        <a:font script="Hans" typeface="宋体"/>
+        <a:font script="Hant" typeface="新細明體"/>
+        <a:font script="Arab" typeface="Times New Roman"/>
+        <a:font script="Hebr" typeface="Times New Roman"/>
+        <a:font script="Thai" typeface="Angsana New"/>
+        <a:font script="Ethi" typeface="Nyala"/>
+        <a:font script="Beng" typeface="Vrinda"/>
+        <a:font script="Gujr" typeface="Shruti"/>
+        <a:font script="Khmr" typeface="MoolBoran"/>
+        <a:font script="Knda" typeface="Tunga"/>
+        <a:font script="Guru" typeface="Raavi"/>
+        <a:font script="Cans" typeface="Euphemia"/>
+        <a:font script="Cher" typeface="Plantagenet Cherokee"/>
+        <a:font script="Yiii" typeface="Microsoft Yi Baiti"/>
+        <a:font script="Tibt" typeface="Microsoft Himalaya"/>
+        <a:font script="Thaa" typeface="MV Boli"/>
+        <a:font script="Deva" typeface="Mangal"/>
+        <a:font script="Telu" typeface="Gautami"/>
+        <a:font script="Taml" typeface="Latha"/>
+        <a:font script="Syrc" typeface="Estrangelo Edessa"/>
+        <a:font script="Orya" typeface="Kalinga"/>
+        <a:font script="Mlym" typeface="Kartika"/>
+        <a:font script="Laoo" typeface="DokChampa"/>
+        <a:font script="Sinh" typeface="Iskoola Pota"/>
+        <a:font script="Mong" typeface="Mongolian Baiti"/>
+        <a:font script="Viet" typeface="Times New Roman"/>
+        <a:font script="Uigh" typeface="Microsoft Uighur"/>
+        <a:font script="Geor" typeface="Sylfaen"/>
+      </a:majorFont>
+      <a:minorFont>
+        <a:latin typeface="Arial"/>
+        <a:ea typeface=""/>
+        <a:cs typeface=""/>
+        <a:font script="Jpan" typeface="ＭＳ Ｐゴシック"/>
+        <a:font script="Hang" typeface="맑은 고딕"/>
+        <a:font script="Hans" typeface="宋体"/>
+        <a:font script="Hant" typeface="新細明體"/>
+        <a:font script="Arab" typeface="Arial"/>
+        <a:font script="Hebr" typeface="Arial"/>
+        <a:font script="Thai" typeface="Cordia New"/>
+        <a:font script="Ethi" typeface="Nyala"/>
+        <a:font script="Beng" typeface="Vrinda"/>
+        <a:font script="Gujr" typeface="Shruti"/>
+        <a:font script="Khmr" typeface="DaunPenh"/>
+        <a:font script="Knda" typeface="Tunga"/>
+        <a:font script="Guru" typeface="Raavi"/>
+        <a:font script="Cans" typeface="Euphemia"/>
+        <a:font script="Cher" typeface="Plantagenet Cherokee"/>
+        <a:font script="Yiii" typeface="Microsoft Yi Baiti"/>
+        <a:font script="Tibt" typeface="Microsoft Himalaya"/>
+        <a:font script="Thaa" typeface="MV Boli"/>
+        <a:font script="Deva" typeface="Mangal"/>
+        <a:font script="Telu" typeface="Gautami"/>
+        <a:font script="Taml" typeface="Latha"/>
+        <a:font script="Syrc" typeface="Estrangelo Edessa"/>
+        <a:font script="Orya" typeface="Kalinga"/>
+        <a:font script="Mlym" typeface="Kartika"/>
+        <a:font script="Laoo" typeface="DokChampa"/>
+        <a:font script="Sinh" typeface="Iskoola Pota"/>
+        <a:font script="Mong" typeface="Mongolian Baiti"/>
+        <a:font script="Viet" typeface="Arial"/>
+        <a:font script="Uigh" typeface="Microsoft Uighur"/>
+        <a:font script="Geor" typeface="Sylfaen"/>
+      </a:minorFont>
+    </a:fontScheme>
+    <a:fmtScheme name="Office">
+      <a:fillStyleLst>
+        <a:solidFill>
+          <a:schemeClr val="phClr"/>
+        </a:solidFill>
+        <a:gradFill rotWithShape="1">
+          <a:gsLst>
+            <a:gs pos="0">
+              <a:schemeClr val="phClr">
+                <a:tint val="50000"/>
+                <a:satMod val="300000"/>
+              </a:schemeClr>
+            </a:gs>
+            <a:gs pos="35000">
+              <a:schemeClr val="phClr">
+                <a:tint val="37000"/>
+                <a:satMod val="300000"/>
+              </a:schemeClr>
+            </a:gs>
+            <a:gs pos="100000">
+              <a:schemeClr val="phClr">
+                <a:tint val="15000"/>
+                <a:satMod val="350000"/>
+              </a:schemeClr>
+            </a:gs>
+          </a:gsLst>
+          <a:lin ang="16200000" scaled="1"/>
+        </a:gradFill>
+        <a:gradFill rotWithShape="1">
+          <a:gsLst>
+            <a:gs pos="0">
+              <a:schemeClr val="phClr">
+                <a:tint val="100000"/>
+                <a:shade val="100000"/>
+                <a:satMod val="130000"/>
+              </a:schemeClr>
+            </a:gs>
+            <a:gs pos="100000">
+              <a:schemeClr val="phClr">
+                <a:tint val="50000"/>
+                <a:shade val="100000"/>
+                <a:satMod val="350000"/>
+              </a:schemeClr>
+            </a:gs>
+          </a:gsLst>
+          <a:lin ang="16200000" scaled="0"/>
+        </a:gradFill>
+      </a:fillStyleLst>
+      <a:lnStyleLst>
+        <a:ln w="9525" cap="flat" cmpd="sng" algn="ctr">
+          <a:solidFill>
+            <a:schemeClr val="phClr">
+              <a:shade val="95000"/>
+              <a:satMod val="105000"/>
+            </a:schemeClr>
+          </a:solidFill>
+          <a:prstDash val="solid"/>
+        </a:ln>
+        <a:ln w="25400" cap="flat" cmpd="sng" algn="ctr">
+          <a:solidFill>
+            <a:schemeClr val="phClr"/>
+          </a:solidFill>
+          <a:prstDash val="solid"/>
+        </a:ln>
+        <a:ln w="38100" cap="flat" cmpd="sng" algn="ctr">
+          <a:solidFill>
+            <a:schemeClr val="phClr"/>
+          </a:solidFill>
+          <a:prstDash val="solid"/>
+        </a:ln>
+      </a:lnStyleLst>
+      <a:effectStyleLst>
+        <a:effectStyle>
+          <a:effectLst>
+            <a:outerShdw blurRad="40000" dist="20000" dir="5400000" rotWithShape="0">
+              <a:srgbClr val="000000">
+                <a:alpha val="38000"/>
+              </a:srgbClr>
+            </a:outerShdw>
+          </a:effectLst>
+        </a:effectStyle>
+        <a:effectStyle>
+          <a:effectLst>
+            <a:outerShdw blurRad="40000" dist="23000" dir="5400000" rotWithShape="0">
+              <a:srgbClr val="000000">
+                <a:alpha val="35000"/>
+              </a:srgbClr>
+            </a:outerShdw>
+          </a:effectLst>
+        </a:effectStyle>
+        <a:effectStyle>
+          <a:effectLst>
+            <a:outerShdw blurRad="40000" dist="23000" dir="5400000" rotWithShape="0">
+              <a:srgbClr val="000000">
+                <a:alpha val="35000"/>
+              </a:srgbClr>
+            </a:outerShdw>
+          </a:effectLst>
+          <a:scene3d>
+            <a:camera prst="orthographicFront">
+              <a:rot lat="0" lon="0" rev="0"/>
+            </a:camera>
+            <a:lightRig rig="threePt" dir="t">
+              <a:rot lat="0" lon="0" rev="1200000"/>
+            </a:lightRig>
+          </a:scene3d>
+          <a:sp3d>
+            <a:bevelT w="63500" h="25400"/>
+          </a:sp3d>
+        </a:effectStyle>
+      </a:effectStyleLst>
+      <a:bgFillStyleLst>
+        <a:solidFill>
+          <a:schemeClr val="phClr"/>
+        </a:solidFill>
+        <a:gradFill rotWithShape="1">
+          <a:gsLst>
+            <a:gs pos="0">
+              <a:schemeClr val="phClr">
+                <a:tint val="40000"/>
+                <a:satMod val="350000"/>
+              </a:schemeClr>
+            </a:gs>
+            <a:gs pos="40000">
+              <a:schemeClr val="phClr">
+                <a:tint val="45000"/>
+                <a:shade val="99000"/>
+                <a:satMod val="350000"/>
+              </a:schemeClr>
+            </a:gs>
+            <a:gs pos="100000">
+              <a:schemeClr val="phClr">
+                <a:shade val="20000"/>
+                <a:satMod val="255000"/>
+              </a:schemeClr>
+            </a:gs>
+          </a:gsLst>
+          <a:path path="circle">
+            <a:fillToRect l="50000" t="-80000" r="50000" b="180000"/>
+          </a:path>
+        </a:gradFill>
+        <a:gradFill rotWithShape="1">
+          <a:gsLst>
+            <a:gs pos="0">
+              <a:schemeClr val="phClr">
+                <a:tint val="80000"/>
+                <a:satMod val="300000"/>
+              </a:schemeClr>
+            </a:gs>
+            <a:gs pos="100000">
+              <a:schemeClr val="phClr">
+                <a:shade val="30000"/>
+                <a:satMod val="200000"/>
+              </a:schemeClr>
+            </a:gs>
+          </a:gsLst>
+          <a:path path="circle">
+            <a:fillToRect l="50000" t="50000" r="50000" b="50000"/>
+          </a:path>
+        </a:gradFill>
+      </a:bgFillStyleLst>
+    </a:fmtScheme>
+  </a:themeElements>
+</a:theme>
+</file>
+
+<file path=ppt/theme/theme2.xml><?xml version="1.0" encoding="utf-8"?>
 <a:theme xmlns:a="http://schemas.openxmlformats.org/drawingml/2006/main" xmlns:r="http://schemas.openxmlformats.org/officeDocument/2006/relationships" name="Custom Theme">
   <a:themeElements>
     <a:clrScheme name="Default">
@@ -6145,283 +6868,4 @@
     </a:fmtScheme>
   </a:themeElements>
 </a:theme>
-</file>
-
-<file path=ppt/theme/theme2.xml><?xml version="1.0" encoding="utf-8"?>
-<a:theme xmlns:a="http://schemas.openxmlformats.org/drawingml/2006/main" xmlns:r="http://schemas.openxmlformats.org/officeDocument/2006/relationships" name="Custom Theme">
-  <a:themeElements>
-    <a:clrScheme name="Custom 348">
-      <a:dk1>
-        <a:srgbClr val="000000"/>
-      </a:dk1>
-      <a:lt1>
-        <a:srgbClr val="FFFFFF"/>
-      </a:lt1>
-      <a:dk2>
-        <a:srgbClr val="191919"/>
-      </a:dk2>
-      <a:lt2>
-        <a:srgbClr val="CCCCCC"/>
-      </a:lt2>
-      <a:accent1>
-        <a:srgbClr val="7E5554"/>
-      </a:accent1>
-      <a:accent2>
-        <a:srgbClr val="910A10"/>
-      </a:accent2>
-      <a:accent3>
-        <a:srgbClr val="84294D"/>
-      </a:accent3>
-      <a:accent4>
-        <a:srgbClr val="DA823B"/>
-      </a:accent4>
-      <a:accent5>
-        <a:srgbClr val="625D3C"/>
-      </a:accent5>
-      <a:accent6>
-        <a:srgbClr val="00384A"/>
-      </a:accent6>
-      <a:hlink>
-        <a:srgbClr val="227A78"/>
-      </a:hlink>
-      <a:folHlink>
-        <a:srgbClr val="394749"/>
-      </a:folHlink>
-    </a:clrScheme>
-    <a:fontScheme name="Office">
-      <a:majorFont>
-        <a:latin typeface="Arial"/>
-        <a:ea typeface=""/>
-        <a:cs typeface=""/>
-        <a:font script="Jpan" typeface="ＭＳ Ｐゴシック"/>
-        <a:font script="Hang" typeface="맑은 고딕"/>
-        <a:font script="Hans" typeface="宋体"/>
-        <a:font script="Hant" typeface="新細明體"/>
-        <a:font script="Arab" typeface="Times New Roman"/>
-        <a:font script="Hebr" typeface="Times New Roman"/>
-        <a:font script="Thai" typeface="Angsana New"/>
-        <a:font script="Ethi" typeface="Nyala"/>
-        <a:font script="Beng" typeface="Vrinda"/>
-        <a:font script="Gujr" typeface="Shruti"/>
-        <a:font script="Khmr" typeface="MoolBoran"/>
-        <a:font script="Knda" typeface="Tunga"/>
-        <a:font script="Guru" typeface="Raavi"/>
-        <a:font script="Cans" typeface="Euphemia"/>
-        <a:font script="Cher" typeface="Plantagenet Cherokee"/>
-        <a:font script="Yiii" typeface="Microsoft Yi Baiti"/>
-        <a:font script="Tibt" typeface="Microsoft Himalaya"/>
-        <a:font script="Thaa" typeface="MV Boli"/>
-        <a:font script="Deva" typeface="Mangal"/>
-        <a:font script="Telu" typeface="Gautami"/>
-        <a:font script="Taml" typeface="Latha"/>
-        <a:font script="Syrc" typeface="Estrangelo Edessa"/>
-        <a:font script="Orya" typeface="Kalinga"/>
-        <a:font script="Mlym" typeface="Kartika"/>
-        <a:font script="Laoo" typeface="DokChampa"/>
-        <a:font script="Sinh" typeface="Iskoola Pota"/>
-        <a:font script="Mong" typeface="Mongolian Baiti"/>
-        <a:font script="Viet" typeface="Times New Roman"/>
-        <a:font script="Uigh" typeface="Microsoft Uighur"/>
-        <a:font script="Geor" typeface="Sylfaen"/>
-      </a:majorFont>
-      <a:minorFont>
-        <a:latin typeface="Arial"/>
-        <a:ea typeface=""/>
-        <a:cs typeface=""/>
-        <a:font script="Jpan" typeface="ＭＳ Ｐゴシック"/>
-        <a:font script="Hang" typeface="맑은 고딕"/>
-        <a:font script="Hans" typeface="宋体"/>
-        <a:font script="Hant" typeface="新細明體"/>
-        <a:font script="Arab" typeface="Arial"/>
-        <a:font script="Hebr" typeface="Arial"/>
-        <a:font script="Thai" typeface="Cordia New"/>
-        <a:font script="Ethi" typeface="Nyala"/>
-        <a:font script="Beng" typeface="Vrinda"/>
-        <a:font script="Gujr" typeface="Shruti"/>
-        <a:font script="Khmr" typeface="DaunPenh"/>
-        <a:font script="Knda" typeface="Tunga"/>
-        <a:font script="Guru" typeface="Raavi"/>
-        <a:font script="Cans" typeface="Euphemia"/>
-        <a:font script="Cher" typeface="Plantagenet Cherokee"/>
-        <a:font script="Yiii" typeface="Microsoft Yi Baiti"/>
-        <a:font script="Tibt" typeface="Microsoft Himalaya"/>
-        <a:font script="Thaa" typeface="MV Boli"/>
-        <a:font script="Deva" typeface="Mangal"/>
-        <a:font script="Telu" typeface="Gautami"/>
-        <a:font script="Taml" typeface="Latha"/>
-        <a:font script="Syrc" typeface="Estrangelo Edessa"/>
-        <a:font script="Orya" typeface="Kalinga"/>
-        <a:font script="Mlym" typeface="Kartika"/>
-        <a:font script="Laoo" typeface="DokChampa"/>
-        <a:font script="Sinh" typeface="Iskoola Pota"/>
-        <a:font script="Mong" typeface="Mongolian Baiti"/>
-        <a:font script="Viet" typeface="Arial"/>
-        <a:font script="Uigh" typeface="Microsoft Uighur"/>
-        <a:font script="Geor" typeface="Sylfaen"/>
-      </a:minorFont>
-    </a:fontScheme>
-    <a:fmtScheme name="Office">
-      <a:fillStyleLst>
-        <a:solidFill>
-          <a:schemeClr val="phClr"/>
-        </a:solidFill>
-        <a:gradFill rotWithShape="1">
-          <a:gsLst>
-            <a:gs pos="0">
-              <a:schemeClr val="phClr">
-                <a:tint val="50000"/>
-                <a:satMod val="300000"/>
-              </a:schemeClr>
-            </a:gs>
-            <a:gs pos="35000">
-              <a:schemeClr val="phClr">
-                <a:tint val="37000"/>
-                <a:satMod val="300000"/>
-              </a:schemeClr>
-            </a:gs>
-            <a:gs pos="100000">
-              <a:schemeClr val="phClr">
-                <a:tint val="15000"/>
-                <a:satMod val="350000"/>
-              </a:schemeClr>
-            </a:gs>
-          </a:gsLst>
-          <a:lin ang="16200000" scaled="1"/>
-        </a:gradFill>
-        <a:gradFill rotWithShape="1">
-          <a:gsLst>
-            <a:gs pos="0">
-              <a:schemeClr val="phClr">
-                <a:tint val="100000"/>
-                <a:shade val="100000"/>
-                <a:satMod val="130000"/>
-              </a:schemeClr>
-            </a:gs>
-            <a:gs pos="100000">
-              <a:schemeClr val="phClr">
-                <a:tint val="50000"/>
-                <a:shade val="100000"/>
-                <a:satMod val="350000"/>
-              </a:schemeClr>
-            </a:gs>
-          </a:gsLst>
-          <a:lin ang="16200000" scaled="0"/>
-        </a:gradFill>
-      </a:fillStyleLst>
-      <a:lnStyleLst>
-        <a:ln w="9525" cap="flat" cmpd="sng" algn="ctr">
-          <a:solidFill>
-            <a:schemeClr val="phClr">
-              <a:shade val="95000"/>
-              <a:satMod val="105000"/>
-            </a:schemeClr>
-          </a:solidFill>
-          <a:prstDash val="solid"/>
-        </a:ln>
-        <a:ln w="25400" cap="flat" cmpd="sng" algn="ctr">
-          <a:solidFill>
-            <a:schemeClr val="phClr"/>
-          </a:solidFill>
-          <a:prstDash val="solid"/>
-        </a:ln>
-        <a:ln w="38100" cap="flat" cmpd="sng" algn="ctr">
-          <a:solidFill>
-            <a:schemeClr val="phClr"/>
-          </a:solidFill>
-          <a:prstDash val="solid"/>
-        </a:ln>
-      </a:lnStyleLst>
-      <a:effectStyleLst>
-        <a:effectStyle>
-          <a:effectLst>
-            <a:outerShdw blurRad="40000" dist="20000" dir="5400000" rotWithShape="0">
-              <a:srgbClr val="000000">
-                <a:alpha val="38000"/>
-              </a:srgbClr>
-            </a:outerShdw>
-          </a:effectLst>
-        </a:effectStyle>
-        <a:effectStyle>
-          <a:effectLst>
-            <a:outerShdw blurRad="40000" dist="23000" dir="5400000" rotWithShape="0">
-              <a:srgbClr val="000000">
-                <a:alpha val="35000"/>
-              </a:srgbClr>
-            </a:outerShdw>
-          </a:effectLst>
-        </a:effectStyle>
-        <a:effectStyle>
-          <a:effectLst>
-            <a:outerShdw blurRad="40000" dist="23000" dir="5400000" rotWithShape="0">
-              <a:srgbClr val="000000">
-                <a:alpha val="35000"/>
-              </a:srgbClr>
-            </a:outerShdw>
-          </a:effectLst>
-          <a:scene3d>
-            <a:camera prst="orthographicFront">
-              <a:rot lat="0" lon="0" rev="0"/>
-            </a:camera>
-            <a:lightRig rig="threePt" dir="t">
-              <a:rot lat="0" lon="0" rev="1200000"/>
-            </a:lightRig>
-          </a:scene3d>
-          <a:sp3d>
-            <a:bevelT w="63500" h="25400"/>
-          </a:sp3d>
-        </a:effectStyle>
-      </a:effectStyleLst>
-      <a:bgFillStyleLst>
-        <a:solidFill>
-          <a:schemeClr val="phClr"/>
-        </a:solidFill>
-        <a:gradFill rotWithShape="1">
-          <a:gsLst>
-            <a:gs pos="0">
-              <a:schemeClr val="phClr">
-                <a:tint val="40000"/>
-                <a:satMod val="350000"/>
-              </a:schemeClr>
-            </a:gs>
-            <a:gs pos="40000">
-              <a:schemeClr val="phClr">
-                <a:tint val="45000"/>
-                <a:shade val="99000"/>
-                <a:satMod val="350000"/>
-              </a:schemeClr>
-            </a:gs>
-            <a:gs pos="100000">
-              <a:schemeClr val="phClr">
-                <a:shade val="20000"/>
-                <a:satMod val="255000"/>
-              </a:schemeClr>
-            </a:gs>
-          </a:gsLst>
-          <a:path path="circle">
-            <a:fillToRect l="50000" t="-80000" r="50000" b="180000"/>
-          </a:path>
-        </a:gradFill>
-        <a:gradFill rotWithShape="1">
-          <a:gsLst>
-            <a:gs pos="0">
-              <a:schemeClr val="phClr">
-                <a:tint val="80000"/>
-                <a:satMod val="300000"/>
-              </a:schemeClr>
-            </a:gs>
-            <a:gs pos="100000">
-              <a:schemeClr val="phClr">
-                <a:shade val="30000"/>
-                <a:satMod val="200000"/>
-              </a:schemeClr>
-            </a:gs>
-          </a:gsLst>
-          <a:path path="circle">
-            <a:fillToRect l="50000" t="50000" r="50000" b="50000"/>
-          </a:path>
-        </a:gradFill>
-      </a:bgFillStyleLst>
-    </a:fmtScheme>
-  </a:themeElements>
-</a:theme>
 </file>
</xml_diff>